<commit_message>
appendix b diagram guidance
</commit_message>
<xml_diff>
--- a/degree-thesis/en/Examples/diagram.pptx
+++ b/degree-thesis/en/Examples/diagram.pptx
@@ -8,6 +8,8 @@
     <p:sldId id="257" r:id="rId2"/>
     <p:sldId id="258" r:id="rId3"/>
     <p:sldId id="259" r:id="rId4"/>
+    <p:sldId id="260" r:id="rId5"/>
+    <p:sldId id="261" r:id="rId6"/>
   </p:sldIdLst>
   <p:sldSz cx="8280400" cy="4319588"/>
   <p:notesSz cx="6858000" cy="9144000"/>
@@ -106,6 +108,11 @@
       </a:defRPr>
     </a:lvl9pPr>
   </p:defaultTextStyle>
+  <p:extLst>
+    <p:ext uri="{EFAFB233-063F-42B5-8137-9DF3F51BA10A}">
+      <p15:sldGuideLst xmlns:p15="http://schemas.microsoft.com/office/powerpoint/2012/main"/>
+    </p:ext>
+  </p:extLst>
 </p:presentation>
 </file>
 
@@ -239,7 +246,7 @@
           <a:lstStyle/>
           <a:p>
             <a:fld id="{89276540-48DD-D34F-BA48-84524032606B}" type="datetimeFigureOut">
-              <a:t>29.12.19</a:t>
+              <a:t>30.12.19</a:t>
             </a:fld>
             <a:endParaRPr lang="de-DE"/>
           </a:p>
@@ -407,7 +414,7 @@
           <a:lstStyle/>
           <a:p>
             <a:fld id="{89276540-48DD-D34F-BA48-84524032606B}" type="datetimeFigureOut">
-              <a:t>29.12.19</a:t>
+              <a:t>30.12.19</a:t>
             </a:fld>
             <a:endParaRPr lang="de-DE"/>
           </a:p>
@@ -585,7 +592,7 @@
           <a:lstStyle/>
           <a:p>
             <a:fld id="{89276540-48DD-D34F-BA48-84524032606B}" type="datetimeFigureOut">
-              <a:t>29.12.19</a:t>
+              <a:t>30.12.19</a:t>
             </a:fld>
             <a:endParaRPr lang="de-DE"/>
           </a:p>
@@ -753,7 +760,7 @@
           <a:lstStyle/>
           <a:p>
             <a:fld id="{89276540-48DD-D34F-BA48-84524032606B}" type="datetimeFigureOut">
-              <a:t>29.12.19</a:t>
+              <a:t>30.12.19</a:t>
             </a:fld>
             <a:endParaRPr lang="de-DE"/>
           </a:p>
@@ -997,7 +1004,7 @@
           <a:lstStyle/>
           <a:p>
             <a:fld id="{89276540-48DD-D34F-BA48-84524032606B}" type="datetimeFigureOut">
-              <a:t>29.12.19</a:t>
+              <a:t>30.12.19</a:t>
             </a:fld>
             <a:endParaRPr lang="de-DE"/>
           </a:p>
@@ -1227,7 +1234,7 @@
           <a:lstStyle/>
           <a:p>
             <a:fld id="{89276540-48DD-D34F-BA48-84524032606B}" type="datetimeFigureOut">
-              <a:t>29.12.19</a:t>
+              <a:t>30.12.19</a:t>
             </a:fld>
             <a:endParaRPr lang="de-DE"/>
           </a:p>
@@ -1592,7 +1599,7 @@
           <a:lstStyle/>
           <a:p>
             <a:fld id="{89276540-48DD-D34F-BA48-84524032606B}" type="datetimeFigureOut">
-              <a:t>29.12.19</a:t>
+              <a:t>30.12.19</a:t>
             </a:fld>
             <a:endParaRPr lang="de-DE"/>
           </a:p>
@@ -1708,7 +1715,7 @@
           <a:lstStyle/>
           <a:p>
             <a:fld id="{89276540-48DD-D34F-BA48-84524032606B}" type="datetimeFigureOut">
-              <a:t>29.12.19</a:t>
+              <a:t>30.12.19</a:t>
             </a:fld>
             <a:endParaRPr lang="de-DE"/>
           </a:p>
@@ -1801,7 +1808,7 @@
           <a:lstStyle/>
           <a:p>
             <a:fld id="{89276540-48DD-D34F-BA48-84524032606B}" type="datetimeFigureOut">
-              <a:t>29.12.19</a:t>
+              <a:t>30.12.19</a:t>
             </a:fld>
             <a:endParaRPr lang="de-DE"/>
           </a:p>
@@ -2076,7 +2083,7 @@
           <a:lstStyle/>
           <a:p>
             <a:fld id="{89276540-48DD-D34F-BA48-84524032606B}" type="datetimeFigureOut">
-              <a:t>29.12.19</a:t>
+              <a:t>30.12.19</a:t>
             </a:fld>
             <a:endParaRPr lang="de-DE"/>
           </a:p>
@@ -2331,7 +2338,7 @@
           <a:lstStyle/>
           <a:p>
             <a:fld id="{89276540-48DD-D34F-BA48-84524032606B}" type="datetimeFigureOut">
-              <a:t>29.12.19</a:t>
+              <a:t>30.12.19</a:t>
             </a:fld>
             <a:endParaRPr lang="de-DE"/>
           </a:p>
@@ -2542,7 +2549,7 @@
           </a:lstStyle>
           <a:p>
             <a:fld id="{89276540-48DD-D34F-BA48-84524032606B}" type="datetimeFigureOut">
-              <a:t>29.12.19</a:t>
+              <a:t>30.12.19</a:t>
             </a:fld>
             <a:endParaRPr lang="de-DE"/>
           </a:p>
@@ -3021,7 +3028,10 @@
             <a:lstStyle/>
             <a:p>
               <a:pPr algn="ctr"/>
-              <a:endParaRPr lang="de-DE"/>
+              <a:endParaRPr lang="de-DE">
+                <a:latin typeface="Roboto" panose="02000000000000000000" pitchFamily="2" charset="0"/>
+                <a:ea typeface="Roboto" panose="02000000000000000000" pitchFamily="2" charset="0"/>
+              </a:endParaRPr>
             </a:p>
           </p:txBody>
         </p:sp>
@@ -3080,7 +3090,10 @@
             <a:lstStyle/>
             <a:p>
               <a:pPr algn="ctr"/>
-              <a:endParaRPr lang="de-DE"/>
+              <a:endParaRPr lang="de-DE">
+                <a:latin typeface="Roboto" panose="02000000000000000000" pitchFamily="2" charset="0"/>
+                <a:ea typeface="Roboto" panose="02000000000000000000" pitchFamily="2" charset="0"/>
+              </a:endParaRPr>
             </a:p>
           </p:txBody>
         </p:sp>
@@ -3139,7 +3152,10 @@
             <a:lstStyle/>
             <a:p>
               <a:pPr algn="ctr"/>
-              <a:endParaRPr lang="de-DE"/>
+              <a:endParaRPr lang="de-DE">
+                <a:latin typeface="Roboto" panose="02000000000000000000" pitchFamily="2" charset="0"/>
+                <a:ea typeface="Roboto" panose="02000000000000000000" pitchFamily="2" charset="0"/>
+              </a:endParaRPr>
             </a:p>
           </p:txBody>
         </p:sp>
@@ -3198,7 +3214,10 @@
             <a:lstStyle/>
             <a:p>
               <a:pPr algn="ctr"/>
-              <a:endParaRPr lang="de-DE"/>
+              <a:endParaRPr lang="de-DE">
+                <a:latin typeface="Roboto" panose="02000000000000000000" pitchFamily="2" charset="0"/>
+                <a:ea typeface="Roboto" panose="02000000000000000000" pitchFamily="2" charset="0"/>
+              </a:endParaRPr>
             </a:p>
           </p:txBody>
         </p:sp>
@@ -3450,7 +3469,10 @@
             <a:lstStyle/>
             <a:p>
               <a:pPr algn="ctr"/>
-              <a:endParaRPr lang="de-DE"/>
+              <a:endParaRPr lang="de-DE">
+                <a:latin typeface="Roboto" panose="02000000000000000000" pitchFamily="2" charset="0"/>
+                <a:ea typeface="Roboto" panose="02000000000000000000" pitchFamily="2" charset="0"/>
+              </a:endParaRPr>
             </a:p>
           </p:txBody>
         </p:sp>
@@ -3511,7 +3533,10 @@
             <a:lstStyle/>
             <a:p>
               <a:pPr algn="ctr"/>
-              <a:endParaRPr lang="de-DE"/>
+              <a:endParaRPr lang="de-DE">
+                <a:latin typeface="Roboto" panose="02000000000000000000" pitchFamily="2" charset="0"/>
+                <a:ea typeface="Roboto" panose="02000000000000000000" pitchFamily="2" charset="0"/>
+              </a:endParaRPr>
             </a:p>
           </p:txBody>
         </p:sp>
@@ -3570,7 +3595,10 @@
             <a:lstStyle/>
             <a:p>
               <a:pPr algn="ctr"/>
-              <a:endParaRPr lang="de-DE"/>
+              <a:endParaRPr lang="de-DE">
+                <a:latin typeface="Roboto" panose="02000000000000000000" pitchFamily="2" charset="0"/>
+                <a:ea typeface="Roboto" panose="02000000000000000000" pitchFamily="2" charset="0"/>
+              </a:endParaRPr>
             </a:p>
           </p:txBody>
         </p:sp>
@@ -3629,7 +3657,10 @@
             <a:lstStyle/>
             <a:p>
               <a:pPr algn="ctr"/>
-              <a:endParaRPr lang="de-DE"/>
+              <a:endParaRPr lang="de-DE">
+                <a:latin typeface="Roboto" panose="02000000000000000000" pitchFamily="2" charset="0"/>
+                <a:ea typeface="Roboto" panose="02000000000000000000" pitchFamily="2" charset="0"/>
+              </a:endParaRPr>
             </a:p>
           </p:txBody>
         </p:sp>
@@ -3881,7 +3912,10 @@
             <a:lstStyle/>
             <a:p>
               <a:pPr algn="ctr"/>
-              <a:endParaRPr lang="de-DE"/>
+              <a:endParaRPr lang="de-DE">
+                <a:latin typeface="Roboto" panose="02000000000000000000" pitchFamily="2" charset="0"/>
+                <a:ea typeface="Roboto" panose="02000000000000000000" pitchFamily="2" charset="0"/>
+              </a:endParaRPr>
             </a:p>
           </p:txBody>
         </p:sp>
@@ -3940,7 +3974,10 @@
             <a:lstStyle/>
             <a:p>
               <a:pPr algn="ctr"/>
-              <a:endParaRPr lang="de-DE"/>
+              <a:endParaRPr lang="de-DE">
+                <a:latin typeface="Roboto" panose="02000000000000000000" pitchFamily="2" charset="0"/>
+                <a:ea typeface="Roboto" panose="02000000000000000000" pitchFamily="2" charset="0"/>
+              </a:endParaRPr>
             </a:p>
           </p:txBody>
         </p:sp>
@@ -3999,7 +4036,10 @@
             <a:lstStyle/>
             <a:p>
               <a:pPr algn="ctr"/>
-              <a:endParaRPr lang="de-DE"/>
+              <a:endParaRPr lang="de-DE">
+                <a:latin typeface="Roboto" panose="02000000000000000000" pitchFamily="2" charset="0"/>
+                <a:ea typeface="Roboto" panose="02000000000000000000" pitchFamily="2" charset="0"/>
+              </a:endParaRPr>
             </a:p>
           </p:txBody>
         </p:sp>
@@ -4058,7 +4098,10 @@
             <a:lstStyle/>
             <a:p>
               <a:pPr algn="ctr"/>
-              <a:endParaRPr lang="de-DE"/>
+              <a:endParaRPr lang="de-DE">
+                <a:latin typeface="Roboto" panose="02000000000000000000" pitchFamily="2" charset="0"/>
+                <a:ea typeface="Roboto" panose="02000000000000000000" pitchFamily="2" charset="0"/>
+              </a:endParaRPr>
             </a:p>
           </p:txBody>
         </p:sp>
@@ -4310,7 +4353,10 @@
             <a:lstStyle/>
             <a:p>
               <a:pPr algn="ctr"/>
-              <a:endParaRPr lang="de-DE"/>
+              <a:endParaRPr lang="de-DE">
+                <a:latin typeface="Roboto" panose="02000000000000000000" pitchFamily="2" charset="0"/>
+                <a:ea typeface="Roboto" panose="02000000000000000000" pitchFamily="2" charset="0"/>
+              </a:endParaRPr>
             </a:p>
           </p:txBody>
         </p:sp>
@@ -4369,7 +4415,10 @@
             <a:lstStyle/>
             <a:p>
               <a:pPr algn="ctr"/>
-              <a:endParaRPr lang="de-DE"/>
+              <a:endParaRPr lang="de-DE">
+                <a:latin typeface="Roboto" panose="02000000000000000000" pitchFamily="2" charset="0"/>
+                <a:ea typeface="Roboto" panose="02000000000000000000" pitchFamily="2" charset="0"/>
+              </a:endParaRPr>
             </a:p>
           </p:txBody>
         </p:sp>
@@ -4428,7 +4477,10 @@
             <a:lstStyle/>
             <a:p>
               <a:pPr algn="ctr"/>
-              <a:endParaRPr lang="de-DE"/>
+              <a:endParaRPr lang="de-DE">
+                <a:latin typeface="Roboto" panose="02000000000000000000" pitchFamily="2" charset="0"/>
+                <a:ea typeface="Roboto" panose="02000000000000000000" pitchFamily="2" charset="0"/>
+              </a:endParaRPr>
             </a:p>
           </p:txBody>
         </p:sp>
@@ -4487,7 +4539,10 @@
             <a:lstStyle/>
             <a:p>
               <a:pPr algn="ctr"/>
-              <a:endParaRPr lang="de-DE"/>
+              <a:endParaRPr lang="de-DE">
+                <a:latin typeface="Roboto" panose="02000000000000000000" pitchFamily="2" charset="0"/>
+                <a:ea typeface="Roboto" panose="02000000000000000000" pitchFamily="2" charset="0"/>
+              </a:endParaRPr>
             </a:p>
           </p:txBody>
         </p:sp>
@@ -4739,7 +4794,10 @@
             <a:lstStyle/>
             <a:p>
               <a:pPr algn="ctr"/>
-              <a:endParaRPr lang="de-DE"/>
+              <a:endParaRPr lang="de-DE">
+                <a:latin typeface="Roboto" panose="02000000000000000000" pitchFamily="2" charset="0"/>
+                <a:ea typeface="Roboto" panose="02000000000000000000" pitchFamily="2" charset="0"/>
+              </a:endParaRPr>
             </a:p>
           </p:txBody>
         </p:sp>
@@ -4798,7 +4856,10 @@
             <a:lstStyle/>
             <a:p>
               <a:pPr algn="ctr"/>
-              <a:endParaRPr lang="de-DE"/>
+              <a:endParaRPr lang="de-DE">
+                <a:latin typeface="Roboto" panose="02000000000000000000" pitchFamily="2" charset="0"/>
+                <a:ea typeface="Roboto" panose="02000000000000000000" pitchFamily="2" charset="0"/>
+              </a:endParaRPr>
             </a:p>
           </p:txBody>
         </p:sp>
@@ -4857,7 +4918,10 @@
             <a:lstStyle/>
             <a:p>
               <a:pPr algn="ctr"/>
-              <a:endParaRPr lang="de-DE"/>
+              <a:endParaRPr lang="de-DE">
+                <a:latin typeface="Roboto" panose="02000000000000000000" pitchFamily="2" charset="0"/>
+                <a:ea typeface="Roboto" panose="02000000000000000000" pitchFamily="2" charset="0"/>
+              </a:endParaRPr>
             </a:p>
           </p:txBody>
         </p:sp>
@@ -4916,7 +4980,10 @@
             <a:lstStyle/>
             <a:p>
               <a:pPr algn="ctr"/>
-              <a:endParaRPr lang="de-DE"/>
+              <a:endParaRPr lang="de-DE">
+                <a:latin typeface="Roboto" panose="02000000000000000000" pitchFamily="2" charset="0"/>
+                <a:ea typeface="Roboto" panose="02000000000000000000" pitchFamily="2" charset="0"/>
+              </a:endParaRPr>
             </a:p>
           </p:txBody>
         </p:sp>
@@ -5168,7 +5235,10 @@
             <a:lstStyle/>
             <a:p>
               <a:pPr algn="ctr"/>
-              <a:endParaRPr lang="de-DE"/>
+              <a:endParaRPr lang="de-DE">
+                <a:latin typeface="Roboto" panose="02000000000000000000" pitchFamily="2" charset="0"/>
+                <a:ea typeface="Roboto" panose="02000000000000000000" pitchFamily="2" charset="0"/>
+              </a:endParaRPr>
             </a:p>
           </p:txBody>
         </p:sp>
@@ -5227,7 +5297,10 @@
             <a:lstStyle/>
             <a:p>
               <a:pPr algn="ctr"/>
-              <a:endParaRPr lang="de-DE"/>
+              <a:endParaRPr lang="de-DE">
+                <a:latin typeface="Roboto" panose="02000000000000000000" pitchFamily="2" charset="0"/>
+                <a:ea typeface="Roboto" panose="02000000000000000000" pitchFamily="2" charset="0"/>
+              </a:endParaRPr>
             </a:p>
           </p:txBody>
         </p:sp>
@@ -5286,7 +5359,10 @@
             <a:lstStyle/>
             <a:p>
               <a:pPr algn="ctr"/>
-              <a:endParaRPr lang="de-DE"/>
+              <a:endParaRPr lang="de-DE">
+                <a:latin typeface="Roboto" panose="02000000000000000000" pitchFamily="2" charset="0"/>
+                <a:ea typeface="Roboto" panose="02000000000000000000" pitchFamily="2" charset="0"/>
+              </a:endParaRPr>
             </a:p>
           </p:txBody>
         </p:sp>
@@ -5345,7 +5421,10 @@
             <a:lstStyle/>
             <a:p>
               <a:pPr algn="ctr"/>
-              <a:endParaRPr lang="de-DE"/>
+              <a:endParaRPr lang="de-DE">
+                <a:latin typeface="Roboto" panose="02000000000000000000" pitchFamily="2" charset="0"/>
+                <a:ea typeface="Roboto" panose="02000000000000000000" pitchFamily="2" charset="0"/>
+              </a:endParaRPr>
             </a:p>
           </p:txBody>
         </p:sp>
@@ -5608,7 +5687,10 @@
           <a:lstStyle/>
           <a:p>
             <a:pPr algn="ctr"/>
-            <a:endParaRPr lang="de-DE"/>
+            <a:endParaRPr lang="de-DE">
+              <a:latin typeface="Roboto" panose="02000000000000000000" pitchFamily="2" charset="0"/>
+              <a:ea typeface="Roboto" panose="02000000000000000000" pitchFamily="2" charset="0"/>
+            </a:endParaRPr>
           </a:p>
         </p:txBody>
       </p:sp>
@@ -5667,7 +5749,10 @@
           <a:lstStyle/>
           <a:p>
             <a:pPr algn="ctr"/>
-            <a:endParaRPr lang="de-DE"/>
+            <a:endParaRPr lang="de-DE">
+              <a:latin typeface="Roboto" panose="02000000000000000000" pitchFamily="2" charset="0"/>
+              <a:ea typeface="Roboto" panose="02000000000000000000" pitchFamily="2" charset="0"/>
+            </a:endParaRPr>
           </a:p>
         </p:txBody>
       </p:sp>
@@ -5726,7 +5811,10 @@
           <a:lstStyle/>
           <a:p>
             <a:pPr algn="ctr"/>
-            <a:endParaRPr lang="de-DE"/>
+            <a:endParaRPr lang="de-DE">
+              <a:latin typeface="Roboto" panose="02000000000000000000" pitchFamily="2" charset="0"/>
+              <a:ea typeface="Roboto" panose="02000000000000000000" pitchFamily="2" charset="0"/>
+            </a:endParaRPr>
           </a:p>
         </p:txBody>
       </p:sp>
@@ -5787,7 +5875,10 @@
           <a:lstStyle/>
           <a:p>
             <a:pPr algn="ctr"/>
-            <a:endParaRPr lang="de-DE"/>
+            <a:endParaRPr lang="de-DE">
+              <a:latin typeface="Roboto" panose="02000000000000000000" pitchFamily="2" charset="0"/>
+              <a:ea typeface="Roboto" panose="02000000000000000000" pitchFamily="2" charset="0"/>
+            </a:endParaRPr>
           </a:p>
         </p:txBody>
       </p:sp>
@@ -6033,7 +6124,10 @@
           <a:lstStyle/>
           <a:p>
             <a:pPr algn="ctr"/>
-            <a:endParaRPr lang="de-DE"/>
+            <a:endParaRPr lang="de-DE">
+              <a:latin typeface="Roboto" panose="02000000000000000000" pitchFamily="2" charset="0"/>
+              <a:ea typeface="Roboto" panose="02000000000000000000" pitchFamily="2" charset="0"/>
+            </a:endParaRPr>
           </a:p>
         </p:txBody>
       </p:sp>
@@ -6094,7 +6188,10 @@
           <a:lstStyle/>
           <a:p>
             <a:pPr algn="ctr"/>
-            <a:endParaRPr lang="de-DE"/>
+            <a:endParaRPr lang="de-DE">
+              <a:latin typeface="Roboto" panose="02000000000000000000" pitchFamily="2" charset="0"/>
+              <a:ea typeface="Roboto" panose="02000000000000000000" pitchFamily="2" charset="0"/>
+            </a:endParaRPr>
           </a:p>
         </p:txBody>
       </p:sp>
@@ -6155,7 +6252,10 @@
           <a:lstStyle/>
           <a:p>
             <a:pPr algn="ctr"/>
-            <a:endParaRPr lang="de-DE"/>
+            <a:endParaRPr lang="de-DE">
+              <a:latin typeface="Roboto" panose="02000000000000000000" pitchFamily="2" charset="0"/>
+              <a:ea typeface="Roboto" panose="02000000000000000000" pitchFamily="2" charset="0"/>
+            </a:endParaRPr>
           </a:p>
         </p:txBody>
       </p:sp>
@@ -6216,7 +6316,10 @@
           <a:lstStyle/>
           <a:p>
             <a:pPr algn="ctr"/>
-            <a:endParaRPr lang="de-DE"/>
+            <a:endParaRPr lang="de-DE">
+              <a:latin typeface="Roboto" panose="02000000000000000000" pitchFamily="2" charset="0"/>
+              <a:ea typeface="Roboto" panose="02000000000000000000" pitchFamily="2" charset="0"/>
+            </a:endParaRPr>
           </a:p>
         </p:txBody>
       </p:sp>
@@ -6447,7 +6550,10 @@
           <a:lstStyle/>
           <a:p>
             <a:pPr algn="ctr"/>
-            <a:endParaRPr lang="de-DE"/>
+            <a:endParaRPr lang="de-DE">
+              <a:latin typeface="Roboto" panose="02000000000000000000" pitchFamily="2" charset="0"/>
+              <a:ea typeface="Roboto" panose="02000000000000000000" pitchFamily="2" charset="0"/>
+            </a:endParaRPr>
           </a:p>
         </p:txBody>
       </p:sp>
@@ -6506,7 +6612,10 @@
           <a:lstStyle/>
           <a:p>
             <a:pPr algn="ctr"/>
-            <a:endParaRPr lang="de-DE"/>
+            <a:endParaRPr lang="de-DE">
+              <a:latin typeface="Roboto" panose="02000000000000000000" pitchFamily="2" charset="0"/>
+              <a:ea typeface="Roboto" panose="02000000000000000000" pitchFamily="2" charset="0"/>
+            </a:endParaRPr>
           </a:p>
         </p:txBody>
       </p:sp>
@@ -6565,7 +6674,10 @@
           <a:lstStyle/>
           <a:p>
             <a:pPr algn="ctr"/>
-            <a:endParaRPr lang="de-DE"/>
+            <a:endParaRPr lang="de-DE">
+              <a:latin typeface="Roboto" panose="02000000000000000000" pitchFamily="2" charset="0"/>
+              <a:ea typeface="Roboto" panose="02000000000000000000" pitchFamily="2" charset="0"/>
+            </a:endParaRPr>
           </a:p>
         </p:txBody>
       </p:sp>
@@ -6624,7 +6736,10 @@
           <a:lstStyle/>
           <a:p>
             <a:pPr algn="ctr"/>
-            <a:endParaRPr lang="de-DE"/>
+            <a:endParaRPr lang="de-DE">
+              <a:latin typeface="Roboto" panose="02000000000000000000" pitchFamily="2" charset="0"/>
+              <a:ea typeface="Roboto" panose="02000000000000000000" pitchFamily="2" charset="0"/>
+            </a:endParaRPr>
           </a:p>
         </p:txBody>
       </p:sp>
@@ -7207,6 +7322,2033 @@
     <p:extLst>
       <p:ext uri="{BB962C8B-B14F-4D97-AF65-F5344CB8AC3E}">
         <p14:creationId xmlns:p14="http://schemas.microsoft.com/office/powerpoint/2010/main" val="314736988"/>
+      </p:ext>
+    </p:extLst>
+  </p:cSld>
+  <p:clrMapOvr>
+    <a:masterClrMapping/>
+  </p:clrMapOvr>
+</p:sld>
+</file>
+
+<file path=ppt/slides/slide4.xml><?xml version="1.0" encoding="utf-8"?>
+<p:sld xmlns:a="http://schemas.openxmlformats.org/drawingml/2006/main" xmlns:r="http://schemas.openxmlformats.org/officeDocument/2006/relationships" xmlns:p="http://schemas.openxmlformats.org/presentationml/2006/main">
+  <p:cSld>
+    <p:spTree>
+      <p:nvGrpSpPr>
+        <p:cNvPr id="1" name=""/>
+        <p:cNvGrpSpPr/>
+        <p:nvPr/>
+      </p:nvGrpSpPr>
+      <p:grpSpPr>
+        <a:xfrm>
+          <a:off x="0" y="0"/>
+          <a:ext cx="0" cy="0"/>
+          <a:chOff x="0" y="0"/>
+          <a:chExt cx="0" cy="0"/>
+        </a:xfrm>
+      </p:grpSpPr>
+      <p:grpSp>
+        <p:nvGrpSpPr>
+          <p:cNvPr id="26" name="Group 25">
+            <a:extLst>
+              <a:ext uri="{FF2B5EF4-FFF2-40B4-BE49-F238E27FC236}">
+                <a16:creationId xmlns:a16="http://schemas.microsoft.com/office/drawing/2014/main" id="{BA306B71-436C-D44E-B12D-D13EB29BD78C}"/>
+              </a:ext>
+            </a:extLst>
+          </p:cNvPr>
+          <p:cNvGrpSpPr/>
+          <p:nvPr/>
+        </p:nvGrpSpPr>
+        <p:grpSpPr>
+          <a:xfrm>
+            <a:off x="805266" y="121968"/>
+            <a:ext cx="2531270" cy="2085797"/>
+            <a:chOff x="658673" y="468335"/>
+            <a:chExt cx="2531270" cy="2085797"/>
+          </a:xfrm>
+        </p:grpSpPr>
+        <p:sp>
+          <p:nvSpPr>
+            <p:cNvPr id="5" name="Oval 4">
+              <a:extLst>
+                <a:ext uri="{FF2B5EF4-FFF2-40B4-BE49-F238E27FC236}">
+                  <a16:creationId xmlns:a16="http://schemas.microsoft.com/office/drawing/2014/main" id="{60A43397-65C7-9647-95BE-F999055C96EE}"/>
+                </a:ext>
+              </a:extLst>
+            </p:cNvPr>
+            <p:cNvSpPr/>
+            <p:nvPr/>
+          </p:nvSpPr>
+          <p:spPr>
+            <a:xfrm>
+              <a:off x="1627783" y="852374"/>
+              <a:ext cx="594360" cy="338933"/>
+            </a:xfrm>
+            <a:prstGeom prst="ellipse">
+              <a:avLst/>
+            </a:prstGeom>
+            <a:solidFill>
+              <a:schemeClr val="bg2"/>
+            </a:solidFill>
+            <a:ln>
+              <a:solidFill>
+                <a:schemeClr val="tx1"/>
+              </a:solidFill>
+            </a:ln>
+          </p:spPr>
+          <p:style>
+            <a:lnRef idx="2">
+              <a:schemeClr val="accent1">
+                <a:shade val="50000"/>
+              </a:schemeClr>
+            </a:lnRef>
+            <a:fillRef idx="1">
+              <a:schemeClr val="accent1"/>
+            </a:fillRef>
+            <a:effectRef idx="0">
+              <a:schemeClr val="accent1"/>
+            </a:effectRef>
+            <a:fontRef idx="minor">
+              <a:schemeClr val="lt1"/>
+            </a:fontRef>
+          </p:style>
+          <p:txBody>
+            <a:bodyPr rot="0" spcFirstLastPara="0" vertOverflow="overflow" horzOverflow="overflow" vert="horz" wrap="square" lIns="91440" tIns="45720" rIns="91440" bIns="45720" numCol="1" spcCol="0" rtlCol="0" fromWordArt="0" anchor="ctr" anchorCtr="0" forceAA="0" compatLnSpc="1">
+              <a:prstTxWarp prst="textNoShape">
+                <a:avLst/>
+              </a:prstTxWarp>
+              <a:noAutofit/>
+            </a:bodyPr>
+            <a:lstStyle/>
+            <a:p>
+              <a:pPr algn="ctr"/>
+              <a:endParaRPr lang="de-DE">
+                <a:latin typeface="Roboto" panose="02000000000000000000" pitchFamily="2" charset="0"/>
+                <a:ea typeface="Roboto" panose="02000000000000000000" pitchFamily="2" charset="0"/>
+              </a:endParaRPr>
+            </a:p>
+          </p:txBody>
+        </p:sp>
+        <p:sp>
+          <p:nvSpPr>
+            <p:cNvPr id="6" name="Oval 5">
+              <a:extLst>
+                <a:ext uri="{FF2B5EF4-FFF2-40B4-BE49-F238E27FC236}">
+                  <a16:creationId xmlns:a16="http://schemas.microsoft.com/office/drawing/2014/main" id="{769B6B39-1FC9-9545-8340-11EFF67614E1}"/>
+                </a:ext>
+              </a:extLst>
+            </p:cNvPr>
+            <p:cNvSpPr/>
+            <p:nvPr/>
+          </p:nvSpPr>
+          <p:spPr>
+            <a:xfrm>
+              <a:off x="1627783" y="1618185"/>
+              <a:ext cx="594360" cy="338933"/>
+            </a:xfrm>
+            <a:prstGeom prst="ellipse">
+              <a:avLst/>
+            </a:prstGeom>
+            <a:solidFill>
+              <a:schemeClr val="bg2"/>
+            </a:solidFill>
+            <a:ln>
+              <a:solidFill>
+                <a:schemeClr val="tx1"/>
+              </a:solidFill>
+            </a:ln>
+          </p:spPr>
+          <p:style>
+            <a:lnRef idx="2">
+              <a:schemeClr val="accent1">
+                <a:shade val="50000"/>
+              </a:schemeClr>
+            </a:lnRef>
+            <a:fillRef idx="1">
+              <a:schemeClr val="accent1"/>
+            </a:fillRef>
+            <a:effectRef idx="0">
+              <a:schemeClr val="accent1"/>
+            </a:effectRef>
+            <a:fontRef idx="minor">
+              <a:schemeClr val="lt1"/>
+            </a:fontRef>
+          </p:style>
+          <p:txBody>
+            <a:bodyPr rot="0" spcFirstLastPara="0" vertOverflow="overflow" horzOverflow="overflow" vert="horz" wrap="square" lIns="91440" tIns="45720" rIns="91440" bIns="45720" numCol="1" spcCol="0" rtlCol="0" fromWordArt="0" anchor="ctr" anchorCtr="0" forceAA="0" compatLnSpc="1">
+              <a:prstTxWarp prst="textNoShape">
+                <a:avLst/>
+              </a:prstTxWarp>
+              <a:noAutofit/>
+            </a:bodyPr>
+            <a:lstStyle/>
+            <a:p>
+              <a:pPr algn="ctr"/>
+              <a:endParaRPr lang="de-DE">
+                <a:latin typeface="Roboto" panose="02000000000000000000" pitchFamily="2" charset="0"/>
+                <a:ea typeface="Roboto" panose="02000000000000000000" pitchFamily="2" charset="0"/>
+              </a:endParaRPr>
+            </a:p>
+          </p:txBody>
+        </p:sp>
+        <p:sp>
+          <p:nvSpPr>
+            <p:cNvPr id="7" name="Oval 6">
+              <a:extLst>
+                <a:ext uri="{FF2B5EF4-FFF2-40B4-BE49-F238E27FC236}">
+                  <a16:creationId xmlns:a16="http://schemas.microsoft.com/office/drawing/2014/main" id="{65914374-92C7-4F43-B48C-9B60C7C01741}"/>
+                </a:ext>
+              </a:extLst>
+            </p:cNvPr>
+            <p:cNvSpPr/>
+            <p:nvPr/>
+          </p:nvSpPr>
+          <p:spPr>
+            <a:xfrm>
+              <a:off x="852167" y="1618185"/>
+              <a:ext cx="594360" cy="338933"/>
+            </a:xfrm>
+            <a:prstGeom prst="ellipse">
+              <a:avLst/>
+            </a:prstGeom>
+            <a:solidFill>
+              <a:schemeClr val="bg2"/>
+            </a:solidFill>
+            <a:ln>
+              <a:solidFill>
+                <a:schemeClr val="tx1"/>
+              </a:solidFill>
+            </a:ln>
+          </p:spPr>
+          <p:style>
+            <a:lnRef idx="2">
+              <a:schemeClr val="accent1">
+                <a:shade val="50000"/>
+              </a:schemeClr>
+            </a:lnRef>
+            <a:fillRef idx="1">
+              <a:schemeClr val="accent1"/>
+            </a:fillRef>
+            <a:effectRef idx="0">
+              <a:schemeClr val="accent1"/>
+            </a:effectRef>
+            <a:fontRef idx="minor">
+              <a:schemeClr val="lt1"/>
+            </a:fontRef>
+          </p:style>
+          <p:txBody>
+            <a:bodyPr rot="0" spcFirstLastPara="0" vertOverflow="overflow" horzOverflow="overflow" vert="horz" wrap="square" lIns="91440" tIns="45720" rIns="91440" bIns="45720" numCol="1" spcCol="0" rtlCol="0" fromWordArt="0" anchor="ctr" anchorCtr="0" forceAA="0" compatLnSpc="1">
+              <a:prstTxWarp prst="textNoShape">
+                <a:avLst/>
+              </a:prstTxWarp>
+              <a:noAutofit/>
+            </a:bodyPr>
+            <a:lstStyle/>
+            <a:p>
+              <a:pPr algn="ctr"/>
+              <a:endParaRPr lang="de-DE">
+                <a:latin typeface="Roboto" panose="02000000000000000000" pitchFamily="2" charset="0"/>
+                <a:ea typeface="Roboto" panose="02000000000000000000" pitchFamily="2" charset="0"/>
+              </a:endParaRPr>
+            </a:p>
+          </p:txBody>
+        </p:sp>
+        <p:sp>
+          <p:nvSpPr>
+            <p:cNvPr id="8" name="Oval 7">
+              <a:extLst>
+                <a:ext uri="{FF2B5EF4-FFF2-40B4-BE49-F238E27FC236}">
+                  <a16:creationId xmlns:a16="http://schemas.microsoft.com/office/drawing/2014/main" id="{EC5C5F80-1563-AE4C-8B4E-10BA53F42B87}"/>
+                </a:ext>
+              </a:extLst>
+            </p:cNvPr>
+            <p:cNvSpPr/>
+            <p:nvPr/>
+          </p:nvSpPr>
+          <p:spPr>
+            <a:xfrm>
+              <a:off x="2403399" y="1618185"/>
+              <a:ext cx="594360" cy="338933"/>
+            </a:xfrm>
+            <a:prstGeom prst="ellipse">
+              <a:avLst/>
+            </a:prstGeom>
+            <a:solidFill>
+              <a:schemeClr val="bg2"/>
+            </a:solidFill>
+            <a:ln>
+              <a:solidFill>
+                <a:schemeClr val="tx1"/>
+              </a:solidFill>
+            </a:ln>
+          </p:spPr>
+          <p:style>
+            <a:lnRef idx="2">
+              <a:schemeClr val="accent1">
+                <a:shade val="50000"/>
+              </a:schemeClr>
+            </a:lnRef>
+            <a:fillRef idx="1">
+              <a:schemeClr val="accent1"/>
+            </a:fillRef>
+            <a:effectRef idx="0">
+              <a:schemeClr val="accent1"/>
+            </a:effectRef>
+            <a:fontRef idx="minor">
+              <a:schemeClr val="lt1"/>
+            </a:fontRef>
+          </p:style>
+          <p:txBody>
+            <a:bodyPr rot="0" spcFirstLastPara="0" vertOverflow="overflow" horzOverflow="overflow" vert="horz" wrap="square" lIns="91440" tIns="45720" rIns="91440" bIns="45720" numCol="1" spcCol="0" rtlCol="0" fromWordArt="0" anchor="ctr" anchorCtr="0" forceAA="0" compatLnSpc="1">
+              <a:prstTxWarp prst="textNoShape">
+                <a:avLst/>
+              </a:prstTxWarp>
+              <a:noAutofit/>
+            </a:bodyPr>
+            <a:lstStyle/>
+            <a:p>
+              <a:pPr algn="ctr"/>
+              <a:endParaRPr lang="de-DE">
+                <a:latin typeface="Roboto" panose="02000000000000000000" pitchFamily="2" charset="0"/>
+                <a:ea typeface="Roboto" panose="02000000000000000000" pitchFamily="2" charset="0"/>
+              </a:endParaRPr>
+            </a:p>
+          </p:txBody>
+        </p:sp>
+        <p:cxnSp>
+          <p:nvCxnSpPr>
+            <p:cNvPr id="9" name="Straight Arrow Connector 8">
+              <a:extLst>
+                <a:ext uri="{FF2B5EF4-FFF2-40B4-BE49-F238E27FC236}">
+                  <a16:creationId xmlns:a16="http://schemas.microsoft.com/office/drawing/2014/main" id="{77BA8523-DC67-4648-A6AE-64809FC7AF86}"/>
+                </a:ext>
+              </a:extLst>
+            </p:cNvPr>
+            <p:cNvCxnSpPr>
+              <a:stCxn id="5" idx="4"/>
+            </p:cNvCxnSpPr>
+            <p:nvPr/>
+          </p:nvCxnSpPr>
+          <p:spPr>
+            <a:xfrm>
+              <a:off x="1924963" y="1191308"/>
+              <a:ext cx="0" cy="355701"/>
+            </a:xfrm>
+            <a:prstGeom prst="straightConnector1">
+              <a:avLst/>
+            </a:prstGeom>
+            <a:ln w="12700">
+              <a:solidFill>
+                <a:schemeClr val="tx1"/>
+              </a:solidFill>
+              <a:tailEnd type="triangle"/>
+            </a:ln>
+          </p:spPr>
+          <p:style>
+            <a:lnRef idx="1">
+              <a:schemeClr val="accent1"/>
+            </a:lnRef>
+            <a:fillRef idx="0">
+              <a:schemeClr val="accent1"/>
+            </a:fillRef>
+            <a:effectRef idx="0">
+              <a:schemeClr val="accent1"/>
+            </a:effectRef>
+            <a:fontRef idx="minor">
+              <a:schemeClr val="tx1"/>
+            </a:fontRef>
+          </p:style>
+        </p:cxnSp>
+        <p:cxnSp>
+          <p:nvCxnSpPr>
+            <p:cNvPr id="10" name="Straight Arrow Connector 9">
+              <a:extLst>
+                <a:ext uri="{FF2B5EF4-FFF2-40B4-BE49-F238E27FC236}">
+                  <a16:creationId xmlns:a16="http://schemas.microsoft.com/office/drawing/2014/main" id="{B4D1B4EF-FA2D-5C44-83E0-55803C258598}"/>
+                </a:ext>
+              </a:extLst>
+            </p:cNvPr>
+            <p:cNvCxnSpPr>
+              <a:cxnSpLocks noChangeAspect="1"/>
+              <a:stCxn id="5" idx="3"/>
+            </p:cNvCxnSpPr>
+            <p:nvPr/>
+          </p:nvCxnSpPr>
+          <p:spPr>
+            <a:xfrm flipH="1">
+              <a:off x="1363688" y="1141671"/>
+              <a:ext cx="350859" cy="400808"/>
+            </a:xfrm>
+            <a:prstGeom prst="straightConnector1">
+              <a:avLst/>
+            </a:prstGeom>
+            <a:ln w="12700">
+              <a:solidFill>
+                <a:schemeClr val="tx1"/>
+              </a:solidFill>
+              <a:tailEnd type="triangle"/>
+            </a:ln>
+          </p:spPr>
+          <p:style>
+            <a:lnRef idx="1">
+              <a:schemeClr val="accent1"/>
+            </a:lnRef>
+            <a:fillRef idx="0">
+              <a:schemeClr val="accent1"/>
+            </a:fillRef>
+            <a:effectRef idx="0">
+              <a:schemeClr val="accent1"/>
+            </a:effectRef>
+            <a:fontRef idx="minor">
+              <a:schemeClr val="tx1"/>
+            </a:fontRef>
+          </p:style>
+        </p:cxnSp>
+        <p:cxnSp>
+          <p:nvCxnSpPr>
+            <p:cNvPr id="11" name="Straight Arrow Connector 10">
+              <a:extLst>
+                <a:ext uri="{FF2B5EF4-FFF2-40B4-BE49-F238E27FC236}">
+                  <a16:creationId xmlns:a16="http://schemas.microsoft.com/office/drawing/2014/main" id="{5D3846B4-7768-5146-8FCF-7FF6A4DEF313}"/>
+                </a:ext>
+              </a:extLst>
+            </p:cNvPr>
+            <p:cNvCxnSpPr>
+              <a:cxnSpLocks noChangeAspect="1"/>
+            </p:cNvCxnSpPr>
+            <p:nvPr/>
+          </p:nvCxnSpPr>
+          <p:spPr>
+            <a:xfrm>
+              <a:off x="2138002" y="1141671"/>
+              <a:ext cx="350859" cy="400808"/>
+            </a:xfrm>
+            <a:prstGeom prst="straightConnector1">
+              <a:avLst/>
+            </a:prstGeom>
+            <a:ln w="12700">
+              <a:solidFill>
+                <a:schemeClr val="tx1"/>
+              </a:solidFill>
+              <a:tailEnd type="triangle"/>
+            </a:ln>
+          </p:spPr>
+          <p:style>
+            <a:lnRef idx="1">
+              <a:schemeClr val="accent1"/>
+            </a:lnRef>
+            <a:fillRef idx="0">
+              <a:schemeClr val="accent1"/>
+            </a:fillRef>
+            <a:effectRef idx="0">
+              <a:schemeClr val="accent1"/>
+            </a:effectRef>
+            <a:fontRef idx="minor">
+              <a:schemeClr val="tx1"/>
+            </a:fontRef>
+          </p:style>
+        </p:cxnSp>
+        <p:sp>
+          <p:nvSpPr>
+            <p:cNvPr id="12" name="TextBox 11">
+              <a:extLst>
+                <a:ext uri="{FF2B5EF4-FFF2-40B4-BE49-F238E27FC236}">
+                  <a16:creationId xmlns:a16="http://schemas.microsoft.com/office/drawing/2014/main" id="{2063E945-7061-774D-9904-0A360EFF1D13}"/>
+                </a:ext>
+              </a:extLst>
+            </p:cNvPr>
+            <p:cNvSpPr txBox="1"/>
+            <p:nvPr/>
+          </p:nvSpPr>
+          <p:spPr>
+            <a:xfrm>
+              <a:off x="1411055" y="468335"/>
+              <a:ext cx="1027845" cy="369332"/>
+            </a:xfrm>
+            <a:prstGeom prst="rect">
+              <a:avLst/>
+            </a:prstGeom>
+            <a:noFill/>
+          </p:spPr>
+          <p:txBody>
+            <a:bodyPr wrap="none" rtlCol="0">
+              <a:spAutoFit/>
+            </a:bodyPr>
+            <a:lstStyle/>
+            <a:p>
+              <a:pPr algn="ctr"/>
+              <a:r>
+                <a:rPr lang="de-DE">
+                  <a:latin typeface="Roboto" panose="02000000000000000000" pitchFamily="2" charset="0"/>
+                  <a:ea typeface="Roboto" panose="02000000000000000000" pitchFamily="2" charset="0"/>
+                </a:rPr>
+                <a:t>PBKDF2</a:t>
+              </a:r>
+            </a:p>
+          </p:txBody>
+        </p:sp>
+        <p:sp>
+          <p:nvSpPr>
+            <p:cNvPr id="13" name="TextBox 12">
+              <a:extLst>
+                <a:ext uri="{FF2B5EF4-FFF2-40B4-BE49-F238E27FC236}">
+                  <a16:creationId xmlns:a16="http://schemas.microsoft.com/office/drawing/2014/main" id="{0BE8961A-933F-3D47-A4BC-7C5DA5B5FD37}"/>
+                </a:ext>
+              </a:extLst>
+            </p:cNvPr>
+            <p:cNvSpPr txBox="1"/>
+            <p:nvPr/>
+          </p:nvSpPr>
+          <p:spPr>
+            <a:xfrm>
+              <a:off x="658673" y="1969357"/>
+              <a:ext cx="981359" cy="584775"/>
+            </a:xfrm>
+            <a:prstGeom prst="rect">
+              <a:avLst/>
+            </a:prstGeom>
+            <a:noFill/>
+          </p:spPr>
+          <p:txBody>
+            <a:bodyPr wrap="none" rtlCol="0">
+              <a:spAutoFit/>
+            </a:bodyPr>
+            <a:lstStyle/>
+            <a:p>
+              <a:pPr algn="ctr"/>
+              <a:r>
+                <a:rPr lang="de-DE" sz="1600">
+                  <a:latin typeface="Roboto" panose="02000000000000000000" pitchFamily="2" charset="0"/>
+                  <a:ea typeface="Roboto" panose="02000000000000000000" pitchFamily="2" charset="0"/>
+                </a:rPr>
+                <a:t>Hash</a:t>
+              </a:r>
+              <a:br>
+                <a:rPr lang="de-DE" sz="1600">
+                  <a:latin typeface="Roboto" panose="02000000000000000000" pitchFamily="2" charset="0"/>
+                  <a:ea typeface="Roboto" panose="02000000000000000000" pitchFamily="2" charset="0"/>
+                </a:rPr>
+              </a:br>
+              <a:r>
+                <a:rPr lang="de-DE" sz="1600">
+                  <a:latin typeface="Roboto" panose="02000000000000000000" pitchFamily="2" charset="0"/>
+                  <a:ea typeface="Roboto" panose="02000000000000000000" pitchFamily="2" charset="0"/>
+                </a:rPr>
+                <a:t>Function</a:t>
+              </a:r>
+            </a:p>
+          </p:txBody>
+        </p:sp>
+        <p:sp>
+          <p:nvSpPr>
+            <p:cNvPr id="14" name="TextBox 13">
+              <a:extLst>
+                <a:ext uri="{FF2B5EF4-FFF2-40B4-BE49-F238E27FC236}">
+                  <a16:creationId xmlns:a16="http://schemas.microsoft.com/office/drawing/2014/main" id="{56EB4E2D-E070-654D-BD44-75AF41B43E7C}"/>
+                </a:ext>
+              </a:extLst>
+            </p:cNvPr>
+            <p:cNvSpPr txBox="1"/>
+            <p:nvPr/>
+          </p:nvSpPr>
+          <p:spPr>
+            <a:xfrm>
+              <a:off x="1658008" y="1969357"/>
+              <a:ext cx="535724" cy="338554"/>
+            </a:xfrm>
+            <a:prstGeom prst="rect">
+              <a:avLst/>
+            </a:prstGeom>
+            <a:noFill/>
+          </p:spPr>
+          <p:txBody>
+            <a:bodyPr wrap="none" rtlCol="0">
+              <a:spAutoFit/>
+            </a:bodyPr>
+            <a:lstStyle/>
+            <a:p>
+              <a:pPr algn="ctr"/>
+              <a:r>
+                <a:rPr lang="de-DE" sz="1600">
+                  <a:latin typeface="Roboto" panose="02000000000000000000" pitchFamily="2" charset="0"/>
+                  <a:ea typeface="Roboto" panose="02000000000000000000" pitchFamily="2" charset="0"/>
+                </a:rPr>
+                <a:t>Salt</a:t>
+              </a:r>
+            </a:p>
+          </p:txBody>
+        </p:sp>
+        <p:sp>
+          <p:nvSpPr>
+            <p:cNvPr id="15" name="TextBox 14">
+              <a:extLst>
+                <a:ext uri="{FF2B5EF4-FFF2-40B4-BE49-F238E27FC236}">
+                  <a16:creationId xmlns:a16="http://schemas.microsoft.com/office/drawing/2014/main" id="{99694075-E9DB-B444-A596-A14939269091}"/>
+                </a:ext>
+              </a:extLst>
+            </p:cNvPr>
+            <p:cNvSpPr txBox="1"/>
+            <p:nvPr/>
+          </p:nvSpPr>
+          <p:spPr>
+            <a:xfrm>
+              <a:off x="2243851" y="1969357"/>
+              <a:ext cx="946092" cy="584775"/>
+            </a:xfrm>
+            <a:prstGeom prst="rect">
+              <a:avLst/>
+            </a:prstGeom>
+            <a:noFill/>
+          </p:spPr>
+          <p:txBody>
+            <a:bodyPr wrap="none" rtlCol="0">
+              <a:spAutoFit/>
+            </a:bodyPr>
+            <a:lstStyle/>
+            <a:p>
+              <a:pPr algn="ctr"/>
+              <a:r>
+                <a:rPr lang="de-DE" sz="1600">
+                  <a:latin typeface="Roboto" panose="02000000000000000000" pitchFamily="2" charset="0"/>
+                  <a:ea typeface="Roboto" panose="02000000000000000000" pitchFamily="2" charset="0"/>
+                </a:rPr>
+                <a:t>Iteration</a:t>
+              </a:r>
+              <a:br>
+                <a:rPr lang="de-DE" sz="1600">
+                  <a:latin typeface="Roboto" panose="02000000000000000000" pitchFamily="2" charset="0"/>
+                  <a:ea typeface="Roboto" panose="02000000000000000000" pitchFamily="2" charset="0"/>
+                </a:rPr>
+              </a:br>
+              <a:r>
+                <a:rPr lang="de-DE" sz="1600">
+                  <a:latin typeface="Roboto" panose="02000000000000000000" pitchFamily="2" charset="0"/>
+                  <a:ea typeface="Roboto" panose="02000000000000000000" pitchFamily="2" charset="0"/>
+                </a:rPr>
+                <a:t>Count</a:t>
+              </a:r>
+            </a:p>
+          </p:txBody>
+        </p:sp>
+      </p:grpSp>
+      <p:sp>
+        <p:nvSpPr>
+          <p:cNvPr id="17" name="Rounded Rectangle 16">
+            <a:extLst>
+              <a:ext uri="{FF2B5EF4-FFF2-40B4-BE49-F238E27FC236}">
+                <a16:creationId xmlns:a16="http://schemas.microsoft.com/office/drawing/2014/main" id="{7F2C493E-9F07-E743-B9BD-0F2C5CB3F321}"/>
+              </a:ext>
+            </a:extLst>
+          </p:cNvPr>
+          <p:cNvSpPr/>
+          <p:nvPr/>
+        </p:nvSpPr>
+        <p:spPr>
+          <a:xfrm>
+            <a:off x="5692374" y="1472908"/>
+            <a:ext cx="1089319" cy="621183"/>
+          </a:xfrm>
+          <a:prstGeom prst="roundRect">
+            <a:avLst/>
+          </a:prstGeom>
+          <a:solidFill>
+            <a:schemeClr val="bg2"/>
+          </a:solidFill>
+          <a:ln>
+            <a:solidFill>
+              <a:schemeClr val="tx1"/>
+            </a:solidFill>
+          </a:ln>
+        </p:spPr>
+        <p:style>
+          <a:lnRef idx="2">
+            <a:schemeClr val="accent1">
+              <a:shade val="50000"/>
+            </a:schemeClr>
+          </a:lnRef>
+          <a:fillRef idx="1">
+            <a:schemeClr val="accent1"/>
+          </a:fillRef>
+          <a:effectRef idx="0">
+            <a:schemeClr val="accent1"/>
+          </a:effectRef>
+          <a:fontRef idx="minor">
+            <a:schemeClr val="lt1"/>
+          </a:fontRef>
+        </p:style>
+        <p:txBody>
+          <a:bodyPr rot="0" spcFirstLastPara="0" vertOverflow="overflow" horzOverflow="overflow" vert="horz" wrap="square" lIns="91440" tIns="45720" rIns="91440" bIns="45720" numCol="1" spcCol="0" rtlCol="0" fromWordArt="0" anchor="ctr" anchorCtr="0" forceAA="0" compatLnSpc="1">
+            <a:prstTxWarp prst="textNoShape">
+              <a:avLst/>
+            </a:prstTxWarp>
+            <a:noAutofit/>
+          </a:bodyPr>
+          <a:lstStyle/>
+          <a:p>
+            <a:pPr algn="ctr"/>
+            <a:r>
+              <a:rPr lang="de-DE" sz="1600">
+                <a:solidFill>
+                  <a:schemeClr val="tx1"/>
+                </a:solidFill>
+                <a:latin typeface="Roboto" panose="02000000000000000000" pitchFamily="2" charset="0"/>
+                <a:ea typeface="Roboto" panose="02000000000000000000" pitchFamily="2" charset="0"/>
+              </a:rPr>
+              <a:t>Salt</a:t>
+            </a:r>
+          </a:p>
+        </p:txBody>
+      </p:sp>
+      <p:sp>
+        <p:nvSpPr>
+          <p:cNvPr id="18" name="Rounded Rectangle 17">
+            <a:extLst>
+              <a:ext uri="{FF2B5EF4-FFF2-40B4-BE49-F238E27FC236}">
+                <a16:creationId xmlns:a16="http://schemas.microsoft.com/office/drawing/2014/main" id="{85C37A95-D307-3942-A602-28F1E8964B0E}"/>
+              </a:ext>
+            </a:extLst>
+          </p:cNvPr>
+          <p:cNvSpPr/>
+          <p:nvPr/>
+        </p:nvSpPr>
+        <p:spPr>
+          <a:xfrm>
+            <a:off x="4270856" y="1472908"/>
+            <a:ext cx="1089319" cy="621183"/>
+          </a:xfrm>
+          <a:prstGeom prst="roundRect">
+            <a:avLst/>
+          </a:prstGeom>
+          <a:solidFill>
+            <a:schemeClr val="bg2"/>
+          </a:solidFill>
+          <a:ln>
+            <a:solidFill>
+              <a:schemeClr val="tx1"/>
+            </a:solidFill>
+          </a:ln>
+        </p:spPr>
+        <p:style>
+          <a:lnRef idx="2">
+            <a:schemeClr val="accent1">
+              <a:shade val="50000"/>
+            </a:schemeClr>
+          </a:lnRef>
+          <a:fillRef idx="1">
+            <a:schemeClr val="accent1"/>
+          </a:fillRef>
+          <a:effectRef idx="0">
+            <a:schemeClr val="accent1"/>
+          </a:effectRef>
+          <a:fontRef idx="minor">
+            <a:schemeClr val="lt1"/>
+          </a:fontRef>
+        </p:style>
+        <p:txBody>
+          <a:bodyPr rot="0" spcFirstLastPara="0" vertOverflow="overflow" horzOverflow="overflow" vert="horz" wrap="square" lIns="91440" tIns="45720" rIns="91440" bIns="45720" numCol="1" spcCol="0" rtlCol="0" fromWordArt="0" anchor="ctr" anchorCtr="0" forceAA="0" compatLnSpc="1">
+            <a:prstTxWarp prst="textNoShape">
+              <a:avLst/>
+            </a:prstTxWarp>
+            <a:noAutofit/>
+          </a:bodyPr>
+          <a:lstStyle/>
+          <a:p>
+            <a:pPr algn="ctr"/>
+            <a:r>
+              <a:rPr lang="de-DE" sz="1600">
+                <a:solidFill>
+                  <a:schemeClr val="tx1"/>
+                </a:solidFill>
+                <a:latin typeface="Roboto" panose="02000000000000000000" pitchFamily="2" charset="0"/>
+                <a:ea typeface="Roboto" panose="02000000000000000000" pitchFamily="2" charset="0"/>
+              </a:rPr>
+              <a:t>Hash</a:t>
+            </a:r>
+            <a:br>
+              <a:rPr lang="de-DE" sz="1600">
+                <a:solidFill>
+                  <a:schemeClr val="tx1"/>
+                </a:solidFill>
+                <a:latin typeface="Roboto" panose="02000000000000000000" pitchFamily="2" charset="0"/>
+                <a:ea typeface="Roboto" panose="02000000000000000000" pitchFamily="2" charset="0"/>
+              </a:rPr>
+            </a:br>
+            <a:r>
+              <a:rPr lang="de-DE" sz="1600">
+                <a:solidFill>
+                  <a:schemeClr val="tx1"/>
+                </a:solidFill>
+                <a:latin typeface="Roboto" panose="02000000000000000000" pitchFamily="2" charset="0"/>
+                <a:ea typeface="Roboto" panose="02000000000000000000" pitchFamily="2" charset="0"/>
+              </a:rPr>
+              <a:t>Function</a:t>
+            </a:r>
+          </a:p>
+        </p:txBody>
+      </p:sp>
+      <p:sp>
+        <p:nvSpPr>
+          <p:cNvPr id="19" name="Rounded Rectangle 18">
+            <a:extLst>
+              <a:ext uri="{FF2B5EF4-FFF2-40B4-BE49-F238E27FC236}">
+                <a16:creationId xmlns:a16="http://schemas.microsoft.com/office/drawing/2014/main" id="{DA025DC0-D308-6A48-9CE4-D65319CA85F5}"/>
+              </a:ext>
+            </a:extLst>
+          </p:cNvPr>
+          <p:cNvSpPr/>
+          <p:nvPr/>
+        </p:nvSpPr>
+        <p:spPr>
+          <a:xfrm>
+            <a:off x="7113893" y="1472908"/>
+            <a:ext cx="1089319" cy="621183"/>
+          </a:xfrm>
+          <a:prstGeom prst="roundRect">
+            <a:avLst/>
+          </a:prstGeom>
+          <a:solidFill>
+            <a:schemeClr val="bg2"/>
+          </a:solidFill>
+          <a:ln>
+            <a:solidFill>
+              <a:schemeClr val="tx1"/>
+            </a:solidFill>
+          </a:ln>
+        </p:spPr>
+        <p:style>
+          <a:lnRef idx="2">
+            <a:schemeClr val="accent1">
+              <a:shade val="50000"/>
+            </a:schemeClr>
+          </a:lnRef>
+          <a:fillRef idx="1">
+            <a:schemeClr val="accent1"/>
+          </a:fillRef>
+          <a:effectRef idx="0">
+            <a:schemeClr val="accent1"/>
+          </a:effectRef>
+          <a:fontRef idx="minor">
+            <a:schemeClr val="lt1"/>
+          </a:fontRef>
+        </p:style>
+        <p:txBody>
+          <a:bodyPr rot="0" spcFirstLastPara="0" vertOverflow="overflow" horzOverflow="overflow" vert="horz" wrap="square" lIns="91440" tIns="45720" rIns="91440" bIns="45720" numCol="1" spcCol="0" rtlCol="0" fromWordArt="0" anchor="ctr" anchorCtr="0" forceAA="0" compatLnSpc="1">
+            <a:prstTxWarp prst="textNoShape">
+              <a:avLst/>
+            </a:prstTxWarp>
+            <a:noAutofit/>
+          </a:bodyPr>
+          <a:lstStyle/>
+          <a:p>
+            <a:pPr algn="ctr"/>
+            <a:r>
+              <a:rPr lang="de-DE" sz="1600">
+                <a:solidFill>
+                  <a:schemeClr val="tx1"/>
+                </a:solidFill>
+                <a:latin typeface="Roboto" panose="02000000000000000000" pitchFamily="2" charset="0"/>
+                <a:ea typeface="Roboto" panose="02000000000000000000" pitchFamily="2" charset="0"/>
+              </a:rPr>
+              <a:t>Iteration</a:t>
+            </a:r>
+            <a:br>
+              <a:rPr lang="de-DE" sz="1600">
+                <a:solidFill>
+                  <a:schemeClr val="tx1"/>
+                </a:solidFill>
+                <a:latin typeface="Roboto" panose="02000000000000000000" pitchFamily="2" charset="0"/>
+                <a:ea typeface="Roboto" panose="02000000000000000000" pitchFamily="2" charset="0"/>
+              </a:rPr>
+            </a:br>
+            <a:r>
+              <a:rPr lang="de-DE" sz="1600">
+                <a:solidFill>
+                  <a:schemeClr val="tx1"/>
+                </a:solidFill>
+                <a:latin typeface="Roboto" panose="02000000000000000000" pitchFamily="2" charset="0"/>
+                <a:ea typeface="Roboto" panose="02000000000000000000" pitchFamily="2" charset="0"/>
+              </a:rPr>
+              <a:t>Count</a:t>
+            </a:r>
+          </a:p>
+        </p:txBody>
+      </p:sp>
+      <p:cxnSp>
+        <p:nvCxnSpPr>
+          <p:cNvPr id="20" name="Straight Arrow Connector 19">
+            <a:extLst>
+              <a:ext uri="{FF2B5EF4-FFF2-40B4-BE49-F238E27FC236}">
+                <a16:creationId xmlns:a16="http://schemas.microsoft.com/office/drawing/2014/main" id="{DE9C64FF-0481-4F41-9F91-5ED9F46B3D1C}"/>
+              </a:ext>
+            </a:extLst>
+          </p:cNvPr>
+          <p:cNvCxnSpPr/>
+          <p:nvPr/>
+        </p:nvCxnSpPr>
+        <p:spPr>
+          <a:xfrm>
+            <a:off x="6237034" y="754934"/>
+            <a:ext cx="0" cy="651915"/>
+          </a:xfrm>
+          <a:prstGeom prst="straightConnector1">
+            <a:avLst/>
+          </a:prstGeom>
+          <a:ln w="12700">
+            <a:solidFill>
+              <a:schemeClr val="tx1"/>
+            </a:solidFill>
+            <a:tailEnd type="triangle"/>
+          </a:ln>
+        </p:spPr>
+        <p:style>
+          <a:lnRef idx="1">
+            <a:schemeClr val="accent1"/>
+          </a:lnRef>
+          <a:fillRef idx="0">
+            <a:schemeClr val="accent1"/>
+          </a:fillRef>
+          <a:effectRef idx="0">
+            <a:schemeClr val="accent1"/>
+          </a:effectRef>
+          <a:fontRef idx="minor">
+            <a:schemeClr val="tx1"/>
+          </a:fontRef>
+        </p:style>
+      </p:cxnSp>
+      <p:cxnSp>
+        <p:nvCxnSpPr>
+          <p:cNvPr id="21" name="Straight Arrow Connector 20">
+            <a:extLst>
+              <a:ext uri="{FF2B5EF4-FFF2-40B4-BE49-F238E27FC236}">
+                <a16:creationId xmlns:a16="http://schemas.microsoft.com/office/drawing/2014/main" id="{C28B47D9-139D-4146-AC80-5024F917A916}"/>
+              </a:ext>
+            </a:extLst>
+          </p:cNvPr>
+          <p:cNvCxnSpPr>
+            <a:cxnSpLocks noChangeAspect="1"/>
+          </p:cNvCxnSpPr>
+          <p:nvPr/>
+        </p:nvCxnSpPr>
+        <p:spPr>
+          <a:xfrm flipH="1">
+            <a:off x="5208351" y="663961"/>
+            <a:ext cx="643040" cy="734585"/>
+          </a:xfrm>
+          <a:prstGeom prst="straightConnector1">
+            <a:avLst/>
+          </a:prstGeom>
+          <a:ln w="12700">
+            <a:solidFill>
+              <a:schemeClr val="tx1"/>
+            </a:solidFill>
+            <a:tailEnd type="triangle"/>
+          </a:ln>
+        </p:spPr>
+        <p:style>
+          <a:lnRef idx="1">
+            <a:schemeClr val="accent1"/>
+          </a:lnRef>
+          <a:fillRef idx="0">
+            <a:schemeClr val="accent1"/>
+          </a:fillRef>
+          <a:effectRef idx="0">
+            <a:schemeClr val="accent1"/>
+          </a:effectRef>
+          <a:fontRef idx="minor">
+            <a:schemeClr val="tx1"/>
+          </a:fontRef>
+        </p:style>
+      </p:cxnSp>
+      <p:cxnSp>
+        <p:nvCxnSpPr>
+          <p:cNvPr id="22" name="Straight Arrow Connector 21">
+            <a:extLst>
+              <a:ext uri="{FF2B5EF4-FFF2-40B4-BE49-F238E27FC236}">
+                <a16:creationId xmlns:a16="http://schemas.microsoft.com/office/drawing/2014/main" id="{6A2717E1-0C34-A846-9BA8-6C8EEEA7D693}"/>
+              </a:ext>
+            </a:extLst>
+          </p:cNvPr>
+          <p:cNvCxnSpPr>
+            <a:cxnSpLocks noChangeAspect="1"/>
+          </p:cNvCxnSpPr>
+          <p:nvPr/>
+        </p:nvCxnSpPr>
+        <p:spPr>
+          <a:xfrm>
+            <a:off x="6627483" y="663961"/>
+            <a:ext cx="643040" cy="734585"/>
+          </a:xfrm>
+          <a:prstGeom prst="straightConnector1">
+            <a:avLst/>
+          </a:prstGeom>
+          <a:ln w="12700">
+            <a:solidFill>
+              <a:schemeClr val="tx1"/>
+            </a:solidFill>
+            <a:tailEnd type="triangle"/>
+          </a:ln>
+        </p:spPr>
+        <p:style>
+          <a:lnRef idx="1">
+            <a:schemeClr val="accent1"/>
+          </a:lnRef>
+          <a:fillRef idx="0">
+            <a:schemeClr val="accent1"/>
+          </a:fillRef>
+          <a:effectRef idx="0">
+            <a:schemeClr val="accent1"/>
+          </a:effectRef>
+          <a:fontRef idx="minor">
+            <a:schemeClr val="tx1"/>
+          </a:fontRef>
+        </p:style>
+      </p:cxnSp>
+      <p:sp>
+        <p:nvSpPr>
+          <p:cNvPr id="16" name="Rounded Rectangle 15">
+            <a:extLst>
+              <a:ext uri="{FF2B5EF4-FFF2-40B4-BE49-F238E27FC236}">
+                <a16:creationId xmlns:a16="http://schemas.microsoft.com/office/drawing/2014/main" id="{C287CCDC-7D32-C742-BC65-B5DA6BD1216C}"/>
+              </a:ext>
+            </a:extLst>
+          </p:cNvPr>
+          <p:cNvSpPr/>
+          <p:nvPr/>
+        </p:nvSpPr>
+        <p:spPr>
+          <a:xfrm>
+            <a:off x="5505531" y="133749"/>
+            <a:ext cx="1463006" cy="621183"/>
+          </a:xfrm>
+          <a:prstGeom prst="roundRect">
+            <a:avLst/>
+          </a:prstGeom>
+          <a:solidFill>
+            <a:schemeClr val="bg2"/>
+          </a:solidFill>
+          <a:ln>
+            <a:solidFill>
+              <a:schemeClr val="tx1"/>
+            </a:solidFill>
+          </a:ln>
+        </p:spPr>
+        <p:style>
+          <a:lnRef idx="2">
+            <a:schemeClr val="accent1">
+              <a:shade val="50000"/>
+            </a:schemeClr>
+          </a:lnRef>
+          <a:fillRef idx="1">
+            <a:schemeClr val="accent1"/>
+          </a:fillRef>
+          <a:effectRef idx="0">
+            <a:schemeClr val="accent1"/>
+          </a:effectRef>
+          <a:fontRef idx="minor">
+            <a:schemeClr val="lt1"/>
+          </a:fontRef>
+        </p:style>
+        <p:txBody>
+          <a:bodyPr rot="0" spcFirstLastPara="0" vertOverflow="overflow" horzOverflow="overflow" vert="horz" wrap="square" lIns="91440" tIns="45720" rIns="91440" bIns="45720" numCol="1" spcCol="0" rtlCol="0" fromWordArt="0" anchor="ctr" anchorCtr="0" forceAA="0" compatLnSpc="1">
+            <a:prstTxWarp prst="textNoShape">
+              <a:avLst/>
+            </a:prstTxWarp>
+            <a:noAutofit/>
+          </a:bodyPr>
+          <a:lstStyle/>
+          <a:p>
+            <a:pPr algn="ctr"/>
+            <a:r>
+              <a:rPr lang="de-DE">
+                <a:solidFill>
+                  <a:schemeClr val="tx1"/>
+                </a:solidFill>
+                <a:latin typeface="Roboto" panose="02000000000000000000" pitchFamily="2" charset="0"/>
+                <a:ea typeface="Roboto" panose="02000000000000000000" pitchFamily="2" charset="0"/>
+              </a:rPr>
+              <a:t>PBKDF2</a:t>
+            </a:r>
+          </a:p>
+        </p:txBody>
+      </p:sp>
+      <p:sp>
+        <p:nvSpPr>
+          <p:cNvPr id="27" name="TextBox 26">
+            <a:extLst>
+              <a:ext uri="{FF2B5EF4-FFF2-40B4-BE49-F238E27FC236}">
+                <a16:creationId xmlns:a16="http://schemas.microsoft.com/office/drawing/2014/main" id="{93E07478-4F7E-724D-A337-8ADC84D29378}"/>
+              </a:ext>
+            </a:extLst>
+          </p:cNvPr>
+          <p:cNvSpPr txBox="1"/>
+          <p:nvPr/>
+        </p:nvSpPr>
+        <p:spPr>
+          <a:xfrm>
+            <a:off x="440633" y="713432"/>
+            <a:ext cx="848309" cy="369332"/>
+          </a:xfrm>
+          <a:prstGeom prst="rect">
+            <a:avLst/>
+          </a:prstGeom>
+          <a:noFill/>
+        </p:spPr>
+        <p:txBody>
+          <a:bodyPr wrap="none" rtlCol="0">
+            <a:spAutoFit/>
+          </a:bodyPr>
+          <a:lstStyle/>
+          <a:p>
+            <a:r>
+              <a:rPr lang="de-DE">
+                <a:solidFill>
+                  <a:schemeClr val="bg1">
+                    <a:lumMod val="65000"/>
+                  </a:schemeClr>
+                </a:solidFill>
+                <a:latin typeface="Roboto" panose="02000000000000000000" pitchFamily="2" charset="0"/>
+                <a:ea typeface="Roboto" panose="02000000000000000000" pitchFamily="2" charset="0"/>
+              </a:rPr>
+              <a:t>before</a:t>
+            </a:r>
+          </a:p>
+        </p:txBody>
+      </p:sp>
+      <p:sp>
+        <p:nvSpPr>
+          <p:cNvPr id="28" name="TextBox 27">
+            <a:extLst>
+              <a:ext uri="{FF2B5EF4-FFF2-40B4-BE49-F238E27FC236}">
+                <a16:creationId xmlns:a16="http://schemas.microsoft.com/office/drawing/2014/main" id="{00409CD0-EE49-AA4A-B1C9-6AE5132EDCED}"/>
+              </a:ext>
+            </a:extLst>
+          </p:cNvPr>
+          <p:cNvSpPr txBox="1"/>
+          <p:nvPr/>
+        </p:nvSpPr>
+        <p:spPr>
+          <a:xfrm>
+            <a:off x="4157141" y="713432"/>
+            <a:ext cx="665567" cy="369332"/>
+          </a:xfrm>
+          <a:prstGeom prst="rect">
+            <a:avLst/>
+          </a:prstGeom>
+          <a:noFill/>
+        </p:spPr>
+        <p:txBody>
+          <a:bodyPr wrap="none" rtlCol="0">
+            <a:spAutoFit/>
+          </a:bodyPr>
+          <a:lstStyle/>
+          <a:p>
+            <a:r>
+              <a:rPr lang="de-DE">
+                <a:solidFill>
+                  <a:schemeClr val="bg1">
+                    <a:lumMod val="65000"/>
+                  </a:schemeClr>
+                </a:solidFill>
+                <a:latin typeface="Roboto" panose="02000000000000000000" pitchFamily="2" charset="0"/>
+                <a:ea typeface="Roboto" panose="02000000000000000000" pitchFamily="2" charset="0"/>
+              </a:rPr>
+              <a:t>after</a:t>
+            </a:r>
+          </a:p>
+        </p:txBody>
+      </p:sp>
+    </p:spTree>
+    <p:extLst>
+      <p:ext uri="{BB962C8B-B14F-4D97-AF65-F5344CB8AC3E}">
+        <p14:creationId xmlns:p14="http://schemas.microsoft.com/office/powerpoint/2010/main" val="3729439717"/>
+      </p:ext>
+    </p:extLst>
+  </p:cSld>
+  <p:clrMapOvr>
+    <a:masterClrMapping/>
+  </p:clrMapOvr>
+</p:sld>
+</file>
+
+<file path=ppt/slides/slide5.xml><?xml version="1.0" encoding="utf-8"?>
+<p:sld xmlns:a="http://schemas.openxmlformats.org/drawingml/2006/main" xmlns:r="http://schemas.openxmlformats.org/officeDocument/2006/relationships" xmlns:p="http://schemas.openxmlformats.org/presentationml/2006/main">
+  <p:cSld>
+    <p:spTree>
+      <p:nvGrpSpPr>
+        <p:cNvPr id="1" name=""/>
+        <p:cNvGrpSpPr/>
+        <p:nvPr/>
+      </p:nvGrpSpPr>
+      <p:grpSpPr>
+        <a:xfrm>
+          <a:off x="0" y="0"/>
+          <a:ext cx="0" cy="0"/>
+          <a:chOff x="0" y="0"/>
+          <a:chExt cx="0" cy="0"/>
+        </a:xfrm>
+      </p:grpSpPr>
+      <p:sp>
+        <p:nvSpPr>
+          <p:cNvPr id="10" name="Smiley Face 9">
+            <a:extLst>
+              <a:ext uri="{FF2B5EF4-FFF2-40B4-BE49-F238E27FC236}">
+                <a16:creationId xmlns:a16="http://schemas.microsoft.com/office/drawing/2014/main" id="{F01242D1-2A0F-BF46-AF0E-261E72A05943}"/>
+              </a:ext>
+            </a:extLst>
+          </p:cNvPr>
+          <p:cNvSpPr/>
+          <p:nvPr/>
+        </p:nvSpPr>
+        <p:spPr>
+          <a:xfrm>
+            <a:off x="1150223" y="221369"/>
+            <a:ext cx="869369" cy="869369"/>
+          </a:xfrm>
+          <a:prstGeom prst="smileyFace">
+            <a:avLst/>
+          </a:prstGeom>
+          <a:solidFill>
+            <a:schemeClr val="bg2"/>
+          </a:solidFill>
+          <a:ln w="28575">
+            <a:solidFill>
+              <a:schemeClr val="bg2">
+                <a:lumMod val="25000"/>
+              </a:schemeClr>
+            </a:solidFill>
+          </a:ln>
+        </p:spPr>
+        <p:style>
+          <a:lnRef idx="2">
+            <a:schemeClr val="accent1">
+              <a:shade val="50000"/>
+            </a:schemeClr>
+          </a:lnRef>
+          <a:fillRef idx="1">
+            <a:schemeClr val="accent1"/>
+          </a:fillRef>
+          <a:effectRef idx="0">
+            <a:schemeClr val="accent1"/>
+          </a:effectRef>
+          <a:fontRef idx="minor">
+            <a:schemeClr val="lt1"/>
+          </a:fontRef>
+        </p:style>
+        <p:txBody>
+          <a:bodyPr rtlCol="0" anchor="ctr"/>
+          <a:lstStyle/>
+          <a:p>
+            <a:pPr algn="ctr"/>
+            <a:endParaRPr lang="de-DE"/>
+          </a:p>
+        </p:txBody>
+      </p:sp>
+      <p:cxnSp>
+        <p:nvCxnSpPr>
+          <p:cNvPr id="12" name="Straight Arrow Connector 11">
+            <a:extLst>
+              <a:ext uri="{FF2B5EF4-FFF2-40B4-BE49-F238E27FC236}">
+                <a16:creationId xmlns:a16="http://schemas.microsoft.com/office/drawing/2014/main" id="{9F69A7A6-3805-DB43-8481-FEF005D227F9}"/>
+              </a:ext>
+            </a:extLst>
+          </p:cNvPr>
+          <p:cNvCxnSpPr>
+            <a:cxnSpLocks/>
+          </p:cNvCxnSpPr>
+          <p:nvPr/>
+        </p:nvCxnSpPr>
+        <p:spPr>
+          <a:xfrm flipV="1">
+            <a:off x="825381" y="546818"/>
+            <a:ext cx="569740" cy="482567"/>
+          </a:xfrm>
+          <a:prstGeom prst="straightConnector1">
+            <a:avLst/>
+          </a:prstGeom>
+          <a:ln w="12700">
+            <a:solidFill>
+              <a:schemeClr val="tx1"/>
+            </a:solidFill>
+            <a:tailEnd type="triangle"/>
+          </a:ln>
+        </p:spPr>
+        <p:style>
+          <a:lnRef idx="1">
+            <a:schemeClr val="accent1"/>
+          </a:lnRef>
+          <a:fillRef idx="0">
+            <a:schemeClr val="accent1"/>
+          </a:fillRef>
+          <a:effectRef idx="0">
+            <a:schemeClr val="accent1"/>
+          </a:effectRef>
+          <a:fontRef idx="minor">
+            <a:schemeClr val="tx1"/>
+          </a:fontRef>
+        </p:style>
+      </p:cxnSp>
+      <p:sp>
+        <p:nvSpPr>
+          <p:cNvPr id="15" name="TextBox 14">
+            <a:extLst>
+              <a:ext uri="{FF2B5EF4-FFF2-40B4-BE49-F238E27FC236}">
+                <a16:creationId xmlns:a16="http://schemas.microsoft.com/office/drawing/2014/main" id="{D12EEE22-B1F4-1140-A0BC-6BA31A779EF1}"/>
+              </a:ext>
+            </a:extLst>
+          </p:cNvPr>
+          <p:cNvSpPr txBox="1"/>
+          <p:nvPr/>
+        </p:nvSpPr>
+        <p:spPr>
+          <a:xfrm>
+            <a:off x="321798" y="812932"/>
+            <a:ext cx="500458" cy="338554"/>
+          </a:xfrm>
+          <a:prstGeom prst="rect">
+            <a:avLst/>
+          </a:prstGeom>
+          <a:noFill/>
+        </p:spPr>
+        <p:txBody>
+          <a:bodyPr wrap="none" rtlCol="0">
+            <a:spAutoFit/>
+          </a:bodyPr>
+          <a:lstStyle/>
+          <a:p>
+            <a:r>
+              <a:rPr lang="de-DE" sz="1600">
+                <a:latin typeface="Roboto" panose="02000000000000000000" pitchFamily="2" charset="0"/>
+                <a:ea typeface="Roboto" panose="02000000000000000000" pitchFamily="2" charset="0"/>
+              </a:rPr>
+              <a:t>eye</a:t>
+            </a:r>
+          </a:p>
+        </p:txBody>
+      </p:sp>
+      <p:cxnSp>
+        <p:nvCxnSpPr>
+          <p:cNvPr id="16" name="Straight Arrow Connector 15">
+            <a:extLst>
+              <a:ext uri="{FF2B5EF4-FFF2-40B4-BE49-F238E27FC236}">
+                <a16:creationId xmlns:a16="http://schemas.microsoft.com/office/drawing/2014/main" id="{93E2E0F2-228B-0E4C-86C3-1F2DC47FDAE3}"/>
+              </a:ext>
+            </a:extLst>
+          </p:cNvPr>
+          <p:cNvCxnSpPr>
+            <a:cxnSpLocks/>
+          </p:cNvCxnSpPr>
+          <p:nvPr/>
+        </p:nvCxnSpPr>
+        <p:spPr>
+          <a:xfrm>
+            <a:off x="1002077" y="225419"/>
+            <a:ext cx="711200" cy="253332"/>
+          </a:xfrm>
+          <a:prstGeom prst="straightConnector1">
+            <a:avLst/>
+          </a:prstGeom>
+          <a:ln w="12700">
+            <a:solidFill>
+              <a:schemeClr val="tx1"/>
+            </a:solidFill>
+            <a:tailEnd type="triangle"/>
+          </a:ln>
+        </p:spPr>
+        <p:style>
+          <a:lnRef idx="1">
+            <a:schemeClr val="accent1"/>
+          </a:lnRef>
+          <a:fillRef idx="0">
+            <a:schemeClr val="accent1"/>
+          </a:fillRef>
+          <a:effectRef idx="0">
+            <a:schemeClr val="accent1"/>
+          </a:effectRef>
+          <a:fontRef idx="minor">
+            <a:schemeClr val="tx1"/>
+          </a:fontRef>
+        </p:style>
+      </p:cxnSp>
+      <p:sp>
+        <p:nvSpPr>
+          <p:cNvPr id="21" name="TextBox 20">
+            <a:extLst>
+              <a:ext uri="{FF2B5EF4-FFF2-40B4-BE49-F238E27FC236}">
+                <a16:creationId xmlns:a16="http://schemas.microsoft.com/office/drawing/2014/main" id="{535F97FD-14F6-2A4A-A92D-657CCA67B5D8}"/>
+              </a:ext>
+            </a:extLst>
+          </p:cNvPr>
+          <p:cNvSpPr txBox="1"/>
+          <p:nvPr/>
+        </p:nvSpPr>
+        <p:spPr>
+          <a:xfrm>
+            <a:off x="517458" y="1767537"/>
+            <a:ext cx="500458" cy="338554"/>
+          </a:xfrm>
+          <a:prstGeom prst="rect">
+            <a:avLst/>
+          </a:prstGeom>
+          <a:noFill/>
+        </p:spPr>
+        <p:txBody>
+          <a:bodyPr wrap="none" rtlCol="0">
+            <a:spAutoFit/>
+          </a:bodyPr>
+          <a:lstStyle/>
+          <a:p>
+            <a:pPr algn="r"/>
+            <a:r>
+              <a:rPr lang="de-DE" sz="1600">
+                <a:latin typeface="Roboto" panose="02000000000000000000" pitchFamily="2" charset="0"/>
+                <a:ea typeface="Roboto" panose="02000000000000000000" pitchFamily="2" charset="0"/>
+              </a:rPr>
+              <a:t>eye</a:t>
+            </a:r>
+          </a:p>
+        </p:txBody>
+      </p:sp>
+      <p:cxnSp>
+        <p:nvCxnSpPr>
+          <p:cNvPr id="22" name="Straight Arrow Connector 21">
+            <a:extLst>
+              <a:ext uri="{FF2B5EF4-FFF2-40B4-BE49-F238E27FC236}">
+                <a16:creationId xmlns:a16="http://schemas.microsoft.com/office/drawing/2014/main" id="{27048742-E0E6-8D44-9C96-D506E088AA52}"/>
+              </a:ext>
+            </a:extLst>
+          </p:cNvPr>
+          <p:cNvCxnSpPr>
+            <a:cxnSpLocks/>
+          </p:cNvCxnSpPr>
+          <p:nvPr/>
+        </p:nvCxnSpPr>
+        <p:spPr>
+          <a:xfrm>
+            <a:off x="822256" y="726062"/>
+            <a:ext cx="810624" cy="180105"/>
+          </a:xfrm>
+          <a:prstGeom prst="straightConnector1">
+            <a:avLst/>
+          </a:prstGeom>
+          <a:ln w="12700">
+            <a:solidFill>
+              <a:schemeClr val="tx1"/>
+            </a:solidFill>
+            <a:tailEnd type="triangle"/>
+          </a:ln>
+        </p:spPr>
+        <p:style>
+          <a:lnRef idx="1">
+            <a:schemeClr val="accent1"/>
+          </a:lnRef>
+          <a:fillRef idx="0">
+            <a:schemeClr val="accent1"/>
+          </a:fillRef>
+          <a:effectRef idx="0">
+            <a:schemeClr val="accent1"/>
+          </a:effectRef>
+          <a:fontRef idx="minor">
+            <a:schemeClr val="tx1"/>
+          </a:fontRef>
+        </p:style>
+      </p:cxnSp>
+      <p:sp>
+        <p:nvSpPr>
+          <p:cNvPr id="25" name="TextBox 24">
+            <a:extLst>
+              <a:ext uri="{FF2B5EF4-FFF2-40B4-BE49-F238E27FC236}">
+                <a16:creationId xmlns:a16="http://schemas.microsoft.com/office/drawing/2014/main" id="{6FB4D8C4-102D-994F-84BF-1BC12E5EB788}"/>
+              </a:ext>
+            </a:extLst>
+          </p:cNvPr>
+          <p:cNvSpPr txBox="1"/>
+          <p:nvPr/>
+        </p:nvSpPr>
+        <p:spPr>
+          <a:xfrm>
+            <a:off x="17417" y="463102"/>
+            <a:ext cx="776175" cy="338554"/>
+          </a:xfrm>
+          <a:prstGeom prst="rect">
+            <a:avLst/>
+          </a:prstGeom>
+          <a:noFill/>
+        </p:spPr>
+        <p:txBody>
+          <a:bodyPr wrap="none" rtlCol="0">
+            <a:spAutoFit/>
+          </a:bodyPr>
+          <a:lstStyle/>
+          <a:p>
+            <a:r>
+              <a:rPr lang="de-DE" sz="1600">
+                <a:latin typeface="Roboto" panose="02000000000000000000" pitchFamily="2" charset="0"/>
+                <a:ea typeface="Roboto" panose="02000000000000000000" pitchFamily="2" charset="0"/>
+              </a:rPr>
+              <a:t>mouth</a:t>
+            </a:r>
+          </a:p>
+        </p:txBody>
+      </p:sp>
+      <p:cxnSp>
+        <p:nvCxnSpPr>
+          <p:cNvPr id="27" name="Straight Arrow Connector 26">
+            <a:extLst>
+              <a:ext uri="{FF2B5EF4-FFF2-40B4-BE49-F238E27FC236}">
+                <a16:creationId xmlns:a16="http://schemas.microsoft.com/office/drawing/2014/main" id="{ACD64595-887E-424E-BD5A-AB9F59DD2FBA}"/>
+              </a:ext>
+            </a:extLst>
+          </p:cNvPr>
+          <p:cNvCxnSpPr>
+            <a:cxnSpLocks/>
+          </p:cNvCxnSpPr>
+          <p:nvPr/>
+        </p:nvCxnSpPr>
+        <p:spPr>
+          <a:xfrm flipH="1" flipV="1">
+            <a:off x="1719963" y="726062"/>
+            <a:ext cx="447775" cy="275649"/>
+          </a:xfrm>
+          <a:prstGeom prst="straightConnector1">
+            <a:avLst/>
+          </a:prstGeom>
+          <a:ln w="12700">
+            <a:solidFill>
+              <a:schemeClr val="tx1"/>
+            </a:solidFill>
+            <a:tailEnd type="triangle"/>
+          </a:ln>
+        </p:spPr>
+        <p:style>
+          <a:lnRef idx="1">
+            <a:schemeClr val="accent1"/>
+          </a:lnRef>
+          <a:fillRef idx="0">
+            <a:schemeClr val="accent1"/>
+          </a:fillRef>
+          <a:effectRef idx="0">
+            <a:schemeClr val="accent1"/>
+          </a:effectRef>
+          <a:fontRef idx="minor">
+            <a:schemeClr val="tx1"/>
+          </a:fontRef>
+        </p:style>
+      </p:cxnSp>
+      <p:sp>
+        <p:nvSpPr>
+          <p:cNvPr id="30" name="TextBox 29">
+            <a:extLst>
+              <a:ext uri="{FF2B5EF4-FFF2-40B4-BE49-F238E27FC236}">
+                <a16:creationId xmlns:a16="http://schemas.microsoft.com/office/drawing/2014/main" id="{60564965-381C-F84C-BBF5-EB9ED9512F2C}"/>
+              </a:ext>
+            </a:extLst>
+          </p:cNvPr>
+          <p:cNvSpPr txBox="1"/>
+          <p:nvPr/>
+        </p:nvSpPr>
+        <p:spPr>
+          <a:xfrm>
+            <a:off x="2167738" y="819220"/>
+            <a:ext cx="583814" cy="338554"/>
+          </a:xfrm>
+          <a:prstGeom prst="rect">
+            <a:avLst/>
+          </a:prstGeom>
+          <a:noFill/>
+        </p:spPr>
+        <p:txBody>
+          <a:bodyPr wrap="none" rtlCol="0">
+            <a:spAutoFit/>
+          </a:bodyPr>
+          <a:lstStyle/>
+          <a:p>
+            <a:r>
+              <a:rPr lang="de-DE" sz="1600">
+                <a:latin typeface="Roboto" panose="02000000000000000000" pitchFamily="2" charset="0"/>
+                <a:ea typeface="Roboto" panose="02000000000000000000" pitchFamily="2" charset="0"/>
+              </a:rPr>
+              <a:t>face</a:t>
+            </a:r>
+          </a:p>
+        </p:txBody>
+      </p:sp>
+      <p:sp>
+        <p:nvSpPr>
+          <p:cNvPr id="33" name="Smiley Face 32">
+            <a:extLst>
+              <a:ext uri="{FF2B5EF4-FFF2-40B4-BE49-F238E27FC236}">
+                <a16:creationId xmlns:a16="http://schemas.microsoft.com/office/drawing/2014/main" id="{797E57D7-5DB9-5846-92EA-6DCAAC71E15E}"/>
+              </a:ext>
+            </a:extLst>
+          </p:cNvPr>
+          <p:cNvSpPr/>
+          <p:nvPr/>
+        </p:nvSpPr>
+        <p:spPr>
+          <a:xfrm>
+            <a:off x="1150223" y="1633051"/>
+            <a:ext cx="869369" cy="869369"/>
+          </a:xfrm>
+          <a:prstGeom prst="smileyFace">
+            <a:avLst/>
+          </a:prstGeom>
+          <a:solidFill>
+            <a:schemeClr val="bg2"/>
+          </a:solidFill>
+          <a:ln w="28575">
+            <a:solidFill>
+              <a:schemeClr val="bg2">
+                <a:lumMod val="25000"/>
+              </a:schemeClr>
+            </a:solidFill>
+          </a:ln>
+        </p:spPr>
+        <p:style>
+          <a:lnRef idx="2">
+            <a:schemeClr val="accent1">
+              <a:shade val="50000"/>
+            </a:schemeClr>
+          </a:lnRef>
+          <a:fillRef idx="1">
+            <a:schemeClr val="accent1"/>
+          </a:fillRef>
+          <a:effectRef idx="0">
+            <a:schemeClr val="accent1"/>
+          </a:effectRef>
+          <a:fontRef idx="minor">
+            <a:schemeClr val="lt1"/>
+          </a:fontRef>
+        </p:style>
+        <p:txBody>
+          <a:bodyPr rtlCol="0" anchor="ctr"/>
+          <a:lstStyle/>
+          <a:p>
+            <a:pPr algn="ctr"/>
+            <a:endParaRPr lang="de-DE"/>
+          </a:p>
+        </p:txBody>
+      </p:sp>
+      <p:cxnSp>
+        <p:nvCxnSpPr>
+          <p:cNvPr id="35" name="Straight Arrow Connector 34">
+            <a:extLst>
+              <a:ext uri="{FF2B5EF4-FFF2-40B4-BE49-F238E27FC236}">
+                <a16:creationId xmlns:a16="http://schemas.microsoft.com/office/drawing/2014/main" id="{94B438C2-71C2-214A-8A09-A54FAF89EAFD}"/>
+              </a:ext>
+            </a:extLst>
+          </p:cNvPr>
+          <p:cNvCxnSpPr>
+            <a:cxnSpLocks/>
+          </p:cNvCxnSpPr>
+          <p:nvPr/>
+        </p:nvCxnSpPr>
+        <p:spPr>
+          <a:xfrm flipH="1">
+            <a:off x="1905743" y="2196426"/>
+            <a:ext cx="300502" cy="0"/>
+          </a:xfrm>
+          <a:prstGeom prst="straightConnector1">
+            <a:avLst/>
+          </a:prstGeom>
+          <a:ln w="12700">
+            <a:solidFill>
+              <a:schemeClr val="tx1"/>
+            </a:solidFill>
+            <a:tailEnd type="oval" w="sm" len="sm"/>
+          </a:ln>
+        </p:spPr>
+        <p:style>
+          <a:lnRef idx="1">
+            <a:schemeClr val="accent1"/>
+          </a:lnRef>
+          <a:fillRef idx="0">
+            <a:schemeClr val="accent1"/>
+          </a:fillRef>
+          <a:effectRef idx="0">
+            <a:schemeClr val="accent1"/>
+          </a:effectRef>
+          <a:fontRef idx="minor">
+            <a:schemeClr val="tx1"/>
+          </a:fontRef>
+        </p:style>
+      </p:cxnSp>
+      <p:cxnSp>
+        <p:nvCxnSpPr>
+          <p:cNvPr id="36" name="Straight Arrow Connector 35">
+            <a:extLst>
+              <a:ext uri="{FF2B5EF4-FFF2-40B4-BE49-F238E27FC236}">
+                <a16:creationId xmlns:a16="http://schemas.microsoft.com/office/drawing/2014/main" id="{08E93C81-9526-174C-89DA-BE6704C47400}"/>
+              </a:ext>
+            </a:extLst>
+          </p:cNvPr>
+          <p:cNvCxnSpPr>
+            <a:cxnSpLocks/>
+          </p:cNvCxnSpPr>
+          <p:nvPr/>
+        </p:nvCxnSpPr>
+        <p:spPr>
+          <a:xfrm flipH="1">
+            <a:off x="978044" y="1943305"/>
+            <a:ext cx="367035" cy="0"/>
+          </a:xfrm>
+          <a:prstGeom prst="straightConnector1">
+            <a:avLst/>
+          </a:prstGeom>
+          <a:ln w="12700">
+            <a:solidFill>
+              <a:schemeClr val="tx1"/>
+            </a:solidFill>
+            <a:tailEnd type="none" w="sm" len="sm"/>
+          </a:ln>
+        </p:spPr>
+        <p:style>
+          <a:lnRef idx="1">
+            <a:schemeClr val="accent1"/>
+          </a:lnRef>
+          <a:fillRef idx="0">
+            <a:schemeClr val="accent1"/>
+          </a:fillRef>
+          <a:effectRef idx="0">
+            <a:schemeClr val="accent1"/>
+          </a:effectRef>
+          <a:fontRef idx="minor">
+            <a:schemeClr val="tx1"/>
+          </a:fontRef>
+        </p:style>
+      </p:cxnSp>
+      <p:sp>
+        <p:nvSpPr>
+          <p:cNvPr id="39" name="TextBox 38">
+            <a:extLst>
+              <a:ext uri="{FF2B5EF4-FFF2-40B4-BE49-F238E27FC236}">
+                <a16:creationId xmlns:a16="http://schemas.microsoft.com/office/drawing/2014/main" id="{E6083CC1-A478-834E-A7D6-513C39BDB687}"/>
+              </a:ext>
+            </a:extLst>
+          </p:cNvPr>
+          <p:cNvSpPr txBox="1"/>
+          <p:nvPr/>
+        </p:nvSpPr>
+        <p:spPr>
+          <a:xfrm>
+            <a:off x="241741" y="2084992"/>
+            <a:ext cx="776175" cy="338554"/>
+          </a:xfrm>
+          <a:prstGeom prst="rect">
+            <a:avLst/>
+          </a:prstGeom>
+          <a:noFill/>
+        </p:spPr>
+        <p:txBody>
+          <a:bodyPr wrap="none" rtlCol="0">
+            <a:spAutoFit/>
+          </a:bodyPr>
+          <a:lstStyle/>
+          <a:p>
+            <a:pPr algn="r"/>
+            <a:r>
+              <a:rPr lang="de-DE" sz="1600">
+                <a:latin typeface="Roboto" panose="02000000000000000000" pitchFamily="2" charset="0"/>
+                <a:ea typeface="Roboto" panose="02000000000000000000" pitchFamily="2" charset="0"/>
+              </a:rPr>
+              <a:t>mouth</a:t>
+            </a:r>
+          </a:p>
+        </p:txBody>
+      </p:sp>
+      <p:cxnSp>
+        <p:nvCxnSpPr>
+          <p:cNvPr id="40" name="Straight Arrow Connector 39">
+            <a:extLst>
+              <a:ext uri="{FF2B5EF4-FFF2-40B4-BE49-F238E27FC236}">
+                <a16:creationId xmlns:a16="http://schemas.microsoft.com/office/drawing/2014/main" id="{BD13FDDF-6D68-4243-8A0A-80DDF85BAE8E}"/>
+              </a:ext>
+            </a:extLst>
+          </p:cNvPr>
+          <p:cNvCxnSpPr>
+            <a:cxnSpLocks/>
+          </p:cNvCxnSpPr>
+          <p:nvPr/>
+        </p:nvCxnSpPr>
+        <p:spPr>
+          <a:xfrm flipH="1">
+            <a:off x="978045" y="2255221"/>
+            <a:ext cx="322250" cy="0"/>
+          </a:xfrm>
+          <a:prstGeom prst="straightConnector1">
+            <a:avLst/>
+          </a:prstGeom>
+          <a:ln w="12700">
+            <a:solidFill>
+              <a:schemeClr val="tx1"/>
+            </a:solidFill>
+            <a:tailEnd type="none" w="sm" len="sm"/>
+          </a:ln>
+        </p:spPr>
+        <p:style>
+          <a:lnRef idx="1">
+            <a:schemeClr val="accent1"/>
+          </a:lnRef>
+          <a:fillRef idx="0">
+            <a:schemeClr val="accent1"/>
+          </a:fillRef>
+          <a:effectRef idx="0">
+            <a:schemeClr val="accent1"/>
+          </a:effectRef>
+          <a:fontRef idx="minor">
+            <a:schemeClr val="tx1"/>
+          </a:fontRef>
+        </p:style>
+      </p:cxnSp>
+      <p:cxnSp>
+        <p:nvCxnSpPr>
+          <p:cNvPr id="42" name="Straight Arrow Connector 41">
+            <a:extLst>
+              <a:ext uri="{FF2B5EF4-FFF2-40B4-BE49-F238E27FC236}">
+                <a16:creationId xmlns:a16="http://schemas.microsoft.com/office/drawing/2014/main" id="{A2062F4C-4DF3-844B-918B-5417B2AA0541}"/>
+              </a:ext>
+            </a:extLst>
+          </p:cNvPr>
+          <p:cNvCxnSpPr>
+            <a:cxnSpLocks/>
+          </p:cNvCxnSpPr>
+          <p:nvPr/>
+        </p:nvCxnSpPr>
+        <p:spPr>
+          <a:xfrm flipH="1">
+            <a:off x="1836074" y="1943305"/>
+            <a:ext cx="367035" cy="0"/>
+          </a:xfrm>
+          <a:prstGeom prst="straightConnector1">
+            <a:avLst/>
+          </a:prstGeom>
+          <a:ln w="12700">
+            <a:solidFill>
+              <a:schemeClr val="tx1"/>
+            </a:solidFill>
+            <a:tailEnd type="none" w="sm" len="sm"/>
+          </a:ln>
+        </p:spPr>
+        <p:style>
+          <a:lnRef idx="1">
+            <a:schemeClr val="accent1"/>
+          </a:lnRef>
+          <a:fillRef idx="0">
+            <a:schemeClr val="accent1"/>
+          </a:fillRef>
+          <a:effectRef idx="0">
+            <a:schemeClr val="accent1"/>
+          </a:effectRef>
+          <a:fontRef idx="minor">
+            <a:schemeClr val="tx1"/>
+          </a:fontRef>
+        </p:style>
+      </p:cxnSp>
+      <p:sp>
+        <p:nvSpPr>
+          <p:cNvPr id="43" name="TextBox 42">
+            <a:extLst>
+              <a:ext uri="{FF2B5EF4-FFF2-40B4-BE49-F238E27FC236}">
+                <a16:creationId xmlns:a16="http://schemas.microsoft.com/office/drawing/2014/main" id="{54503CD3-40FA-734F-BDC3-8F3CEB9841BC}"/>
+              </a:ext>
+            </a:extLst>
+          </p:cNvPr>
+          <p:cNvSpPr txBox="1"/>
+          <p:nvPr/>
+        </p:nvSpPr>
+        <p:spPr>
+          <a:xfrm>
+            <a:off x="2169027" y="1767537"/>
+            <a:ext cx="500458" cy="338554"/>
+          </a:xfrm>
+          <a:prstGeom prst="rect">
+            <a:avLst/>
+          </a:prstGeom>
+          <a:noFill/>
+        </p:spPr>
+        <p:txBody>
+          <a:bodyPr wrap="none" rtlCol="0">
+            <a:spAutoFit/>
+          </a:bodyPr>
+          <a:lstStyle/>
+          <a:p>
+            <a:r>
+              <a:rPr lang="de-DE" sz="1600">
+                <a:latin typeface="Roboto" panose="02000000000000000000" pitchFamily="2" charset="0"/>
+                <a:ea typeface="Roboto" panose="02000000000000000000" pitchFamily="2" charset="0"/>
+              </a:rPr>
+              <a:t>eye</a:t>
+            </a:r>
+          </a:p>
+        </p:txBody>
+      </p:sp>
+      <p:sp>
+        <p:nvSpPr>
+          <p:cNvPr id="44" name="TextBox 43">
+            <a:extLst>
+              <a:ext uri="{FF2B5EF4-FFF2-40B4-BE49-F238E27FC236}">
+                <a16:creationId xmlns:a16="http://schemas.microsoft.com/office/drawing/2014/main" id="{482CDD90-7C1F-AF43-8DB4-DD2CD06C988C}"/>
+              </a:ext>
+            </a:extLst>
+          </p:cNvPr>
+          <p:cNvSpPr txBox="1"/>
+          <p:nvPr/>
+        </p:nvSpPr>
+        <p:spPr>
+          <a:xfrm>
+            <a:off x="2169027" y="2027270"/>
+            <a:ext cx="583814" cy="338554"/>
+          </a:xfrm>
+          <a:prstGeom prst="rect">
+            <a:avLst/>
+          </a:prstGeom>
+          <a:noFill/>
+        </p:spPr>
+        <p:txBody>
+          <a:bodyPr wrap="none" rtlCol="0">
+            <a:spAutoFit/>
+          </a:bodyPr>
+          <a:lstStyle/>
+          <a:p>
+            <a:r>
+              <a:rPr lang="de-DE" sz="1600">
+                <a:latin typeface="Roboto" panose="02000000000000000000" pitchFamily="2" charset="0"/>
+                <a:ea typeface="Roboto" panose="02000000000000000000" pitchFamily="2" charset="0"/>
+              </a:rPr>
+              <a:t>face</a:t>
+            </a:r>
+          </a:p>
+        </p:txBody>
+      </p:sp>
+      <p:sp>
+        <p:nvSpPr>
+          <p:cNvPr id="45" name="TextBox 44">
+            <a:extLst>
+              <a:ext uri="{FF2B5EF4-FFF2-40B4-BE49-F238E27FC236}">
+                <a16:creationId xmlns:a16="http://schemas.microsoft.com/office/drawing/2014/main" id="{134308DD-6187-BA46-9476-9462318AB6B9}"/>
+              </a:ext>
+            </a:extLst>
+          </p:cNvPr>
+          <p:cNvSpPr txBox="1"/>
+          <p:nvPr/>
+        </p:nvSpPr>
+        <p:spPr>
+          <a:xfrm>
+            <a:off x="518778" y="18103"/>
+            <a:ext cx="500458" cy="338554"/>
+          </a:xfrm>
+          <a:prstGeom prst="rect">
+            <a:avLst/>
+          </a:prstGeom>
+          <a:noFill/>
+        </p:spPr>
+        <p:txBody>
+          <a:bodyPr wrap="none" rtlCol="0">
+            <a:spAutoFit/>
+          </a:bodyPr>
+          <a:lstStyle/>
+          <a:p>
+            <a:pPr algn="r"/>
+            <a:r>
+              <a:rPr lang="de-DE" sz="1600">
+                <a:latin typeface="Roboto" panose="02000000000000000000" pitchFamily="2" charset="0"/>
+                <a:ea typeface="Roboto" panose="02000000000000000000" pitchFamily="2" charset="0"/>
+              </a:rPr>
+              <a:t>eye</a:t>
+            </a:r>
+          </a:p>
+        </p:txBody>
+      </p:sp>
+      <p:sp>
+        <p:nvSpPr>
+          <p:cNvPr id="49" name="TextBox 48">
+            <a:extLst>
+              <a:ext uri="{FF2B5EF4-FFF2-40B4-BE49-F238E27FC236}">
+                <a16:creationId xmlns:a16="http://schemas.microsoft.com/office/drawing/2014/main" id="{89E87860-E9BE-CD41-8306-B64597D0AF80}"/>
+              </a:ext>
+            </a:extLst>
+          </p:cNvPr>
+          <p:cNvSpPr txBox="1"/>
+          <p:nvPr/>
+        </p:nvSpPr>
+        <p:spPr>
+          <a:xfrm>
+            <a:off x="1963551" y="39478"/>
+            <a:ext cx="848309" cy="369332"/>
+          </a:xfrm>
+          <a:prstGeom prst="rect">
+            <a:avLst/>
+          </a:prstGeom>
+          <a:noFill/>
+        </p:spPr>
+        <p:txBody>
+          <a:bodyPr wrap="none" rtlCol="0">
+            <a:spAutoFit/>
+          </a:bodyPr>
+          <a:lstStyle/>
+          <a:p>
+            <a:r>
+              <a:rPr lang="de-DE">
+                <a:solidFill>
+                  <a:schemeClr val="bg1">
+                    <a:lumMod val="65000"/>
+                  </a:schemeClr>
+                </a:solidFill>
+                <a:latin typeface="Roboto" panose="02000000000000000000" pitchFamily="2" charset="0"/>
+                <a:ea typeface="Roboto" panose="02000000000000000000" pitchFamily="2" charset="0"/>
+              </a:rPr>
+              <a:t>before</a:t>
+            </a:r>
+          </a:p>
+        </p:txBody>
+      </p:sp>
+      <p:sp>
+        <p:nvSpPr>
+          <p:cNvPr id="50" name="TextBox 49">
+            <a:extLst>
+              <a:ext uri="{FF2B5EF4-FFF2-40B4-BE49-F238E27FC236}">
+                <a16:creationId xmlns:a16="http://schemas.microsoft.com/office/drawing/2014/main" id="{FC37C468-5995-CE40-AEFD-145ACA141F30}"/>
+              </a:ext>
+            </a:extLst>
+          </p:cNvPr>
+          <p:cNvSpPr txBox="1"/>
+          <p:nvPr/>
+        </p:nvSpPr>
+        <p:spPr>
+          <a:xfrm>
+            <a:off x="1963551" y="1423645"/>
+            <a:ext cx="665567" cy="369332"/>
+          </a:xfrm>
+          <a:prstGeom prst="rect">
+            <a:avLst/>
+          </a:prstGeom>
+          <a:noFill/>
+        </p:spPr>
+        <p:txBody>
+          <a:bodyPr wrap="none" rtlCol="0">
+            <a:spAutoFit/>
+          </a:bodyPr>
+          <a:lstStyle/>
+          <a:p>
+            <a:r>
+              <a:rPr lang="de-DE">
+                <a:solidFill>
+                  <a:schemeClr val="bg1">
+                    <a:lumMod val="65000"/>
+                  </a:schemeClr>
+                </a:solidFill>
+                <a:latin typeface="Roboto" panose="02000000000000000000" pitchFamily="2" charset="0"/>
+                <a:ea typeface="Roboto" panose="02000000000000000000" pitchFamily="2" charset="0"/>
+              </a:rPr>
+              <a:t>after</a:t>
+            </a:r>
+          </a:p>
+        </p:txBody>
+      </p:sp>
+    </p:spTree>
+    <p:extLst>
+      <p:ext uri="{BB962C8B-B14F-4D97-AF65-F5344CB8AC3E}">
+        <p14:creationId xmlns:p14="http://schemas.microsoft.com/office/powerpoint/2010/main" val="2256544502"/>
       </p:ext>
     </p:extLst>
   </p:cSld>

</xml_diff>

<commit_message>
even more on entities and relationships
</commit_message>
<xml_diff>
--- a/degree-thesis/en/Examples/diagram.pptx
+++ b/degree-thesis/en/Examples/diagram.pptx
@@ -1,6 +1,6 @@
 
 <file path=ppt/presentation.xml><?xml version="1.0" encoding="utf-8"?>
-<p:presentation xmlns:a="http://schemas.openxmlformats.org/drawingml/2006/main" xmlns:r="http://schemas.openxmlformats.org/officeDocument/2006/relationships" xmlns:p="http://schemas.openxmlformats.org/presentationml/2006/main" saveSubsetFonts="1" autoCompressPictures="0">
+<p:presentation xmlns:a="http://schemas.openxmlformats.org/drawingml/2006/main" xmlns:r="http://schemas.openxmlformats.org/officeDocument/2006/relationships" xmlns:p="http://schemas.openxmlformats.org/presentationml/2006/main" embedTrueTypeFonts="1" autoCompressPictures="0">
   <p:sldMasterIdLst>
     <p:sldMasterId id="2147483708" r:id="rId1"/>
   </p:sldMasterIdLst>
@@ -10,9 +10,32 @@
     <p:sldId id="259" r:id="rId4"/>
     <p:sldId id="260" r:id="rId5"/>
     <p:sldId id="261" r:id="rId6"/>
+    <p:sldId id="262" r:id="rId7"/>
+    <p:sldId id="263" r:id="rId8"/>
   </p:sldIdLst>
   <p:sldSz cx="8280400" cy="4319588"/>
   <p:notesSz cx="6858000" cy="9144000"/>
+  <p:embeddedFontLst>
+    <p:embeddedFont>
+      <p:font typeface="Calibri" panose="020F0502020204030204" pitchFamily="34" charset="0"/>
+      <p:regular r:id="rId9"/>
+      <p:bold r:id="rId10"/>
+      <p:italic r:id="rId11"/>
+      <p:boldItalic r:id="rId12"/>
+    </p:embeddedFont>
+    <p:embeddedFont>
+      <p:font typeface="Calibri Light" panose="020F0302020204030204" pitchFamily="34" charset="0"/>
+      <p:regular r:id="rId13"/>
+      <p:italic r:id="rId14"/>
+    </p:embeddedFont>
+    <p:embeddedFont>
+      <p:font typeface="Roboto" panose="02000000000000000000" pitchFamily="2" charset="0"/>
+      <p:regular r:id="rId15"/>
+      <p:bold r:id="rId16"/>
+      <p:italic r:id="rId17"/>
+      <p:boldItalic r:id="rId18"/>
+    </p:embeddedFont>
+  </p:embeddedFontLst>
   <p:defaultTextStyle>
     <a:defPPr>
       <a:defRPr lang="en-US"/>
@@ -246,7 +269,7 @@
           <a:lstStyle/>
           <a:p>
             <a:fld id="{89276540-48DD-D34F-BA48-84524032606B}" type="datetimeFigureOut">
-              <a:t>30.12.19</a:t>
+              <a:t>31.12.19</a:t>
             </a:fld>
             <a:endParaRPr lang="de-DE"/>
           </a:p>
@@ -414,7 +437,7 @@
           <a:lstStyle/>
           <a:p>
             <a:fld id="{89276540-48DD-D34F-BA48-84524032606B}" type="datetimeFigureOut">
-              <a:t>30.12.19</a:t>
+              <a:t>31.12.19</a:t>
             </a:fld>
             <a:endParaRPr lang="de-DE"/>
           </a:p>
@@ -592,7 +615,7 @@
           <a:lstStyle/>
           <a:p>
             <a:fld id="{89276540-48DD-D34F-BA48-84524032606B}" type="datetimeFigureOut">
-              <a:t>30.12.19</a:t>
+              <a:t>31.12.19</a:t>
             </a:fld>
             <a:endParaRPr lang="de-DE"/>
           </a:p>
@@ -760,7 +783,7 @@
           <a:lstStyle/>
           <a:p>
             <a:fld id="{89276540-48DD-D34F-BA48-84524032606B}" type="datetimeFigureOut">
-              <a:t>30.12.19</a:t>
+              <a:t>31.12.19</a:t>
             </a:fld>
             <a:endParaRPr lang="de-DE"/>
           </a:p>
@@ -1004,7 +1027,7 @@
           <a:lstStyle/>
           <a:p>
             <a:fld id="{89276540-48DD-D34F-BA48-84524032606B}" type="datetimeFigureOut">
-              <a:t>30.12.19</a:t>
+              <a:t>31.12.19</a:t>
             </a:fld>
             <a:endParaRPr lang="de-DE"/>
           </a:p>
@@ -1234,7 +1257,7 @@
           <a:lstStyle/>
           <a:p>
             <a:fld id="{89276540-48DD-D34F-BA48-84524032606B}" type="datetimeFigureOut">
-              <a:t>30.12.19</a:t>
+              <a:t>31.12.19</a:t>
             </a:fld>
             <a:endParaRPr lang="de-DE"/>
           </a:p>
@@ -1599,7 +1622,7 @@
           <a:lstStyle/>
           <a:p>
             <a:fld id="{89276540-48DD-D34F-BA48-84524032606B}" type="datetimeFigureOut">
-              <a:t>30.12.19</a:t>
+              <a:t>31.12.19</a:t>
             </a:fld>
             <a:endParaRPr lang="de-DE"/>
           </a:p>
@@ -1715,7 +1738,7 @@
           <a:lstStyle/>
           <a:p>
             <a:fld id="{89276540-48DD-D34F-BA48-84524032606B}" type="datetimeFigureOut">
-              <a:t>30.12.19</a:t>
+              <a:t>31.12.19</a:t>
             </a:fld>
             <a:endParaRPr lang="de-DE"/>
           </a:p>
@@ -1808,7 +1831,7 @@
           <a:lstStyle/>
           <a:p>
             <a:fld id="{89276540-48DD-D34F-BA48-84524032606B}" type="datetimeFigureOut">
-              <a:t>30.12.19</a:t>
+              <a:t>31.12.19</a:t>
             </a:fld>
             <a:endParaRPr lang="de-DE"/>
           </a:p>
@@ -2083,7 +2106,7 @@
           <a:lstStyle/>
           <a:p>
             <a:fld id="{89276540-48DD-D34F-BA48-84524032606B}" type="datetimeFigureOut">
-              <a:t>30.12.19</a:t>
+              <a:t>31.12.19</a:t>
             </a:fld>
             <a:endParaRPr lang="de-DE"/>
           </a:p>
@@ -2338,7 +2361,7 @@
           <a:lstStyle/>
           <a:p>
             <a:fld id="{89276540-48DD-D34F-BA48-84524032606B}" type="datetimeFigureOut">
-              <a:t>30.12.19</a:t>
+              <a:t>31.12.19</a:t>
             </a:fld>
             <a:endParaRPr lang="de-DE"/>
           </a:p>
@@ -2549,7 +2572,7 @@
           </a:lstStyle>
           <a:p>
             <a:fld id="{89276540-48DD-D34F-BA48-84524032606B}" type="datetimeFigureOut">
-              <a:t>30.12.19</a:t>
+              <a:t>31.12.19</a:t>
             </a:fld>
             <a:endParaRPr lang="de-DE"/>
           </a:p>
@@ -9368,6 +9391,4185 @@
 </p:sld>
 </file>
 
+<file path=ppt/slides/slide6.xml><?xml version="1.0" encoding="utf-8"?>
+<p:sld xmlns:a="http://schemas.openxmlformats.org/drawingml/2006/main" xmlns:r="http://schemas.openxmlformats.org/officeDocument/2006/relationships" xmlns:p="http://schemas.openxmlformats.org/presentationml/2006/main">
+  <p:cSld>
+    <p:spTree>
+      <p:nvGrpSpPr>
+        <p:cNvPr id="1" name=""/>
+        <p:cNvGrpSpPr/>
+        <p:nvPr/>
+      </p:nvGrpSpPr>
+      <p:grpSpPr>
+        <a:xfrm>
+          <a:off x="0" y="0"/>
+          <a:ext cx="0" cy="0"/>
+          <a:chOff x="0" y="0"/>
+          <a:chExt cx="0" cy="0"/>
+        </a:xfrm>
+      </p:grpSpPr>
+      <p:sp>
+        <p:nvSpPr>
+          <p:cNvPr id="60" name="Oval 59">
+            <a:extLst>
+              <a:ext uri="{FF2B5EF4-FFF2-40B4-BE49-F238E27FC236}">
+                <a16:creationId xmlns:a16="http://schemas.microsoft.com/office/drawing/2014/main" id="{FAC8FA72-EBA2-1448-B819-A07A67E1D1ED}"/>
+              </a:ext>
+            </a:extLst>
+          </p:cNvPr>
+          <p:cNvSpPr/>
+          <p:nvPr/>
+        </p:nvSpPr>
+        <p:spPr>
+          <a:xfrm>
+            <a:off x="2407604" y="242942"/>
+            <a:ext cx="594360" cy="338933"/>
+          </a:xfrm>
+          <a:prstGeom prst="ellipse">
+            <a:avLst/>
+          </a:prstGeom>
+          <a:noFill/>
+          <a:ln>
+            <a:solidFill>
+              <a:schemeClr val="tx1"/>
+            </a:solidFill>
+          </a:ln>
+        </p:spPr>
+        <p:style>
+          <a:lnRef idx="2">
+            <a:schemeClr val="accent1">
+              <a:shade val="50000"/>
+            </a:schemeClr>
+          </a:lnRef>
+          <a:fillRef idx="1">
+            <a:schemeClr val="accent1"/>
+          </a:fillRef>
+          <a:effectRef idx="0">
+            <a:schemeClr val="accent1"/>
+          </a:effectRef>
+          <a:fontRef idx="minor">
+            <a:schemeClr val="lt1"/>
+          </a:fontRef>
+        </p:style>
+        <p:txBody>
+          <a:bodyPr rot="0" spcFirstLastPara="0" vertOverflow="overflow" horzOverflow="overflow" vert="horz" wrap="square" lIns="91440" tIns="45720" rIns="91440" bIns="45720" numCol="1" spcCol="0" rtlCol="0" fromWordArt="0" anchor="ctr" anchorCtr="0" forceAA="0" compatLnSpc="1">
+            <a:prstTxWarp prst="textNoShape">
+              <a:avLst/>
+            </a:prstTxWarp>
+            <a:noAutofit/>
+          </a:bodyPr>
+          <a:lstStyle/>
+          <a:p>
+            <a:pPr algn="ctr"/>
+            <a:endParaRPr lang="de-DE">
+              <a:latin typeface="Roboto" panose="02000000000000000000" pitchFamily="2" charset="0"/>
+              <a:ea typeface="Roboto" panose="02000000000000000000" pitchFamily="2" charset="0"/>
+            </a:endParaRPr>
+          </a:p>
+        </p:txBody>
+      </p:sp>
+      <p:sp>
+        <p:nvSpPr>
+          <p:cNvPr id="63" name="Oval 62">
+            <a:extLst>
+              <a:ext uri="{FF2B5EF4-FFF2-40B4-BE49-F238E27FC236}">
+                <a16:creationId xmlns:a16="http://schemas.microsoft.com/office/drawing/2014/main" id="{E6ABEC2F-3EA1-8740-B04F-78D4A9D01E68}"/>
+              </a:ext>
+            </a:extLst>
+          </p:cNvPr>
+          <p:cNvSpPr>
+            <a:spLocks noChangeAspect="1"/>
+          </p:cNvSpPr>
+          <p:nvPr/>
+        </p:nvSpPr>
+        <p:spPr>
+          <a:xfrm>
+            <a:off x="2407604" y="1130280"/>
+            <a:ext cx="594360" cy="338934"/>
+          </a:xfrm>
+          <a:prstGeom prst="ellipse">
+            <a:avLst/>
+          </a:prstGeom>
+          <a:solidFill>
+            <a:schemeClr val="bg2"/>
+          </a:solidFill>
+          <a:ln>
+            <a:solidFill>
+              <a:schemeClr val="tx1"/>
+            </a:solidFill>
+          </a:ln>
+        </p:spPr>
+        <p:style>
+          <a:lnRef idx="2">
+            <a:schemeClr val="accent1">
+              <a:shade val="50000"/>
+            </a:schemeClr>
+          </a:lnRef>
+          <a:fillRef idx="1">
+            <a:schemeClr val="accent1"/>
+          </a:fillRef>
+          <a:effectRef idx="0">
+            <a:schemeClr val="accent1"/>
+          </a:effectRef>
+          <a:fontRef idx="minor">
+            <a:schemeClr val="lt1"/>
+          </a:fontRef>
+        </p:style>
+        <p:txBody>
+          <a:bodyPr rot="0" spcFirstLastPara="0" vertOverflow="overflow" horzOverflow="overflow" vert="horz" wrap="square" lIns="91440" tIns="45720" rIns="91440" bIns="45720" numCol="1" spcCol="0" rtlCol="0" fromWordArt="0" anchor="ctr" anchorCtr="0" forceAA="0" compatLnSpc="1">
+            <a:prstTxWarp prst="textNoShape">
+              <a:avLst/>
+            </a:prstTxWarp>
+            <a:noAutofit/>
+          </a:bodyPr>
+          <a:lstStyle/>
+          <a:p>
+            <a:pPr algn="ctr"/>
+            <a:endParaRPr lang="de-DE">
+              <a:latin typeface="Roboto" panose="02000000000000000000" pitchFamily="2" charset="0"/>
+              <a:ea typeface="Roboto" panose="02000000000000000000" pitchFamily="2" charset="0"/>
+            </a:endParaRPr>
+          </a:p>
+        </p:txBody>
+      </p:sp>
+      <p:sp>
+        <p:nvSpPr>
+          <p:cNvPr id="67" name="TextBox 66">
+            <a:extLst>
+              <a:ext uri="{FF2B5EF4-FFF2-40B4-BE49-F238E27FC236}">
+                <a16:creationId xmlns:a16="http://schemas.microsoft.com/office/drawing/2014/main" id="{14B3BF26-7856-B64E-B5ED-35AC0C8D0ED7}"/>
+              </a:ext>
+            </a:extLst>
+          </p:cNvPr>
+          <p:cNvSpPr txBox="1"/>
+          <p:nvPr/>
+        </p:nvSpPr>
+        <p:spPr>
+          <a:xfrm>
+            <a:off x="-15937" y="83006"/>
+            <a:ext cx="2323072" cy="1585049"/>
+          </a:xfrm>
+          <a:prstGeom prst="rect">
+            <a:avLst/>
+          </a:prstGeom>
+          <a:noFill/>
+        </p:spPr>
+        <p:txBody>
+          <a:bodyPr wrap="none" rtlCol="0">
+            <a:spAutoFit/>
+          </a:bodyPr>
+          <a:lstStyle/>
+          <a:p>
+            <a:pPr marL="346075" indent="-346075">
+              <a:spcAft>
+                <a:spcPts val="3000"/>
+              </a:spcAft>
+              <a:buAutoNum type="arabicPeriod"/>
+              <a:tabLst>
+                <a:tab pos="261938" algn="l"/>
+              </a:tabLst>
+            </a:pPr>
+            <a:r>
+              <a:rPr lang="de-DE">
+                <a:latin typeface="Roboto" panose="02000000000000000000" pitchFamily="2" charset="0"/>
+                <a:ea typeface="Roboto" panose="02000000000000000000" pitchFamily="2" charset="0"/>
+              </a:rPr>
+              <a:t>Closed contour:</a:t>
+            </a:r>
+            <a:br>
+              <a:rPr lang="de-DE">
+                <a:latin typeface="Roboto" panose="02000000000000000000" pitchFamily="2" charset="0"/>
+                <a:ea typeface="Roboto" panose="02000000000000000000" pitchFamily="2" charset="0"/>
+              </a:rPr>
+            </a:br>
+            <a:r>
+              <a:rPr lang="de-DE">
+                <a:latin typeface="Roboto" panose="02000000000000000000" pitchFamily="2" charset="0"/>
+                <a:ea typeface="Roboto" panose="02000000000000000000" pitchFamily="2" charset="0"/>
+              </a:rPr>
+              <a:t>objects</a:t>
+            </a:r>
+          </a:p>
+          <a:p>
+            <a:pPr marL="346075" indent="-346075">
+              <a:spcAft>
+                <a:spcPts val="3000"/>
+              </a:spcAft>
+              <a:buAutoNum type="arabicPeriod"/>
+              <a:tabLst>
+                <a:tab pos="261938" algn="l"/>
+              </a:tabLst>
+            </a:pPr>
+            <a:r>
+              <a:rPr lang="de-DE">
+                <a:latin typeface="Roboto" panose="02000000000000000000" pitchFamily="2" charset="0"/>
+                <a:ea typeface="Roboto" panose="02000000000000000000" pitchFamily="2" charset="0"/>
+              </a:rPr>
+              <a:t>Compact shapes:</a:t>
+            </a:r>
+            <a:br>
+              <a:rPr lang="de-DE">
+                <a:latin typeface="Roboto" panose="02000000000000000000" pitchFamily="2" charset="0"/>
+                <a:ea typeface="Roboto" panose="02000000000000000000" pitchFamily="2" charset="0"/>
+              </a:rPr>
+            </a:br>
+            <a:r>
+              <a:rPr lang="de-DE">
+                <a:latin typeface="Roboto" panose="02000000000000000000" pitchFamily="2" charset="0"/>
+                <a:ea typeface="Roboto" panose="02000000000000000000" pitchFamily="2" charset="0"/>
+              </a:rPr>
+              <a:t>entity types</a:t>
+            </a:r>
+          </a:p>
+        </p:txBody>
+      </p:sp>
+      <p:sp>
+        <p:nvSpPr>
+          <p:cNvPr id="26" name="Rectangle 25">
+            <a:extLst>
+              <a:ext uri="{FF2B5EF4-FFF2-40B4-BE49-F238E27FC236}">
+                <a16:creationId xmlns:a16="http://schemas.microsoft.com/office/drawing/2014/main" id="{C083559F-E759-F740-B39B-9AFFD226B550}"/>
+              </a:ext>
+            </a:extLst>
+          </p:cNvPr>
+          <p:cNvSpPr/>
+          <p:nvPr/>
+        </p:nvSpPr>
+        <p:spPr>
+          <a:xfrm>
+            <a:off x="3128124" y="236704"/>
+            <a:ext cx="594360" cy="338933"/>
+          </a:xfrm>
+          <a:prstGeom prst="rect">
+            <a:avLst/>
+          </a:prstGeom>
+          <a:noFill/>
+          <a:ln>
+            <a:solidFill>
+              <a:schemeClr val="tx1"/>
+            </a:solidFill>
+          </a:ln>
+        </p:spPr>
+        <p:style>
+          <a:lnRef idx="2">
+            <a:schemeClr val="accent1">
+              <a:shade val="50000"/>
+            </a:schemeClr>
+          </a:lnRef>
+          <a:fillRef idx="1">
+            <a:schemeClr val="accent1"/>
+          </a:fillRef>
+          <a:effectRef idx="0">
+            <a:schemeClr val="accent1"/>
+          </a:effectRef>
+          <a:fontRef idx="minor">
+            <a:schemeClr val="lt1"/>
+          </a:fontRef>
+        </p:style>
+        <p:txBody>
+          <a:bodyPr rot="0" spcFirstLastPara="0" vertOverflow="overflow" horzOverflow="overflow" vert="horz" wrap="square" lIns="91440" tIns="45720" rIns="91440" bIns="45720" numCol="1" spcCol="0" rtlCol="0" fromWordArt="0" anchor="ctr" anchorCtr="0" forceAA="0" compatLnSpc="1">
+            <a:prstTxWarp prst="textNoShape">
+              <a:avLst/>
+            </a:prstTxWarp>
+            <a:noAutofit/>
+          </a:bodyPr>
+          <a:lstStyle/>
+          <a:p>
+            <a:pPr algn="ctr"/>
+            <a:endParaRPr lang="de-DE">
+              <a:latin typeface="Roboto" panose="02000000000000000000" pitchFamily="2" charset="0"/>
+              <a:ea typeface="Roboto" panose="02000000000000000000" pitchFamily="2" charset="0"/>
+            </a:endParaRPr>
+          </a:p>
+        </p:txBody>
+      </p:sp>
+      <p:sp>
+        <p:nvSpPr>
+          <p:cNvPr id="29" name="Rectangle 28">
+            <a:extLst>
+              <a:ext uri="{FF2B5EF4-FFF2-40B4-BE49-F238E27FC236}">
+                <a16:creationId xmlns:a16="http://schemas.microsoft.com/office/drawing/2014/main" id="{C505C47B-4E07-BA4A-9E05-C72675936E65}"/>
+              </a:ext>
+            </a:extLst>
+          </p:cNvPr>
+          <p:cNvSpPr>
+            <a:spLocks noChangeAspect="1"/>
+          </p:cNvSpPr>
+          <p:nvPr/>
+        </p:nvSpPr>
+        <p:spPr>
+          <a:xfrm>
+            <a:off x="3128124" y="1130280"/>
+            <a:ext cx="594360" cy="338934"/>
+          </a:xfrm>
+          <a:prstGeom prst="rect">
+            <a:avLst/>
+          </a:prstGeom>
+          <a:solidFill>
+            <a:schemeClr val="bg2"/>
+          </a:solidFill>
+          <a:ln>
+            <a:solidFill>
+              <a:schemeClr val="tx1"/>
+            </a:solidFill>
+          </a:ln>
+        </p:spPr>
+        <p:style>
+          <a:lnRef idx="2">
+            <a:schemeClr val="accent1">
+              <a:shade val="50000"/>
+            </a:schemeClr>
+          </a:lnRef>
+          <a:fillRef idx="1">
+            <a:schemeClr val="accent1"/>
+          </a:fillRef>
+          <a:effectRef idx="0">
+            <a:schemeClr val="accent1"/>
+          </a:effectRef>
+          <a:fontRef idx="minor">
+            <a:schemeClr val="lt1"/>
+          </a:fontRef>
+        </p:style>
+        <p:txBody>
+          <a:bodyPr rot="0" spcFirstLastPara="0" vertOverflow="overflow" horzOverflow="overflow" vert="horz" wrap="square" lIns="91440" tIns="45720" rIns="91440" bIns="45720" numCol="1" spcCol="0" rtlCol="0" fromWordArt="0" anchor="ctr" anchorCtr="0" forceAA="0" compatLnSpc="1">
+            <a:prstTxWarp prst="textNoShape">
+              <a:avLst/>
+            </a:prstTxWarp>
+            <a:noAutofit/>
+          </a:bodyPr>
+          <a:lstStyle/>
+          <a:p>
+            <a:pPr algn="ctr"/>
+            <a:endParaRPr lang="de-DE">
+              <a:latin typeface="Roboto" panose="02000000000000000000" pitchFamily="2" charset="0"/>
+              <a:ea typeface="Roboto" panose="02000000000000000000" pitchFamily="2" charset="0"/>
+            </a:endParaRPr>
+          </a:p>
+        </p:txBody>
+      </p:sp>
+      <p:sp>
+        <p:nvSpPr>
+          <p:cNvPr id="30" name="Snip Single Corner of Rectangle 29">
+            <a:extLst>
+              <a:ext uri="{FF2B5EF4-FFF2-40B4-BE49-F238E27FC236}">
+                <a16:creationId xmlns:a16="http://schemas.microsoft.com/office/drawing/2014/main" id="{AF54CA9A-444B-CA45-8275-35C3CAAAD679}"/>
+              </a:ext>
+            </a:extLst>
+          </p:cNvPr>
+          <p:cNvSpPr>
+            <a:spLocks noChangeAspect="1"/>
+          </p:cNvSpPr>
+          <p:nvPr/>
+        </p:nvSpPr>
+        <p:spPr>
+          <a:xfrm>
+            <a:off x="3128124" y="1560592"/>
+            <a:ext cx="594360" cy="338934"/>
+          </a:xfrm>
+          <a:prstGeom prst="snip1Rect">
+            <a:avLst>
+              <a:gd name="adj" fmla="val 40387"/>
+            </a:avLst>
+          </a:prstGeom>
+          <a:solidFill>
+            <a:schemeClr val="bg2"/>
+          </a:solidFill>
+          <a:ln>
+            <a:solidFill>
+              <a:schemeClr val="tx1"/>
+            </a:solidFill>
+          </a:ln>
+        </p:spPr>
+        <p:style>
+          <a:lnRef idx="2">
+            <a:schemeClr val="accent1">
+              <a:shade val="50000"/>
+            </a:schemeClr>
+          </a:lnRef>
+          <a:fillRef idx="1">
+            <a:schemeClr val="accent1"/>
+          </a:fillRef>
+          <a:effectRef idx="0">
+            <a:schemeClr val="accent1"/>
+          </a:effectRef>
+          <a:fontRef idx="minor">
+            <a:schemeClr val="lt1"/>
+          </a:fontRef>
+        </p:style>
+        <p:txBody>
+          <a:bodyPr rot="0" spcFirstLastPara="0" vertOverflow="overflow" horzOverflow="overflow" vert="horz" wrap="square" lIns="91440" tIns="45720" rIns="91440" bIns="45720" numCol="1" spcCol="0" rtlCol="0" fromWordArt="0" anchor="ctr" anchorCtr="0" forceAA="0" compatLnSpc="1">
+            <a:prstTxWarp prst="textNoShape">
+              <a:avLst/>
+            </a:prstTxWarp>
+            <a:noAutofit/>
+          </a:bodyPr>
+          <a:lstStyle/>
+          <a:p>
+            <a:pPr algn="ctr"/>
+            <a:endParaRPr lang="de-DE">
+              <a:latin typeface="Roboto" panose="02000000000000000000" pitchFamily="2" charset="0"/>
+              <a:ea typeface="Roboto" panose="02000000000000000000" pitchFamily="2" charset="0"/>
+            </a:endParaRPr>
+          </a:p>
+        </p:txBody>
+      </p:sp>
+      <p:sp>
+        <p:nvSpPr>
+          <p:cNvPr id="31" name="Rounded Rectangle 30">
+            <a:extLst>
+              <a:ext uri="{FF2B5EF4-FFF2-40B4-BE49-F238E27FC236}">
+                <a16:creationId xmlns:a16="http://schemas.microsoft.com/office/drawing/2014/main" id="{BD6D02B8-4131-B047-A992-5D7A40EA2AA7}"/>
+              </a:ext>
+            </a:extLst>
+          </p:cNvPr>
+          <p:cNvSpPr>
+            <a:spLocks noChangeAspect="1"/>
+          </p:cNvSpPr>
+          <p:nvPr/>
+        </p:nvSpPr>
+        <p:spPr>
+          <a:xfrm>
+            <a:off x="2407604" y="1560592"/>
+            <a:ext cx="594360" cy="338934"/>
+          </a:xfrm>
+          <a:prstGeom prst="roundRect">
+            <a:avLst>
+              <a:gd name="adj" fmla="val 31492"/>
+            </a:avLst>
+          </a:prstGeom>
+          <a:solidFill>
+            <a:schemeClr val="bg2"/>
+          </a:solidFill>
+          <a:ln>
+            <a:solidFill>
+              <a:schemeClr val="tx1"/>
+            </a:solidFill>
+          </a:ln>
+        </p:spPr>
+        <p:style>
+          <a:lnRef idx="2">
+            <a:schemeClr val="accent1">
+              <a:shade val="50000"/>
+            </a:schemeClr>
+          </a:lnRef>
+          <a:fillRef idx="1">
+            <a:schemeClr val="accent1"/>
+          </a:fillRef>
+          <a:effectRef idx="0">
+            <a:schemeClr val="accent1"/>
+          </a:effectRef>
+          <a:fontRef idx="minor">
+            <a:schemeClr val="lt1"/>
+          </a:fontRef>
+        </p:style>
+        <p:txBody>
+          <a:bodyPr rot="0" spcFirstLastPara="0" vertOverflow="overflow" horzOverflow="overflow" vert="horz" wrap="square" lIns="91440" tIns="45720" rIns="91440" bIns="45720" numCol="1" spcCol="0" rtlCol="0" fromWordArt="0" anchor="ctr" anchorCtr="0" forceAA="0" compatLnSpc="1">
+            <a:prstTxWarp prst="textNoShape">
+              <a:avLst/>
+            </a:prstTxWarp>
+            <a:noAutofit/>
+          </a:bodyPr>
+          <a:lstStyle/>
+          <a:p>
+            <a:pPr algn="ctr"/>
+            <a:endParaRPr lang="de-DE">
+              <a:latin typeface="Roboto" panose="02000000000000000000" pitchFamily="2" charset="0"/>
+              <a:ea typeface="Roboto" panose="02000000000000000000" pitchFamily="2" charset="0"/>
+            </a:endParaRPr>
+          </a:p>
+        </p:txBody>
+      </p:sp>
+      <p:sp>
+        <p:nvSpPr>
+          <p:cNvPr id="32" name="Oval 31">
+            <a:extLst>
+              <a:ext uri="{FF2B5EF4-FFF2-40B4-BE49-F238E27FC236}">
+                <a16:creationId xmlns:a16="http://schemas.microsoft.com/office/drawing/2014/main" id="{E1765A0D-3464-8D4D-872D-AF537B950E06}"/>
+              </a:ext>
+            </a:extLst>
+          </p:cNvPr>
+          <p:cNvSpPr/>
+          <p:nvPr/>
+        </p:nvSpPr>
+        <p:spPr>
+          <a:xfrm>
+            <a:off x="6734196" y="242942"/>
+            <a:ext cx="385602" cy="338933"/>
+          </a:xfrm>
+          <a:prstGeom prst="ellipse">
+            <a:avLst/>
+          </a:prstGeom>
+          <a:solidFill>
+            <a:schemeClr val="bg2">
+              <a:lumMod val="50000"/>
+            </a:schemeClr>
+          </a:solidFill>
+          <a:ln>
+            <a:solidFill>
+              <a:schemeClr val="tx1"/>
+            </a:solidFill>
+          </a:ln>
+        </p:spPr>
+        <p:style>
+          <a:lnRef idx="2">
+            <a:schemeClr val="accent1">
+              <a:shade val="50000"/>
+            </a:schemeClr>
+          </a:lnRef>
+          <a:fillRef idx="1">
+            <a:schemeClr val="accent1"/>
+          </a:fillRef>
+          <a:effectRef idx="0">
+            <a:schemeClr val="accent1"/>
+          </a:effectRef>
+          <a:fontRef idx="minor">
+            <a:schemeClr val="lt1"/>
+          </a:fontRef>
+        </p:style>
+        <p:txBody>
+          <a:bodyPr rot="0" spcFirstLastPara="0" vertOverflow="overflow" horzOverflow="overflow" vert="horz" wrap="square" lIns="91440" tIns="45720" rIns="91440" bIns="45720" numCol="1" spcCol="0" rtlCol="0" fromWordArt="0" anchor="ctr" anchorCtr="0" forceAA="0" compatLnSpc="1">
+            <a:prstTxWarp prst="textNoShape">
+              <a:avLst/>
+            </a:prstTxWarp>
+            <a:noAutofit/>
+          </a:bodyPr>
+          <a:lstStyle/>
+          <a:p>
+            <a:pPr algn="ctr"/>
+            <a:endParaRPr lang="de-DE">
+              <a:latin typeface="Roboto" panose="02000000000000000000" pitchFamily="2" charset="0"/>
+              <a:ea typeface="Roboto" panose="02000000000000000000" pitchFamily="2" charset="0"/>
+            </a:endParaRPr>
+          </a:p>
+        </p:txBody>
+      </p:sp>
+      <p:sp>
+        <p:nvSpPr>
+          <p:cNvPr id="34" name="TextBox 33">
+            <a:extLst>
+              <a:ext uri="{FF2B5EF4-FFF2-40B4-BE49-F238E27FC236}">
+                <a16:creationId xmlns:a16="http://schemas.microsoft.com/office/drawing/2014/main" id="{C3082F38-6C9A-5B40-88FD-F7835E611063}"/>
+              </a:ext>
+            </a:extLst>
+          </p:cNvPr>
+          <p:cNvSpPr txBox="1"/>
+          <p:nvPr/>
+        </p:nvSpPr>
+        <p:spPr>
+          <a:xfrm>
+            <a:off x="4445125" y="83006"/>
+            <a:ext cx="2087431" cy="1585049"/>
+          </a:xfrm>
+          <a:prstGeom prst="rect">
+            <a:avLst/>
+          </a:prstGeom>
+          <a:noFill/>
+        </p:spPr>
+        <p:txBody>
+          <a:bodyPr wrap="none" rtlCol="0">
+            <a:spAutoFit/>
+          </a:bodyPr>
+          <a:lstStyle/>
+          <a:p>
+            <a:pPr marL="346075" indent="-346075">
+              <a:spcAft>
+                <a:spcPts val="3000"/>
+              </a:spcAft>
+              <a:buFont typeface="+mj-lt"/>
+              <a:buAutoNum type="arabicPeriod" startAt="3"/>
+              <a:tabLst>
+                <a:tab pos="261938" algn="l"/>
+              </a:tabLst>
+            </a:pPr>
+            <a:r>
+              <a:rPr lang="de-DE">
+                <a:latin typeface="Roboto" panose="02000000000000000000" pitchFamily="2" charset="0"/>
+                <a:ea typeface="Roboto" panose="02000000000000000000" pitchFamily="2" charset="0"/>
+              </a:rPr>
+              <a:t>Color of shape:</a:t>
+            </a:r>
+            <a:br>
+              <a:rPr lang="de-DE">
+                <a:latin typeface="Roboto" panose="02000000000000000000" pitchFamily="2" charset="0"/>
+                <a:ea typeface="Roboto" panose="02000000000000000000" pitchFamily="2" charset="0"/>
+              </a:rPr>
+            </a:br>
+            <a:r>
+              <a:rPr lang="de-DE">
+                <a:latin typeface="Roboto" panose="02000000000000000000" pitchFamily="2" charset="0"/>
+                <a:ea typeface="Roboto" panose="02000000000000000000" pitchFamily="2" charset="0"/>
+              </a:rPr>
+              <a:t>entity types</a:t>
+            </a:r>
+          </a:p>
+          <a:p>
+            <a:pPr marL="346075" indent="-346075">
+              <a:spcAft>
+                <a:spcPts val="3000"/>
+              </a:spcAft>
+              <a:buAutoNum type="arabicPeriod" startAt="3"/>
+              <a:tabLst>
+                <a:tab pos="261938" algn="l"/>
+              </a:tabLst>
+            </a:pPr>
+            <a:r>
+              <a:rPr lang="de-DE">
+                <a:latin typeface="Roboto" panose="02000000000000000000" pitchFamily="2" charset="0"/>
+                <a:ea typeface="Roboto" panose="02000000000000000000" pitchFamily="2" charset="0"/>
+              </a:rPr>
+              <a:t>Size of shape:</a:t>
+            </a:r>
+            <a:br>
+              <a:rPr lang="de-DE">
+                <a:latin typeface="Roboto" panose="02000000000000000000" pitchFamily="2" charset="0"/>
+                <a:ea typeface="Roboto" panose="02000000000000000000" pitchFamily="2" charset="0"/>
+              </a:rPr>
+            </a:br>
+            <a:r>
+              <a:rPr lang="de-DE">
+                <a:latin typeface="Roboto" panose="02000000000000000000" pitchFamily="2" charset="0"/>
+                <a:ea typeface="Roboto" panose="02000000000000000000" pitchFamily="2" charset="0"/>
+              </a:rPr>
+              <a:t>entity value </a:t>
+            </a:r>
+          </a:p>
+        </p:txBody>
+      </p:sp>
+      <p:sp>
+        <p:nvSpPr>
+          <p:cNvPr id="36" name="Rectangle 35">
+            <a:extLst>
+              <a:ext uri="{FF2B5EF4-FFF2-40B4-BE49-F238E27FC236}">
+                <a16:creationId xmlns:a16="http://schemas.microsoft.com/office/drawing/2014/main" id="{3EFFE351-259C-EB43-B20B-CB9F51F18CDB}"/>
+              </a:ext>
+            </a:extLst>
+          </p:cNvPr>
+          <p:cNvSpPr>
+            <a:spLocks noChangeAspect="1"/>
+          </p:cNvSpPr>
+          <p:nvPr/>
+        </p:nvSpPr>
+        <p:spPr>
+          <a:xfrm>
+            <a:off x="6532556" y="1130280"/>
+            <a:ext cx="946950" cy="769246"/>
+          </a:xfrm>
+          <a:prstGeom prst="rect">
+            <a:avLst/>
+          </a:prstGeom>
+          <a:solidFill>
+            <a:schemeClr val="bg2"/>
+          </a:solidFill>
+          <a:ln>
+            <a:solidFill>
+              <a:schemeClr val="tx1"/>
+            </a:solidFill>
+          </a:ln>
+        </p:spPr>
+        <p:style>
+          <a:lnRef idx="2">
+            <a:schemeClr val="accent1">
+              <a:shade val="50000"/>
+            </a:schemeClr>
+          </a:lnRef>
+          <a:fillRef idx="1">
+            <a:schemeClr val="accent1"/>
+          </a:fillRef>
+          <a:effectRef idx="0">
+            <a:schemeClr val="accent1"/>
+          </a:effectRef>
+          <a:fontRef idx="minor">
+            <a:schemeClr val="lt1"/>
+          </a:fontRef>
+        </p:style>
+        <p:txBody>
+          <a:bodyPr rot="0" spcFirstLastPara="0" vertOverflow="overflow" horzOverflow="overflow" vert="horz" wrap="square" lIns="91440" tIns="45720" rIns="91440" bIns="45720" numCol="1" spcCol="0" rtlCol="0" fromWordArt="0" anchor="ctr" anchorCtr="0" forceAA="0" compatLnSpc="1">
+            <a:prstTxWarp prst="textNoShape">
+              <a:avLst/>
+            </a:prstTxWarp>
+            <a:noAutofit/>
+          </a:bodyPr>
+          <a:lstStyle/>
+          <a:p>
+            <a:pPr algn="ctr"/>
+            <a:endParaRPr lang="de-DE">
+              <a:latin typeface="Roboto" panose="02000000000000000000" pitchFamily="2" charset="0"/>
+              <a:ea typeface="Roboto" panose="02000000000000000000" pitchFamily="2" charset="0"/>
+            </a:endParaRPr>
+          </a:p>
+        </p:txBody>
+      </p:sp>
+      <p:sp>
+        <p:nvSpPr>
+          <p:cNvPr id="37" name="Snip Single Corner of Rectangle 36">
+            <a:extLst>
+              <a:ext uri="{FF2B5EF4-FFF2-40B4-BE49-F238E27FC236}">
+                <a16:creationId xmlns:a16="http://schemas.microsoft.com/office/drawing/2014/main" id="{72B4F9D8-05B8-D24A-9454-117616026BB5}"/>
+              </a:ext>
+            </a:extLst>
+          </p:cNvPr>
+          <p:cNvSpPr>
+            <a:spLocks noChangeAspect="1"/>
+          </p:cNvSpPr>
+          <p:nvPr/>
+        </p:nvSpPr>
+        <p:spPr>
+          <a:xfrm>
+            <a:off x="7583982" y="1560592"/>
+            <a:ext cx="594360" cy="338934"/>
+          </a:xfrm>
+          <a:prstGeom prst="snip1Rect">
+            <a:avLst>
+              <a:gd name="adj" fmla="val 40387"/>
+            </a:avLst>
+          </a:prstGeom>
+          <a:solidFill>
+            <a:schemeClr val="bg2"/>
+          </a:solidFill>
+          <a:ln>
+            <a:solidFill>
+              <a:schemeClr val="tx1"/>
+            </a:solidFill>
+          </a:ln>
+        </p:spPr>
+        <p:style>
+          <a:lnRef idx="2">
+            <a:schemeClr val="accent1">
+              <a:shade val="50000"/>
+            </a:schemeClr>
+          </a:lnRef>
+          <a:fillRef idx="1">
+            <a:schemeClr val="accent1"/>
+          </a:fillRef>
+          <a:effectRef idx="0">
+            <a:schemeClr val="accent1"/>
+          </a:effectRef>
+          <a:fontRef idx="minor">
+            <a:schemeClr val="lt1"/>
+          </a:fontRef>
+        </p:style>
+        <p:txBody>
+          <a:bodyPr rot="0" spcFirstLastPara="0" vertOverflow="overflow" horzOverflow="overflow" vert="horz" wrap="square" lIns="91440" tIns="45720" rIns="91440" bIns="45720" numCol="1" spcCol="0" rtlCol="0" fromWordArt="0" anchor="ctr" anchorCtr="0" forceAA="0" compatLnSpc="1">
+            <a:prstTxWarp prst="textNoShape">
+              <a:avLst/>
+            </a:prstTxWarp>
+            <a:noAutofit/>
+          </a:bodyPr>
+          <a:lstStyle/>
+          <a:p>
+            <a:pPr algn="ctr"/>
+            <a:endParaRPr lang="de-DE">
+              <a:latin typeface="Roboto" panose="02000000000000000000" pitchFamily="2" charset="0"/>
+              <a:ea typeface="Roboto" panose="02000000000000000000" pitchFamily="2" charset="0"/>
+            </a:endParaRPr>
+          </a:p>
+        </p:txBody>
+      </p:sp>
+      <p:sp>
+        <p:nvSpPr>
+          <p:cNvPr id="16" name="Oval 15">
+            <a:extLst>
+              <a:ext uri="{FF2B5EF4-FFF2-40B4-BE49-F238E27FC236}">
+                <a16:creationId xmlns:a16="http://schemas.microsoft.com/office/drawing/2014/main" id="{126EFD93-DCBE-C740-92A8-63B71F7D1072}"/>
+              </a:ext>
+            </a:extLst>
+          </p:cNvPr>
+          <p:cNvSpPr/>
+          <p:nvPr/>
+        </p:nvSpPr>
+        <p:spPr>
+          <a:xfrm>
+            <a:off x="7191396" y="242942"/>
+            <a:ext cx="385602" cy="338933"/>
+          </a:xfrm>
+          <a:prstGeom prst="ellipse">
+            <a:avLst/>
+          </a:prstGeom>
+          <a:solidFill>
+            <a:schemeClr val="accent6">
+              <a:lumMod val="60000"/>
+              <a:lumOff val="40000"/>
+            </a:schemeClr>
+          </a:solidFill>
+          <a:ln>
+            <a:solidFill>
+              <a:schemeClr val="tx1"/>
+            </a:solidFill>
+          </a:ln>
+        </p:spPr>
+        <p:style>
+          <a:lnRef idx="2">
+            <a:schemeClr val="accent1">
+              <a:shade val="50000"/>
+            </a:schemeClr>
+          </a:lnRef>
+          <a:fillRef idx="1">
+            <a:schemeClr val="accent1"/>
+          </a:fillRef>
+          <a:effectRef idx="0">
+            <a:schemeClr val="accent1"/>
+          </a:effectRef>
+          <a:fontRef idx="minor">
+            <a:schemeClr val="lt1"/>
+          </a:fontRef>
+        </p:style>
+        <p:txBody>
+          <a:bodyPr rot="0" spcFirstLastPara="0" vertOverflow="overflow" horzOverflow="overflow" vert="horz" wrap="square" lIns="91440" tIns="45720" rIns="91440" bIns="45720" numCol="1" spcCol="0" rtlCol="0" fromWordArt="0" anchor="ctr" anchorCtr="0" forceAA="0" compatLnSpc="1">
+            <a:prstTxWarp prst="textNoShape">
+              <a:avLst/>
+            </a:prstTxWarp>
+            <a:noAutofit/>
+          </a:bodyPr>
+          <a:lstStyle/>
+          <a:p>
+            <a:pPr algn="ctr"/>
+            <a:endParaRPr lang="de-DE">
+              <a:latin typeface="Roboto" panose="02000000000000000000" pitchFamily="2" charset="0"/>
+              <a:ea typeface="Roboto" panose="02000000000000000000" pitchFamily="2" charset="0"/>
+            </a:endParaRPr>
+          </a:p>
+        </p:txBody>
+      </p:sp>
+      <p:sp>
+        <p:nvSpPr>
+          <p:cNvPr id="17" name="Oval 16">
+            <a:extLst>
+              <a:ext uri="{FF2B5EF4-FFF2-40B4-BE49-F238E27FC236}">
+                <a16:creationId xmlns:a16="http://schemas.microsoft.com/office/drawing/2014/main" id="{62925EB9-A71B-E34B-BF49-DB6BE9049295}"/>
+              </a:ext>
+            </a:extLst>
+          </p:cNvPr>
+          <p:cNvSpPr/>
+          <p:nvPr/>
+        </p:nvSpPr>
+        <p:spPr>
+          <a:xfrm>
+            <a:off x="7648596" y="242942"/>
+            <a:ext cx="385602" cy="338933"/>
+          </a:xfrm>
+          <a:prstGeom prst="ellipse">
+            <a:avLst/>
+          </a:prstGeom>
+          <a:solidFill>
+            <a:srgbClr val="FFC000"/>
+          </a:solidFill>
+          <a:ln>
+            <a:solidFill>
+              <a:schemeClr val="tx1"/>
+            </a:solidFill>
+          </a:ln>
+        </p:spPr>
+        <p:style>
+          <a:lnRef idx="2">
+            <a:schemeClr val="accent1">
+              <a:shade val="50000"/>
+            </a:schemeClr>
+          </a:lnRef>
+          <a:fillRef idx="1">
+            <a:schemeClr val="accent1"/>
+          </a:fillRef>
+          <a:effectRef idx="0">
+            <a:schemeClr val="accent1"/>
+          </a:effectRef>
+          <a:fontRef idx="minor">
+            <a:schemeClr val="lt1"/>
+          </a:fontRef>
+        </p:style>
+        <p:txBody>
+          <a:bodyPr rot="0" spcFirstLastPara="0" vertOverflow="overflow" horzOverflow="overflow" vert="horz" wrap="square" lIns="91440" tIns="45720" rIns="91440" bIns="45720" numCol="1" spcCol="0" rtlCol="0" fromWordArt="0" anchor="ctr" anchorCtr="0" forceAA="0" compatLnSpc="1">
+            <a:prstTxWarp prst="textNoShape">
+              <a:avLst/>
+            </a:prstTxWarp>
+            <a:noAutofit/>
+          </a:bodyPr>
+          <a:lstStyle/>
+          <a:p>
+            <a:pPr algn="ctr"/>
+            <a:endParaRPr lang="de-DE">
+              <a:latin typeface="Roboto" panose="02000000000000000000" pitchFamily="2" charset="0"/>
+              <a:ea typeface="Roboto" panose="02000000000000000000" pitchFamily="2" charset="0"/>
+            </a:endParaRPr>
+          </a:p>
+        </p:txBody>
+      </p:sp>
+      <p:sp>
+        <p:nvSpPr>
+          <p:cNvPr id="18" name="Snip Single Corner of Rectangle 17">
+            <a:extLst>
+              <a:ext uri="{FF2B5EF4-FFF2-40B4-BE49-F238E27FC236}">
+                <a16:creationId xmlns:a16="http://schemas.microsoft.com/office/drawing/2014/main" id="{BBFDB228-2AE4-B04D-A5DC-71D243FF48D3}"/>
+              </a:ext>
+            </a:extLst>
+          </p:cNvPr>
+          <p:cNvSpPr>
+            <a:spLocks noChangeAspect="1"/>
+          </p:cNvSpPr>
+          <p:nvPr/>
+        </p:nvSpPr>
+        <p:spPr>
+          <a:xfrm>
+            <a:off x="7583982" y="1130280"/>
+            <a:ext cx="594360" cy="338934"/>
+          </a:xfrm>
+          <a:prstGeom prst="snip1Rect">
+            <a:avLst>
+              <a:gd name="adj" fmla="val 40387"/>
+            </a:avLst>
+          </a:prstGeom>
+          <a:solidFill>
+            <a:schemeClr val="bg2"/>
+          </a:solidFill>
+          <a:ln>
+            <a:solidFill>
+              <a:schemeClr val="tx1"/>
+            </a:solidFill>
+          </a:ln>
+        </p:spPr>
+        <p:style>
+          <a:lnRef idx="2">
+            <a:schemeClr val="accent1">
+              <a:shade val="50000"/>
+            </a:schemeClr>
+          </a:lnRef>
+          <a:fillRef idx="1">
+            <a:schemeClr val="accent1"/>
+          </a:fillRef>
+          <a:effectRef idx="0">
+            <a:schemeClr val="accent1"/>
+          </a:effectRef>
+          <a:fontRef idx="minor">
+            <a:schemeClr val="lt1"/>
+          </a:fontRef>
+        </p:style>
+        <p:txBody>
+          <a:bodyPr rot="0" spcFirstLastPara="0" vertOverflow="overflow" horzOverflow="overflow" vert="horz" wrap="square" lIns="91440" tIns="45720" rIns="91440" bIns="45720" numCol="1" spcCol="0" rtlCol="0" fromWordArt="0" anchor="ctr" anchorCtr="0" forceAA="0" compatLnSpc="1">
+            <a:prstTxWarp prst="textNoShape">
+              <a:avLst/>
+            </a:prstTxWarp>
+            <a:noAutofit/>
+          </a:bodyPr>
+          <a:lstStyle/>
+          <a:p>
+            <a:pPr algn="ctr"/>
+            <a:endParaRPr lang="de-DE">
+              <a:latin typeface="Roboto" panose="02000000000000000000" pitchFamily="2" charset="0"/>
+              <a:ea typeface="Roboto" panose="02000000000000000000" pitchFamily="2" charset="0"/>
+            </a:endParaRPr>
+          </a:p>
+        </p:txBody>
+      </p:sp>
+    </p:spTree>
+    <p:extLst>
+      <p:ext uri="{BB962C8B-B14F-4D97-AF65-F5344CB8AC3E}">
+        <p14:creationId xmlns:p14="http://schemas.microsoft.com/office/powerpoint/2010/main" val="3325899815"/>
+      </p:ext>
+    </p:extLst>
+  </p:cSld>
+  <p:clrMapOvr>
+    <a:masterClrMapping/>
+  </p:clrMapOvr>
+</p:sld>
+</file>
+
+<file path=ppt/slides/slide7.xml><?xml version="1.0" encoding="utf-8"?>
+<p:sld xmlns:a="http://schemas.openxmlformats.org/drawingml/2006/main" xmlns:r="http://schemas.openxmlformats.org/officeDocument/2006/relationships" xmlns:p="http://schemas.openxmlformats.org/presentationml/2006/main">
+  <p:cSld>
+    <p:spTree>
+      <p:nvGrpSpPr>
+        <p:cNvPr id="1" name=""/>
+        <p:cNvGrpSpPr/>
+        <p:nvPr/>
+      </p:nvGrpSpPr>
+      <p:grpSpPr>
+        <a:xfrm>
+          <a:off x="0" y="0"/>
+          <a:ext cx="0" cy="0"/>
+          <a:chOff x="0" y="0"/>
+          <a:chExt cx="0" cy="0"/>
+        </a:xfrm>
+      </p:grpSpPr>
+      <p:sp>
+        <p:nvSpPr>
+          <p:cNvPr id="6" name="TextBox 5">
+            <a:extLst>
+              <a:ext uri="{FF2B5EF4-FFF2-40B4-BE49-F238E27FC236}">
+                <a16:creationId xmlns:a16="http://schemas.microsoft.com/office/drawing/2014/main" id="{B0D8F7AC-903A-9F44-ADA6-852E047B06F2}"/>
+              </a:ext>
+            </a:extLst>
+          </p:cNvPr>
+          <p:cNvSpPr txBox="1"/>
+          <p:nvPr/>
+        </p:nvSpPr>
+        <p:spPr>
+          <a:xfrm>
+            <a:off x="-15937" y="-16747"/>
+            <a:ext cx="2664512" cy="4401205"/>
+          </a:xfrm>
+          <a:prstGeom prst="rect">
+            <a:avLst/>
+          </a:prstGeom>
+          <a:noFill/>
+        </p:spPr>
+        <p:txBody>
+          <a:bodyPr wrap="none" rtlCol="0">
+            <a:spAutoFit/>
+          </a:bodyPr>
+          <a:lstStyle/>
+          <a:p>
+            <a:pPr marL="346075" indent="-346075">
+              <a:spcAft>
+                <a:spcPts val="3000"/>
+              </a:spcAft>
+              <a:buAutoNum type="arabicPeriod"/>
+              <a:tabLst>
+                <a:tab pos="261938" algn="l"/>
+              </a:tabLst>
+            </a:pPr>
+            <a:r>
+              <a:rPr lang="de-DE">
+                <a:latin typeface="Roboto" panose="02000000000000000000" pitchFamily="2" charset="0"/>
+                <a:ea typeface="Roboto" panose="02000000000000000000" pitchFamily="2" charset="0"/>
+              </a:rPr>
+              <a:t>Partitioned region:</a:t>
+            </a:r>
+            <a:br>
+              <a:rPr lang="de-DE">
+                <a:latin typeface="Roboto" panose="02000000000000000000" pitchFamily="2" charset="0"/>
+                <a:ea typeface="Roboto" panose="02000000000000000000" pitchFamily="2" charset="0"/>
+              </a:rPr>
+            </a:br>
+            <a:r>
+              <a:rPr lang="de-DE">
+                <a:latin typeface="Roboto" panose="02000000000000000000" pitchFamily="2" charset="0"/>
+                <a:ea typeface="Roboto" panose="02000000000000000000" pitchFamily="2" charset="0"/>
+              </a:rPr>
+              <a:t>entity partitions</a:t>
+            </a:r>
+          </a:p>
+          <a:p>
+            <a:pPr marL="346075" indent="-346075">
+              <a:spcAft>
+                <a:spcPts val="3000"/>
+              </a:spcAft>
+              <a:buAutoNum type="arabicPeriod"/>
+              <a:tabLst>
+                <a:tab pos="261938" algn="l"/>
+              </a:tabLst>
+            </a:pPr>
+            <a:r>
+              <a:rPr lang="de-DE">
+                <a:latin typeface="Roboto" panose="02000000000000000000" pitchFamily="2" charset="0"/>
+                <a:ea typeface="Roboto" panose="02000000000000000000" pitchFamily="2" charset="0"/>
+              </a:rPr>
+              <a:t>Attached shapes:</a:t>
+            </a:r>
+            <a:br>
+              <a:rPr lang="de-DE">
+                <a:latin typeface="Roboto" panose="02000000000000000000" pitchFamily="2" charset="0"/>
+                <a:ea typeface="Roboto" panose="02000000000000000000" pitchFamily="2" charset="0"/>
+              </a:rPr>
+            </a:br>
+            <a:r>
+              <a:rPr lang="de-DE">
+                <a:latin typeface="Roboto" panose="02000000000000000000" pitchFamily="2" charset="0"/>
+                <a:ea typeface="Roboto" panose="02000000000000000000" pitchFamily="2" charset="0"/>
+              </a:rPr>
+              <a:t>part-of relationship</a:t>
+            </a:r>
+          </a:p>
+          <a:p>
+            <a:pPr marL="346075" indent="-346075">
+              <a:spcAft>
+                <a:spcPts val="3000"/>
+              </a:spcAft>
+              <a:buAutoNum type="arabicPeriod"/>
+              <a:tabLst>
+                <a:tab pos="261938" algn="l"/>
+              </a:tabLst>
+            </a:pPr>
+            <a:r>
+              <a:rPr lang="de-DE">
+                <a:latin typeface="Roboto" panose="02000000000000000000" pitchFamily="2" charset="0"/>
+                <a:ea typeface="Roboto" panose="02000000000000000000" pitchFamily="2" charset="0"/>
+              </a:rPr>
+              <a:t>Enclosed shapes:</a:t>
+            </a:r>
+            <a:br>
+              <a:rPr lang="de-DE">
+                <a:latin typeface="Roboto" panose="02000000000000000000" pitchFamily="2" charset="0"/>
+                <a:ea typeface="Roboto" panose="02000000000000000000" pitchFamily="2" charset="0"/>
+              </a:rPr>
+            </a:br>
+            <a:r>
+              <a:rPr lang="de-DE">
+                <a:latin typeface="Roboto" panose="02000000000000000000" pitchFamily="2" charset="0"/>
+                <a:ea typeface="Roboto" panose="02000000000000000000" pitchFamily="2" charset="0"/>
+              </a:rPr>
+              <a:t>contained elements</a:t>
+            </a:r>
+          </a:p>
+          <a:p>
+            <a:pPr marL="346075" indent="-346075">
+              <a:spcAft>
+                <a:spcPts val="3000"/>
+              </a:spcAft>
+              <a:buAutoNum type="arabicPeriod"/>
+              <a:tabLst>
+                <a:tab pos="261938" algn="l"/>
+              </a:tabLst>
+            </a:pPr>
+            <a:r>
+              <a:rPr lang="de-DE">
+                <a:latin typeface="Roboto" panose="02000000000000000000" pitchFamily="2" charset="0"/>
+                <a:ea typeface="Roboto" panose="02000000000000000000" pitchFamily="2" charset="0"/>
+              </a:rPr>
+              <a:t>Sequence of shapes:</a:t>
+            </a:r>
+            <a:br>
+              <a:rPr lang="de-DE">
+                <a:latin typeface="Roboto" panose="02000000000000000000" pitchFamily="2" charset="0"/>
+                <a:ea typeface="Roboto" panose="02000000000000000000" pitchFamily="2" charset="0"/>
+              </a:rPr>
+            </a:br>
+            <a:r>
+              <a:rPr lang="de-DE">
+                <a:latin typeface="Roboto" panose="02000000000000000000" pitchFamily="2" charset="0"/>
+                <a:ea typeface="Roboto" panose="02000000000000000000" pitchFamily="2" charset="0"/>
+              </a:rPr>
+              <a:t>sequence of entities</a:t>
+            </a:r>
+          </a:p>
+          <a:p>
+            <a:pPr marL="346075" indent="-346075">
+              <a:spcAft>
+                <a:spcPts val="3000"/>
+              </a:spcAft>
+              <a:buAutoNum type="arabicPeriod"/>
+              <a:tabLst>
+                <a:tab pos="261938" algn="l"/>
+              </a:tabLst>
+            </a:pPr>
+            <a:r>
+              <a:rPr lang="de-DE">
+                <a:latin typeface="Roboto" panose="02000000000000000000" pitchFamily="2" charset="0"/>
+                <a:ea typeface="Roboto" panose="02000000000000000000" pitchFamily="2" charset="0"/>
+              </a:rPr>
+              <a:t>Linking line:</a:t>
+            </a:r>
+            <a:br>
+              <a:rPr lang="de-DE">
+                <a:latin typeface="Roboto" panose="02000000000000000000" pitchFamily="2" charset="0"/>
+                <a:ea typeface="Roboto" panose="02000000000000000000" pitchFamily="2" charset="0"/>
+              </a:rPr>
+            </a:br>
+            <a:r>
+              <a:rPr lang="de-DE">
+                <a:latin typeface="Roboto" panose="02000000000000000000" pitchFamily="2" charset="0"/>
+                <a:ea typeface="Roboto" panose="02000000000000000000" pitchFamily="2" charset="0"/>
+              </a:rPr>
+              <a:t>generic relationship</a:t>
+            </a:r>
+          </a:p>
+        </p:txBody>
+      </p:sp>
+      <p:sp>
+        <p:nvSpPr>
+          <p:cNvPr id="10" name="Rounded Rectangle 9">
+            <a:extLst>
+              <a:ext uri="{FF2B5EF4-FFF2-40B4-BE49-F238E27FC236}">
+                <a16:creationId xmlns:a16="http://schemas.microsoft.com/office/drawing/2014/main" id="{246578AD-7ED4-734C-9F8D-FDDE3A9D53A4}"/>
+              </a:ext>
+            </a:extLst>
+          </p:cNvPr>
+          <p:cNvSpPr>
+            <a:spLocks noChangeAspect="1"/>
+          </p:cNvSpPr>
+          <p:nvPr/>
+        </p:nvSpPr>
+        <p:spPr>
+          <a:xfrm>
+            <a:off x="2535930" y="1090488"/>
+            <a:ext cx="1067116" cy="338934"/>
+          </a:xfrm>
+          <a:prstGeom prst="roundRect">
+            <a:avLst>
+              <a:gd name="adj" fmla="val 11871"/>
+            </a:avLst>
+          </a:prstGeom>
+          <a:solidFill>
+            <a:schemeClr val="bg2"/>
+          </a:solidFill>
+          <a:ln>
+            <a:solidFill>
+              <a:schemeClr val="tx1"/>
+            </a:solidFill>
+          </a:ln>
+        </p:spPr>
+        <p:style>
+          <a:lnRef idx="2">
+            <a:schemeClr val="accent1">
+              <a:shade val="50000"/>
+            </a:schemeClr>
+          </a:lnRef>
+          <a:fillRef idx="1">
+            <a:schemeClr val="accent1"/>
+          </a:fillRef>
+          <a:effectRef idx="0">
+            <a:schemeClr val="accent1"/>
+          </a:effectRef>
+          <a:fontRef idx="minor">
+            <a:schemeClr val="lt1"/>
+          </a:fontRef>
+        </p:style>
+        <p:txBody>
+          <a:bodyPr rot="0" spcFirstLastPara="0" vertOverflow="overflow" horzOverflow="overflow" vert="horz" wrap="square" lIns="91440" tIns="45720" rIns="91440" bIns="45720" numCol="1" spcCol="0" rtlCol="0" fromWordArt="0" anchor="ctr" anchorCtr="0" forceAA="0" compatLnSpc="1">
+            <a:prstTxWarp prst="textNoShape">
+              <a:avLst/>
+            </a:prstTxWarp>
+            <a:noAutofit/>
+          </a:bodyPr>
+          <a:lstStyle/>
+          <a:p>
+            <a:pPr algn="ctr"/>
+            <a:endParaRPr lang="de-DE">
+              <a:latin typeface="Roboto" panose="02000000000000000000" pitchFamily="2" charset="0"/>
+              <a:ea typeface="Roboto" panose="02000000000000000000" pitchFamily="2" charset="0"/>
+            </a:endParaRPr>
+          </a:p>
+        </p:txBody>
+      </p:sp>
+      <p:sp>
+        <p:nvSpPr>
+          <p:cNvPr id="5" name="Oval 4">
+            <a:extLst>
+              <a:ext uri="{FF2B5EF4-FFF2-40B4-BE49-F238E27FC236}">
+                <a16:creationId xmlns:a16="http://schemas.microsoft.com/office/drawing/2014/main" id="{C3252A20-4B1D-004F-8AFC-271C517E8BEC}"/>
+              </a:ext>
+            </a:extLst>
+          </p:cNvPr>
+          <p:cNvSpPr>
+            <a:spLocks noChangeAspect="1"/>
+          </p:cNvSpPr>
+          <p:nvPr/>
+        </p:nvSpPr>
+        <p:spPr>
+          <a:xfrm>
+            <a:off x="3170989" y="2080948"/>
+            <a:ext cx="347782" cy="157692"/>
+          </a:xfrm>
+          <a:prstGeom prst="ellipse">
+            <a:avLst/>
+          </a:prstGeom>
+          <a:solidFill>
+            <a:schemeClr val="bg2"/>
+          </a:solidFill>
+          <a:ln>
+            <a:solidFill>
+              <a:schemeClr val="tx1"/>
+            </a:solidFill>
+          </a:ln>
+        </p:spPr>
+        <p:style>
+          <a:lnRef idx="2">
+            <a:schemeClr val="accent1">
+              <a:shade val="50000"/>
+            </a:schemeClr>
+          </a:lnRef>
+          <a:fillRef idx="1">
+            <a:schemeClr val="accent1"/>
+          </a:fillRef>
+          <a:effectRef idx="0">
+            <a:schemeClr val="accent1"/>
+          </a:effectRef>
+          <a:fontRef idx="minor">
+            <a:schemeClr val="lt1"/>
+          </a:fontRef>
+        </p:style>
+        <p:txBody>
+          <a:bodyPr rot="0" spcFirstLastPara="0" vertOverflow="overflow" horzOverflow="overflow" vert="horz" wrap="square" lIns="91440" tIns="45720" rIns="91440" bIns="45720" numCol="1" spcCol="0" rtlCol="0" fromWordArt="0" anchor="ctr" anchorCtr="0" forceAA="0" compatLnSpc="1">
+            <a:prstTxWarp prst="textNoShape">
+              <a:avLst/>
+            </a:prstTxWarp>
+            <a:noAutofit/>
+          </a:bodyPr>
+          <a:lstStyle/>
+          <a:p>
+            <a:pPr algn="ctr"/>
+            <a:endParaRPr lang="de-DE">
+              <a:latin typeface="Roboto" panose="02000000000000000000" pitchFamily="2" charset="0"/>
+              <a:ea typeface="Roboto" panose="02000000000000000000" pitchFamily="2" charset="0"/>
+            </a:endParaRPr>
+          </a:p>
+        </p:txBody>
+      </p:sp>
+      <p:sp>
+        <p:nvSpPr>
+          <p:cNvPr id="18" name="Freeform 17">
+            <a:extLst>
+              <a:ext uri="{FF2B5EF4-FFF2-40B4-BE49-F238E27FC236}">
+                <a16:creationId xmlns:a16="http://schemas.microsoft.com/office/drawing/2014/main" id="{B0E73E57-D75D-454D-B348-18DA9B261C9C}"/>
+              </a:ext>
+            </a:extLst>
+          </p:cNvPr>
+          <p:cNvSpPr>
+            <a:spLocks noChangeAspect="1"/>
+          </p:cNvSpPr>
+          <p:nvPr/>
+        </p:nvSpPr>
+        <p:spPr>
+          <a:xfrm>
+            <a:off x="2535930" y="58189"/>
+            <a:ext cx="977702" cy="482138"/>
+          </a:xfrm>
+          <a:custGeom>
+            <a:avLst/>
+            <a:gdLst>
+              <a:gd name="connsiteX0" fmla="*/ 0 w 1178632"/>
+              <a:gd name="connsiteY0" fmla="*/ 0 h 482138"/>
+              <a:gd name="connsiteX1" fmla="*/ 1178632 w 1178632"/>
+              <a:gd name="connsiteY1" fmla="*/ 0 h 482138"/>
+              <a:gd name="connsiteX2" fmla="*/ 1026797 w 1178632"/>
+              <a:gd name="connsiteY2" fmla="*/ 151835 h 482138"/>
+              <a:gd name="connsiteX3" fmla="*/ 1026797 w 1178632"/>
+              <a:gd name="connsiteY3" fmla="*/ 330303 h 482138"/>
+              <a:gd name="connsiteX4" fmla="*/ 1178632 w 1178632"/>
+              <a:gd name="connsiteY4" fmla="*/ 482138 h 482138"/>
+              <a:gd name="connsiteX5" fmla="*/ 0 w 1178632"/>
+              <a:gd name="connsiteY5" fmla="*/ 482138 h 482138"/>
+              <a:gd name="connsiteX6" fmla="*/ 0 w 1178632"/>
+              <a:gd name="connsiteY6" fmla="*/ 0 h 482138"/>
+            </a:gdLst>
+            <a:ahLst/>
+            <a:cxnLst>
+              <a:cxn ang="0">
+                <a:pos x="connsiteX0" y="connsiteY0"/>
+              </a:cxn>
+              <a:cxn ang="0">
+                <a:pos x="connsiteX1" y="connsiteY1"/>
+              </a:cxn>
+              <a:cxn ang="0">
+                <a:pos x="connsiteX2" y="connsiteY2"/>
+              </a:cxn>
+              <a:cxn ang="0">
+                <a:pos x="connsiteX3" y="connsiteY3"/>
+              </a:cxn>
+              <a:cxn ang="0">
+                <a:pos x="connsiteX4" y="connsiteY4"/>
+              </a:cxn>
+              <a:cxn ang="0">
+                <a:pos x="connsiteX5" y="connsiteY5"/>
+              </a:cxn>
+              <a:cxn ang="0">
+                <a:pos x="connsiteX6" y="connsiteY6"/>
+              </a:cxn>
+            </a:cxnLst>
+            <a:rect l="l" t="t" r="r" b="b"/>
+            <a:pathLst>
+              <a:path w="1178632" h="482138">
+                <a:moveTo>
+                  <a:pt x="0" y="0"/>
+                </a:moveTo>
+                <a:lnTo>
+                  <a:pt x="1178632" y="0"/>
+                </a:lnTo>
+                <a:cubicBezTo>
+                  <a:pt x="1094776" y="0"/>
+                  <a:pt x="1026797" y="67979"/>
+                  <a:pt x="1026797" y="151835"/>
+                </a:cubicBezTo>
+                <a:lnTo>
+                  <a:pt x="1026797" y="330303"/>
+                </a:lnTo>
+                <a:cubicBezTo>
+                  <a:pt x="1026797" y="414159"/>
+                  <a:pt x="1094776" y="482138"/>
+                  <a:pt x="1178632" y="482138"/>
+                </a:cubicBezTo>
+                <a:lnTo>
+                  <a:pt x="0" y="482138"/>
+                </a:lnTo>
+                <a:lnTo>
+                  <a:pt x="0" y="0"/>
+                </a:lnTo>
+                <a:close/>
+              </a:path>
+            </a:pathLst>
+          </a:custGeom>
+          <a:solidFill>
+            <a:schemeClr val="bg2"/>
+          </a:solidFill>
+          <a:ln>
+            <a:solidFill>
+              <a:schemeClr val="tx1"/>
+            </a:solidFill>
+          </a:ln>
+        </p:spPr>
+        <p:style>
+          <a:lnRef idx="2">
+            <a:schemeClr val="accent1">
+              <a:shade val="50000"/>
+            </a:schemeClr>
+          </a:lnRef>
+          <a:fillRef idx="1">
+            <a:schemeClr val="accent1"/>
+          </a:fillRef>
+          <a:effectRef idx="0">
+            <a:schemeClr val="accent1"/>
+          </a:effectRef>
+          <a:fontRef idx="minor">
+            <a:schemeClr val="lt1"/>
+          </a:fontRef>
+        </p:style>
+        <p:txBody>
+          <a:bodyPr rot="0" spcFirstLastPara="0" vertOverflow="overflow" horzOverflow="overflow" vert="horz" wrap="square" lIns="91440" tIns="45720" rIns="91440" bIns="45720" numCol="1" spcCol="0" rtlCol="0" fromWordArt="0" anchor="ctr" anchorCtr="0" forceAA="0" compatLnSpc="1">
+            <a:prstTxWarp prst="textNoShape">
+              <a:avLst/>
+            </a:prstTxWarp>
+            <a:noAutofit/>
+          </a:bodyPr>
+          <a:lstStyle/>
+          <a:p>
+            <a:pPr algn="ctr"/>
+            <a:endParaRPr lang="de-DE">
+              <a:latin typeface="Roboto" panose="02000000000000000000" pitchFamily="2" charset="0"/>
+              <a:ea typeface="Roboto" panose="02000000000000000000" pitchFamily="2" charset="0"/>
+            </a:endParaRPr>
+          </a:p>
+        </p:txBody>
+      </p:sp>
+      <p:sp>
+        <p:nvSpPr>
+          <p:cNvPr id="17" name="Freeform 16">
+            <a:extLst>
+              <a:ext uri="{FF2B5EF4-FFF2-40B4-BE49-F238E27FC236}">
+                <a16:creationId xmlns:a16="http://schemas.microsoft.com/office/drawing/2014/main" id="{7AFC4516-0570-C041-8C17-793ABA513D50}"/>
+              </a:ext>
+            </a:extLst>
+          </p:cNvPr>
+          <p:cNvSpPr>
+            <a:spLocks noChangeAspect="1"/>
+          </p:cNvSpPr>
+          <p:nvPr/>
+        </p:nvSpPr>
+        <p:spPr>
+          <a:xfrm>
+            <a:off x="3355692" y="58189"/>
+            <a:ext cx="405704" cy="482138"/>
+          </a:xfrm>
+          <a:custGeom>
+            <a:avLst/>
+            <a:gdLst>
+              <a:gd name="connsiteX0" fmla="*/ 0 w 306277"/>
+              <a:gd name="connsiteY0" fmla="*/ 0 h 482138"/>
+              <a:gd name="connsiteX1" fmla="*/ 154442 w 306277"/>
+              <a:gd name="connsiteY1" fmla="*/ 0 h 482138"/>
+              <a:gd name="connsiteX2" fmla="*/ 306277 w 306277"/>
+              <a:gd name="connsiteY2" fmla="*/ 151835 h 482138"/>
+              <a:gd name="connsiteX3" fmla="*/ 306277 w 306277"/>
+              <a:gd name="connsiteY3" fmla="*/ 330303 h 482138"/>
+              <a:gd name="connsiteX4" fmla="*/ 154442 w 306277"/>
+              <a:gd name="connsiteY4" fmla="*/ 482138 h 482138"/>
+              <a:gd name="connsiteX5" fmla="*/ 0 w 306277"/>
+              <a:gd name="connsiteY5" fmla="*/ 482138 h 482138"/>
+              <a:gd name="connsiteX6" fmla="*/ 0 w 306277"/>
+              <a:gd name="connsiteY6" fmla="*/ 0 h 482138"/>
+            </a:gdLst>
+            <a:ahLst/>
+            <a:cxnLst>
+              <a:cxn ang="0">
+                <a:pos x="connsiteX0" y="connsiteY0"/>
+              </a:cxn>
+              <a:cxn ang="0">
+                <a:pos x="connsiteX1" y="connsiteY1"/>
+              </a:cxn>
+              <a:cxn ang="0">
+                <a:pos x="connsiteX2" y="connsiteY2"/>
+              </a:cxn>
+              <a:cxn ang="0">
+                <a:pos x="connsiteX3" y="connsiteY3"/>
+              </a:cxn>
+              <a:cxn ang="0">
+                <a:pos x="connsiteX4" y="connsiteY4"/>
+              </a:cxn>
+              <a:cxn ang="0">
+                <a:pos x="connsiteX5" y="connsiteY5"/>
+              </a:cxn>
+              <a:cxn ang="0">
+                <a:pos x="connsiteX6" y="connsiteY6"/>
+              </a:cxn>
+            </a:cxnLst>
+            <a:rect l="l" t="t" r="r" b="b"/>
+            <a:pathLst>
+              <a:path w="306277" h="482138">
+                <a:moveTo>
+                  <a:pt x="0" y="0"/>
+                </a:moveTo>
+                <a:lnTo>
+                  <a:pt x="154442" y="0"/>
+                </a:lnTo>
+                <a:cubicBezTo>
+                  <a:pt x="238298" y="0"/>
+                  <a:pt x="306277" y="67979"/>
+                  <a:pt x="306277" y="151835"/>
+                </a:cubicBezTo>
+                <a:lnTo>
+                  <a:pt x="306277" y="330303"/>
+                </a:lnTo>
+                <a:cubicBezTo>
+                  <a:pt x="306277" y="414159"/>
+                  <a:pt x="238298" y="482138"/>
+                  <a:pt x="154442" y="482138"/>
+                </a:cubicBezTo>
+                <a:lnTo>
+                  <a:pt x="0" y="482138"/>
+                </a:lnTo>
+                <a:lnTo>
+                  <a:pt x="0" y="0"/>
+                </a:lnTo>
+                <a:close/>
+              </a:path>
+            </a:pathLst>
+          </a:custGeom>
+          <a:solidFill>
+            <a:schemeClr val="bg2"/>
+          </a:solidFill>
+          <a:ln>
+            <a:solidFill>
+              <a:schemeClr val="tx1"/>
+            </a:solidFill>
+          </a:ln>
+        </p:spPr>
+        <p:style>
+          <a:lnRef idx="2">
+            <a:schemeClr val="accent1">
+              <a:shade val="50000"/>
+            </a:schemeClr>
+          </a:lnRef>
+          <a:fillRef idx="1">
+            <a:schemeClr val="accent1"/>
+          </a:fillRef>
+          <a:effectRef idx="0">
+            <a:schemeClr val="accent1"/>
+          </a:effectRef>
+          <a:fontRef idx="minor">
+            <a:schemeClr val="lt1"/>
+          </a:fontRef>
+        </p:style>
+        <p:txBody>
+          <a:bodyPr rot="0" spcFirstLastPara="0" vertOverflow="overflow" horzOverflow="overflow" vert="horz" wrap="square" lIns="91440" tIns="45720" rIns="91440" bIns="45720" numCol="1" spcCol="0" rtlCol="0" fromWordArt="0" anchor="ctr" anchorCtr="0" forceAA="0" compatLnSpc="1">
+            <a:prstTxWarp prst="textNoShape">
+              <a:avLst/>
+            </a:prstTxWarp>
+            <a:noAutofit/>
+          </a:bodyPr>
+          <a:lstStyle/>
+          <a:p>
+            <a:pPr algn="ctr"/>
+            <a:endParaRPr lang="de-DE">
+              <a:latin typeface="Roboto" panose="02000000000000000000" pitchFamily="2" charset="0"/>
+              <a:ea typeface="Roboto" panose="02000000000000000000" pitchFamily="2" charset="0"/>
+            </a:endParaRPr>
+          </a:p>
+        </p:txBody>
+      </p:sp>
+      <p:sp>
+        <p:nvSpPr>
+          <p:cNvPr id="8" name="Rectangle 7">
+            <a:extLst>
+              <a:ext uri="{FF2B5EF4-FFF2-40B4-BE49-F238E27FC236}">
+                <a16:creationId xmlns:a16="http://schemas.microsoft.com/office/drawing/2014/main" id="{4789B646-7B16-B746-9470-982541ACADD3}"/>
+              </a:ext>
+            </a:extLst>
+          </p:cNvPr>
+          <p:cNvSpPr>
+            <a:spLocks noChangeAspect="1"/>
+          </p:cNvSpPr>
+          <p:nvPr/>
+        </p:nvSpPr>
+        <p:spPr>
+          <a:xfrm>
+            <a:off x="3424832" y="1319522"/>
+            <a:ext cx="322585" cy="157692"/>
+          </a:xfrm>
+          <a:prstGeom prst="rect">
+            <a:avLst/>
+          </a:prstGeom>
+          <a:solidFill>
+            <a:schemeClr val="bg2"/>
+          </a:solidFill>
+          <a:ln>
+            <a:solidFill>
+              <a:schemeClr val="tx1"/>
+            </a:solidFill>
+          </a:ln>
+        </p:spPr>
+        <p:style>
+          <a:lnRef idx="2">
+            <a:schemeClr val="accent1">
+              <a:shade val="50000"/>
+            </a:schemeClr>
+          </a:lnRef>
+          <a:fillRef idx="1">
+            <a:schemeClr val="accent1"/>
+          </a:fillRef>
+          <a:effectRef idx="0">
+            <a:schemeClr val="accent1"/>
+          </a:effectRef>
+          <a:fontRef idx="minor">
+            <a:schemeClr val="lt1"/>
+          </a:fontRef>
+        </p:style>
+        <p:txBody>
+          <a:bodyPr rot="0" spcFirstLastPara="0" vertOverflow="overflow" horzOverflow="overflow" vert="horz" wrap="square" lIns="91440" tIns="45720" rIns="91440" bIns="45720" numCol="1" spcCol="0" rtlCol="0" fromWordArt="0" anchor="ctr" anchorCtr="0" forceAA="0" compatLnSpc="1">
+            <a:prstTxWarp prst="textNoShape">
+              <a:avLst/>
+            </a:prstTxWarp>
+            <a:noAutofit/>
+          </a:bodyPr>
+          <a:lstStyle/>
+          <a:p>
+            <a:pPr algn="ctr"/>
+            <a:endParaRPr lang="de-DE">
+              <a:latin typeface="Roboto" panose="02000000000000000000" pitchFamily="2" charset="0"/>
+              <a:ea typeface="Roboto" panose="02000000000000000000" pitchFamily="2" charset="0"/>
+            </a:endParaRPr>
+          </a:p>
+        </p:txBody>
+      </p:sp>
+      <p:sp>
+        <p:nvSpPr>
+          <p:cNvPr id="20" name="Rounded Rectangle 19">
+            <a:extLst>
+              <a:ext uri="{FF2B5EF4-FFF2-40B4-BE49-F238E27FC236}">
+                <a16:creationId xmlns:a16="http://schemas.microsoft.com/office/drawing/2014/main" id="{5D167F02-C10C-C549-930F-481425CB1C8C}"/>
+              </a:ext>
+            </a:extLst>
+          </p:cNvPr>
+          <p:cNvSpPr>
+            <a:spLocks noChangeAspect="1"/>
+          </p:cNvSpPr>
+          <p:nvPr/>
+        </p:nvSpPr>
+        <p:spPr>
+          <a:xfrm>
+            <a:off x="2535929" y="1899526"/>
+            <a:ext cx="1211487" cy="477547"/>
+          </a:xfrm>
+          <a:prstGeom prst="roundRect">
+            <a:avLst>
+              <a:gd name="adj" fmla="val 6361"/>
+            </a:avLst>
+          </a:prstGeom>
+          <a:noFill/>
+          <a:ln>
+            <a:solidFill>
+              <a:schemeClr val="tx1"/>
+            </a:solidFill>
+          </a:ln>
+        </p:spPr>
+        <p:style>
+          <a:lnRef idx="2">
+            <a:schemeClr val="accent1">
+              <a:shade val="50000"/>
+            </a:schemeClr>
+          </a:lnRef>
+          <a:fillRef idx="1">
+            <a:schemeClr val="accent1"/>
+          </a:fillRef>
+          <a:effectRef idx="0">
+            <a:schemeClr val="accent1"/>
+          </a:effectRef>
+          <a:fontRef idx="minor">
+            <a:schemeClr val="lt1"/>
+          </a:fontRef>
+        </p:style>
+        <p:txBody>
+          <a:bodyPr rot="0" spcFirstLastPara="0" vertOverflow="overflow" horzOverflow="overflow" vert="horz" wrap="square" lIns="91440" tIns="45720" rIns="91440" bIns="45720" numCol="1" spcCol="0" rtlCol="0" fromWordArt="0" anchor="ctr" anchorCtr="0" forceAA="0" compatLnSpc="1">
+            <a:prstTxWarp prst="textNoShape">
+              <a:avLst/>
+            </a:prstTxWarp>
+            <a:noAutofit/>
+          </a:bodyPr>
+          <a:lstStyle/>
+          <a:p>
+            <a:pPr algn="ctr"/>
+            <a:endParaRPr lang="de-DE">
+              <a:latin typeface="Roboto" panose="02000000000000000000" pitchFamily="2" charset="0"/>
+              <a:ea typeface="Roboto" panose="02000000000000000000" pitchFamily="2" charset="0"/>
+            </a:endParaRPr>
+          </a:p>
+        </p:txBody>
+      </p:sp>
+      <p:sp>
+        <p:nvSpPr>
+          <p:cNvPr id="19" name="Rectangle 18">
+            <a:extLst>
+              <a:ext uri="{FF2B5EF4-FFF2-40B4-BE49-F238E27FC236}">
+                <a16:creationId xmlns:a16="http://schemas.microsoft.com/office/drawing/2014/main" id="{24E98B2E-F235-A648-B715-31AB7A9AD74C}"/>
+              </a:ext>
+            </a:extLst>
+          </p:cNvPr>
+          <p:cNvSpPr>
+            <a:spLocks noChangeAspect="1"/>
+          </p:cNvSpPr>
+          <p:nvPr/>
+        </p:nvSpPr>
+        <p:spPr>
+          <a:xfrm>
+            <a:off x="2766178" y="2104223"/>
+            <a:ext cx="227358" cy="111141"/>
+          </a:xfrm>
+          <a:prstGeom prst="rect">
+            <a:avLst/>
+          </a:prstGeom>
+          <a:solidFill>
+            <a:schemeClr val="bg2"/>
+          </a:solidFill>
+          <a:ln>
+            <a:solidFill>
+              <a:schemeClr val="tx1"/>
+            </a:solidFill>
+          </a:ln>
+        </p:spPr>
+        <p:style>
+          <a:lnRef idx="2">
+            <a:schemeClr val="accent1">
+              <a:shade val="50000"/>
+            </a:schemeClr>
+          </a:lnRef>
+          <a:fillRef idx="1">
+            <a:schemeClr val="accent1"/>
+          </a:fillRef>
+          <a:effectRef idx="0">
+            <a:schemeClr val="accent1"/>
+          </a:effectRef>
+          <a:fontRef idx="minor">
+            <a:schemeClr val="lt1"/>
+          </a:fontRef>
+        </p:style>
+        <p:txBody>
+          <a:bodyPr rot="0" spcFirstLastPara="0" vertOverflow="overflow" horzOverflow="overflow" vert="horz" wrap="square" lIns="91440" tIns="45720" rIns="91440" bIns="45720" numCol="1" spcCol="0" rtlCol="0" fromWordArt="0" anchor="ctr" anchorCtr="0" forceAA="0" compatLnSpc="1">
+            <a:prstTxWarp prst="textNoShape">
+              <a:avLst/>
+            </a:prstTxWarp>
+            <a:noAutofit/>
+          </a:bodyPr>
+          <a:lstStyle/>
+          <a:p>
+            <a:pPr algn="ctr"/>
+            <a:endParaRPr lang="de-DE">
+              <a:latin typeface="Roboto" panose="02000000000000000000" pitchFamily="2" charset="0"/>
+              <a:ea typeface="Roboto" panose="02000000000000000000" pitchFamily="2" charset="0"/>
+            </a:endParaRPr>
+          </a:p>
+        </p:txBody>
+      </p:sp>
+      <p:sp>
+        <p:nvSpPr>
+          <p:cNvPr id="21" name="Rectangle 20">
+            <a:extLst>
+              <a:ext uri="{FF2B5EF4-FFF2-40B4-BE49-F238E27FC236}">
+                <a16:creationId xmlns:a16="http://schemas.microsoft.com/office/drawing/2014/main" id="{0D18EF4D-CC6D-454C-B461-7525838FE72E}"/>
+              </a:ext>
+            </a:extLst>
+          </p:cNvPr>
+          <p:cNvSpPr>
+            <a:spLocks noChangeAspect="1"/>
+          </p:cNvSpPr>
+          <p:nvPr/>
+        </p:nvSpPr>
+        <p:spPr>
+          <a:xfrm>
+            <a:off x="2648046" y="2999443"/>
+            <a:ext cx="227358" cy="219039"/>
+          </a:xfrm>
+          <a:prstGeom prst="rect">
+            <a:avLst/>
+          </a:prstGeom>
+          <a:solidFill>
+            <a:schemeClr val="bg2"/>
+          </a:solidFill>
+          <a:ln>
+            <a:solidFill>
+              <a:schemeClr val="tx1"/>
+            </a:solidFill>
+          </a:ln>
+        </p:spPr>
+        <p:style>
+          <a:lnRef idx="2">
+            <a:schemeClr val="accent1">
+              <a:shade val="50000"/>
+            </a:schemeClr>
+          </a:lnRef>
+          <a:fillRef idx="1">
+            <a:schemeClr val="accent1"/>
+          </a:fillRef>
+          <a:effectRef idx="0">
+            <a:schemeClr val="accent1"/>
+          </a:effectRef>
+          <a:fontRef idx="minor">
+            <a:schemeClr val="lt1"/>
+          </a:fontRef>
+        </p:style>
+        <p:txBody>
+          <a:bodyPr rot="0" spcFirstLastPara="0" vertOverflow="overflow" horzOverflow="overflow" vert="horz" wrap="square" lIns="91440" tIns="45720" rIns="91440" bIns="45720" numCol="1" spcCol="0" rtlCol="0" fromWordArt="0" anchor="ctr" anchorCtr="0" forceAA="0" compatLnSpc="1">
+            <a:prstTxWarp prst="textNoShape">
+              <a:avLst/>
+            </a:prstTxWarp>
+            <a:noAutofit/>
+          </a:bodyPr>
+          <a:lstStyle/>
+          <a:p>
+            <a:pPr algn="ctr"/>
+            <a:endParaRPr lang="de-DE">
+              <a:latin typeface="Roboto" panose="02000000000000000000" pitchFamily="2" charset="0"/>
+              <a:ea typeface="Roboto" panose="02000000000000000000" pitchFamily="2" charset="0"/>
+            </a:endParaRPr>
+          </a:p>
+        </p:txBody>
+      </p:sp>
+      <p:sp>
+        <p:nvSpPr>
+          <p:cNvPr id="22" name="Oval 21">
+            <a:extLst>
+              <a:ext uri="{FF2B5EF4-FFF2-40B4-BE49-F238E27FC236}">
+                <a16:creationId xmlns:a16="http://schemas.microsoft.com/office/drawing/2014/main" id="{DC928EFA-1362-0545-BE26-E4FD7AB11D62}"/>
+              </a:ext>
+            </a:extLst>
+          </p:cNvPr>
+          <p:cNvSpPr>
+            <a:spLocks noChangeAspect="1"/>
+          </p:cNvSpPr>
+          <p:nvPr/>
+        </p:nvSpPr>
+        <p:spPr>
+          <a:xfrm>
+            <a:off x="2931473" y="2999443"/>
+            <a:ext cx="245116" cy="219039"/>
+          </a:xfrm>
+          <a:prstGeom prst="ellipse">
+            <a:avLst/>
+          </a:prstGeom>
+          <a:solidFill>
+            <a:schemeClr val="bg2">
+              <a:lumMod val="75000"/>
+            </a:schemeClr>
+          </a:solidFill>
+          <a:ln>
+            <a:solidFill>
+              <a:schemeClr val="tx1"/>
+            </a:solidFill>
+          </a:ln>
+        </p:spPr>
+        <p:style>
+          <a:lnRef idx="2">
+            <a:schemeClr val="accent1">
+              <a:shade val="50000"/>
+            </a:schemeClr>
+          </a:lnRef>
+          <a:fillRef idx="1">
+            <a:schemeClr val="accent1"/>
+          </a:fillRef>
+          <a:effectRef idx="0">
+            <a:schemeClr val="accent1"/>
+          </a:effectRef>
+          <a:fontRef idx="minor">
+            <a:schemeClr val="lt1"/>
+          </a:fontRef>
+        </p:style>
+        <p:txBody>
+          <a:bodyPr rot="0" spcFirstLastPara="0" vertOverflow="overflow" horzOverflow="overflow" vert="horz" wrap="square" lIns="91440" tIns="45720" rIns="91440" bIns="45720" numCol="1" spcCol="0" rtlCol="0" fromWordArt="0" anchor="ctr" anchorCtr="0" forceAA="0" compatLnSpc="1">
+            <a:prstTxWarp prst="textNoShape">
+              <a:avLst/>
+            </a:prstTxWarp>
+            <a:noAutofit/>
+          </a:bodyPr>
+          <a:lstStyle/>
+          <a:p>
+            <a:pPr algn="ctr"/>
+            <a:endParaRPr lang="de-DE">
+              <a:latin typeface="Roboto" panose="02000000000000000000" pitchFamily="2" charset="0"/>
+              <a:ea typeface="Roboto" panose="02000000000000000000" pitchFamily="2" charset="0"/>
+            </a:endParaRPr>
+          </a:p>
+        </p:txBody>
+      </p:sp>
+      <p:sp>
+        <p:nvSpPr>
+          <p:cNvPr id="23" name="Triangle 22">
+            <a:extLst>
+              <a:ext uri="{FF2B5EF4-FFF2-40B4-BE49-F238E27FC236}">
+                <a16:creationId xmlns:a16="http://schemas.microsoft.com/office/drawing/2014/main" id="{AA732D19-9F9C-5340-A03B-4B4B985133FD}"/>
+              </a:ext>
+            </a:extLst>
+          </p:cNvPr>
+          <p:cNvSpPr>
+            <a:spLocks noChangeAspect="1"/>
+          </p:cNvSpPr>
+          <p:nvPr/>
+        </p:nvSpPr>
+        <p:spPr>
+          <a:xfrm>
+            <a:off x="3205277" y="2999443"/>
+            <a:ext cx="245116" cy="219039"/>
+          </a:xfrm>
+          <a:prstGeom prst="triangle">
+            <a:avLst/>
+          </a:prstGeom>
+          <a:solidFill>
+            <a:schemeClr val="bg2">
+              <a:lumMod val="50000"/>
+            </a:schemeClr>
+          </a:solidFill>
+          <a:ln>
+            <a:solidFill>
+              <a:schemeClr val="tx1"/>
+            </a:solidFill>
+          </a:ln>
+        </p:spPr>
+        <p:style>
+          <a:lnRef idx="2">
+            <a:schemeClr val="accent1">
+              <a:shade val="50000"/>
+            </a:schemeClr>
+          </a:lnRef>
+          <a:fillRef idx="1">
+            <a:schemeClr val="accent1"/>
+          </a:fillRef>
+          <a:effectRef idx="0">
+            <a:schemeClr val="accent1"/>
+          </a:effectRef>
+          <a:fontRef idx="minor">
+            <a:schemeClr val="lt1"/>
+          </a:fontRef>
+        </p:style>
+        <p:txBody>
+          <a:bodyPr rot="0" spcFirstLastPara="0" vertOverflow="overflow" horzOverflow="overflow" vert="horz" wrap="square" lIns="91440" tIns="45720" rIns="91440" bIns="45720" numCol="1" spcCol="0" rtlCol="0" fromWordArt="0" anchor="ctr" anchorCtr="0" forceAA="0" compatLnSpc="1">
+            <a:prstTxWarp prst="textNoShape">
+              <a:avLst/>
+            </a:prstTxWarp>
+            <a:noAutofit/>
+          </a:bodyPr>
+          <a:lstStyle/>
+          <a:p>
+            <a:pPr algn="ctr"/>
+            <a:endParaRPr lang="de-DE">
+              <a:latin typeface="Roboto" panose="02000000000000000000" pitchFamily="2" charset="0"/>
+              <a:ea typeface="Roboto" panose="02000000000000000000" pitchFamily="2" charset="0"/>
+            </a:endParaRPr>
+          </a:p>
+        </p:txBody>
+      </p:sp>
+      <p:sp>
+        <p:nvSpPr>
+          <p:cNvPr id="25" name="Oval 24">
+            <a:extLst>
+              <a:ext uri="{FF2B5EF4-FFF2-40B4-BE49-F238E27FC236}">
+                <a16:creationId xmlns:a16="http://schemas.microsoft.com/office/drawing/2014/main" id="{53265668-C2D1-C242-89E4-46CE197B53B3}"/>
+              </a:ext>
+            </a:extLst>
+          </p:cNvPr>
+          <p:cNvSpPr>
+            <a:spLocks noChangeAspect="1"/>
+          </p:cNvSpPr>
+          <p:nvPr/>
+        </p:nvSpPr>
+        <p:spPr>
+          <a:xfrm>
+            <a:off x="3473915" y="2999443"/>
+            <a:ext cx="245116" cy="219039"/>
+          </a:xfrm>
+          <a:prstGeom prst="ellipse">
+            <a:avLst/>
+          </a:prstGeom>
+          <a:solidFill>
+            <a:schemeClr val="bg2">
+              <a:lumMod val="75000"/>
+            </a:schemeClr>
+          </a:solidFill>
+          <a:ln>
+            <a:solidFill>
+              <a:schemeClr val="tx1"/>
+            </a:solidFill>
+          </a:ln>
+        </p:spPr>
+        <p:style>
+          <a:lnRef idx="2">
+            <a:schemeClr val="accent1">
+              <a:shade val="50000"/>
+            </a:schemeClr>
+          </a:lnRef>
+          <a:fillRef idx="1">
+            <a:schemeClr val="accent1"/>
+          </a:fillRef>
+          <a:effectRef idx="0">
+            <a:schemeClr val="accent1"/>
+          </a:effectRef>
+          <a:fontRef idx="minor">
+            <a:schemeClr val="lt1"/>
+          </a:fontRef>
+        </p:style>
+        <p:txBody>
+          <a:bodyPr rot="0" spcFirstLastPara="0" vertOverflow="overflow" horzOverflow="overflow" vert="horz" wrap="square" lIns="91440" tIns="45720" rIns="91440" bIns="45720" numCol="1" spcCol="0" rtlCol="0" fromWordArt="0" anchor="ctr" anchorCtr="0" forceAA="0" compatLnSpc="1">
+            <a:prstTxWarp prst="textNoShape">
+              <a:avLst/>
+            </a:prstTxWarp>
+            <a:noAutofit/>
+          </a:bodyPr>
+          <a:lstStyle/>
+          <a:p>
+            <a:pPr algn="ctr"/>
+            <a:endParaRPr lang="de-DE">
+              <a:latin typeface="Roboto" panose="02000000000000000000" pitchFamily="2" charset="0"/>
+              <a:ea typeface="Roboto" panose="02000000000000000000" pitchFamily="2" charset="0"/>
+            </a:endParaRPr>
+          </a:p>
+        </p:txBody>
+      </p:sp>
+      <p:sp>
+        <p:nvSpPr>
+          <p:cNvPr id="26" name="Rectangle 25">
+            <a:extLst>
+              <a:ext uri="{FF2B5EF4-FFF2-40B4-BE49-F238E27FC236}">
+                <a16:creationId xmlns:a16="http://schemas.microsoft.com/office/drawing/2014/main" id="{21BECAA9-5974-AE47-8FA3-13964AE03EEC}"/>
+              </a:ext>
+            </a:extLst>
+          </p:cNvPr>
+          <p:cNvSpPr>
+            <a:spLocks noChangeAspect="1"/>
+          </p:cNvSpPr>
+          <p:nvPr/>
+        </p:nvSpPr>
+        <p:spPr>
+          <a:xfrm>
+            <a:off x="2854234" y="3922808"/>
+            <a:ext cx="227358" cy="219039"/>
+          </a:xfrm>
+          <a:prstGeom prst="rect">
+            <a:avLst/>
+          </a:prstGeom>
+          <a:solidFill>
+            <a:schemeClr val="bg2"/>
+          </a:solidFill>
+          <a:ln>
+            <a:solidFill>
+              <a:schemeClr val="tx1"/>
+            </a:solidFill>
+          </a:ln>
+        </p:spPr>
+        <p:style>
+          <a:lnRef idx="2">
+            <a:schemeClr val="accent1">
+              <a:shade val="50000"/>
+            </a:schemeClr>
+          </a:lnRef>
+          <a:fillRef idx="1">
+            <a:schemeClr val="accent1"/>
+          </a:fillRef>
+          <a:effectRef idx="0">
+            <a:schemeClr val="accent1"/>
+          </a:effectRef>
+          <a:fontRef idx="minor">
+            <a:schemeClr val="lt1"/>
+          </a:fontRef>
+        </p:style>
+        <p:txBody>
+          <a:bodyPr rot="0" spcFirstLastPara="0" vertOverflow="overflow" horzOverflow="overflow" vert="horz" wrap="square" lIns="91440" tIns="45720" rIns="91440" bIns="45720" numCol="1" spcCol="0" rtlCol="0" fromWordArt="0" anchor="ctr" anchorCtr="0" forceAA="0" compatLnSpc="1">
+            <a:prstTxWarp prst="textNoShape">
+              <a:avLst/>
+            </a:prstTxWarp>
+            <a:noAutofit/>
+          </a:bodyPr>
+          <a:lstStyle/>
+          <a:p>
+            <a:pPr algn="ctr"/>
+            <a:endParaRPr lang="de-DE">
+              <a:latin typeface="Roboto" panose="02000000000000000000" pitchFamily="2" charset="0"/>
+              <a:ea typeface="Roboto" panose="02000000000000000000" pitchFamily="2" charset="0"/>
+            </a:endParaRPr>
+          </a:p>
+        </p:txBody>
+      </p:sp>
+      <p:sp>
+        <p:nvSpPr>
+          <p:cNvPr id="27" name="Oval 26">
+            <a:extLst>
+              <a:ext uri="{FF2B5EF4-FFF2-40B4-BE49-F238E27FC236}">
+                <a16:creationId xmlns:a16="http://schemas.microsoft.com/office/drawing/2014/main" id="{C9635C69-5585-484A-8F3A-0C8B2DD313ED}"/>
+              </a:ext>
+            </a:extLst>
+          </p:cNvPr>
+          <p:cNvSpPr>
+            <a:spLocks noChangeAspect="1"/>
+          </p:cNvSpPr>
+          <p:nvPr/>
+        </p:nvSpPr>
+        <p:spPr>
+          <a:xfrm>
+            <a:off x="3351357" y="3922808"/>
+            <a:ext cx="245116" cy="219039"/>
+          </a:xfrm>
+          <a:prstGeom prst="ellipse">
+            <a:avLst/>
+          </a:prstGeom>
+          <a:solidFill>
+            <a:schemeClr val="bg2">
+              <a:lumMod val="75000"/>
+            </a:schemeClr>
+          </a:solidFill>
+          <a:ln>
+            <a:solidFill>
+              <a:schemeClr val="tx1"/>
+            </a:solidFill>
+          </a:ln>
+        </p:spPr>
+        <p:style>
+          <a:lnRef idx="2">
+            <a:schemeClr val="accent1">
+              <a:shade val="50000"/>
+            </a:schemeClr>
+          </a:lnRef>
+          <a:fillRef idx="1">
+            <a:schemeClr val="accent1"/>
+          </a:fillRef>
+          <a:effectRef idx="0">
+            <a:schemeClr val="accent1"/>
+          </a:effectRef>
+          <a:fontRef idx="minor">
+            <a:schemeClr val="lt1"/>
+          </a:fontRef>
+        </p:style>
+        <p:txBody>
+          <a:bodyPr rot="0" spcFirstLastPara="0" vertOverflow="overflow" horzOverflow="overflow" vert="horz" wrap="square" lIns="91440" tIns="45720" rIns="91440" bIns="45720" numCol="1" spcCol="0" rtlCol="0" fromWordArt="0" anchor="ctr" anchorCtr="0" forceAA="0" compatLnSpc="1">
+            <a:prstTxWarp prst="textNoShape">
+              <a:avLst/>
+            </a:prstTxWarp>
+            <a:noAutofit/>
+          </a:bodyPr>
+          <a:lstStyle/>
+          <a:p>
+            <a:pPr algn="ctr"/>
+            <a:endParaRPr lang="de-DE">
+              <a:latin typeface="Roboto" panose="02000000000000000000" pitchFamily="2" charset="0"/>
+              <a:ea typeface="Roboto" panose="02000000000000000000" pitchFamily="2" charset="0"/>
+            </a:endParaRPr>
+          </a:p>
+        </p:txBody>
+      </p:sp>
+      <p:cxnSp>
+        <p:nvCxnSpPr>
+          <p:cNvPr id="28" name="Straight Arrow Connector 27">
+            <a:extLst>
+              <a:ext uri="{FF2B5EF4-FFF2-40B4-BE49-F238E27FC236}">
+                <a16:creationId xmlns:a16="http://schemas.microsoft.com/office/drawing/2014/main" id="{066A76BD-D9C0-6D4D-8420-A6DBE479DCB9}"/>
+              </a:ext>
+            </a:extLst>
+          </p:cNvPr>
+          <p:cNvCxnSpPr>
+            <a:cxnSpLocks noChangeAspect="1"/>
+            <a:stCxn id="26" idx="3"/>
+            <a:endCxn id="27" idx="2"/>
+          </p:cNvCxnSpPr>
+          <p:nvPr/>
+        </p:nvCxnSpPr>
+        <p:spPr>
+          <a:xfrm>
+            <a:off x="3081592" y="4032328"/>
+            <a:ext cx="269765" cy="0"/>
+          </a:xfrm>
+          <a:prstGeom prst="straightConnector1">
+            <a:avLst/>
+          </a:prstGeom>
+          <a:ln w="12700">
+            <a:solidFill>
+              <a:schemeClr val="tx1"/>
+            </a:solidFill>
+            <a:tailEnd type="none"/>
+          </a:ln>
+        </p:spPr>
+        <p:style>
+          <a:lnRef idx="1">
+            <a:schemeClr val="accent1"/>
+          </a:lnRef>
+          <a:fillRef idx="0">
+            <a:schemeClr val="accent1"/>
+          </a:fillRef>
+          <a:effectRef idx="0">
+            <a:schemeClr val="accent1"/>
+          </a:effectRef>
+          <a:fontRef idx="minor">
+            <a:schemeClr val="tx1"/>
+          </a:fontRef>
+        </p:style>
+      </p:cxnSp>
+      <p:sp>
+        <p:nvSpPr>
+          <p:cNvPr id="31" name="Oval 30">
+            <a:extLst>
+              <a:ext uri="{FF2B5EF4-FFF2-40B4-BE49-F238E27FC236}">
+                <a16:creationId xmlns:a16="http://schemas.microsoft.com/office/drawing/2014/main" id="{CC844A2A-DB2F-C34D-8FC2-DF3E46B646A8}"/>
+              </a:ext>
+            </a:extLst>
+          </p:cNvPr>
+          <p:cNvSpPr>
+            <a:spLocks noChangeAspect="1"/>
+          </p:cNvSpPr>
+          <p:nvPr/>
+        </p:nvSpPr>
+        <p:spPr>
+          <a:xfrm>
+            <a:off x="3399635" y="1016083"/>
+            <a:ext cx="347782" cy="157692"/>
+          </a:xfrm>
+          <a:prstGeom prst="ellipse">
+            <a:avLst/>
+          </a:prstGeom>
+          <a:solidFill>
+            <a:schemeClr val="bg2"/>
+          </a:solidFill>
+          <a:ln>
+            <a:solidFill>
+              <a:schemeClr val="tx1"/>
+            </a:solidFill>
+          </a:ln>
+        </p:spPr>
+        <p:style>
+          <a:lnRef idx="2">
+            <a:schemeClr val="accent1">
+              <a:shade val="50000"/>
+            </a:schemeClr>
+          </a:lnRef>
+          <a:fillRef idx="1">
+            <a:schemeClr val="accent1"/>
+          </a:fillRef>
+          <a:effectRef idx="0">
+            <a:schemeClr val="accent1"/>
+          </a:effectRef>
+          <a:fontRef idx="minor">
+            <a:schemeClr val="lt1"/>
+          </a:fontRef>
+        </p:style>
+        <p:txBody>
+          <a:bodyPr rot="0" spcFirstLastPara="0" vertOverflow="overflow" horzOverflow="overflow" vert="horz" wrap="square" lIns="91440" tIns="45720" rIns="91440" bIns="45720" numCol="1" spcCol="0" rtlCol="0" fromWordArt="0" anchor="ctr" anchorCtr="0" forceAA="0" compatLnSpc="1">
+            <a:prstTxWarp prst="textNoShape">
+              <a:avLst/>
+            </a:prstTxWarp>
+            <a:noAutofit/>
+          </a:bodyPr>
+          <a:lstStyle/>
+          <a:p>
+            <a:pPr algn="ctr"/>
+            <a:endParaRPr lang="de-DE">
+              <a:latin typeface="Roboto" panose="02000000000000000000" pitchFamily="2" charset="0"/>
+              <a:ea typeface="Roboto" panose="02000000000000000000" pitchFamily="2" charset="0"/>
+            </a:endParaRPr>
+          </a:p>
+        </p:txBody>
+      </p:sp>
+      <p:sp>
+        <p:nvSpPr>
+          <p:cNvPr id="32" name="TextBox 31">
+            <a:extLst>
+              <a:ext uri="{FF2B5EF4-FFF2-40B4-BE49-F238E27FC236}">
+                <a16:creationId xmlns:a16="http://schemas.microsoft.com/office/drawing/2014/main" id="{549F580D-BFE8-DA46-9B06-449F43EC0F3D}"/>
+              </a:ext>
+            </a:extLst>
+          </p:cNvPr>
+          <p:cNvSpPr txBox="1"/>
+          <p:nvPr/>
+        </p:nvSpPr>
+        <p:spPr>
+          <a:xfrm>
+            <a:off x="4466416" y="-16747"/>
+            <a:ext cx="3094117" cy="4401205"/>
+          </a:xfrm>
+          <a:prstGeom prst="rect">
+            <a:avLst/>
+          </a:prstGeom>
+          <a:noFill/>
+        </p:spPr>
+        <p:txBody>
+          <a:bodyPr wrap="none" rtlCol="0">
+            <a:spAutoFit/>
+          </a:bodyPr>
+          <a:lstStyle/>
+          <a:p>
+            <a:pPr marL="346075" indent="-346075">
+              <a:spcAft>
+                <a:spcPts val="3000"/>
+              </a:spcAft>
+              <a:buFont typeface="+mj-lt"/>
+              <a:buAutoNum type="arabicPeriod" startAt="6"/>
+              <a:tabLst>
+                <a:tab pos="261938" algn="l"/>
+              </a:tabLst>
+            </a:pPr>
+            <a:r>
+              <a:rPr lang="de-DE">
+                <a:latin typeface="Roboto" panose="02000000000000000000" pitchFamily="2" charset="0"/>
+                <a:ea typeface="Roboto" panose="02000000000000000000" pitchFamily="2" charset="0"/>
+              </a:rPr>
+              <a:t>Asymmetric line:</a:t>
+            </a:r>
+            <a:br>
+              <a:rPr lang="de-DE">
+                <a:latin typeface="Roboto" panose="02000000000000000000" pitchFamily="2" charset="0"/>
+                <a:ea typeface="Roboto" panose="02000000000000000000" pitchFamily="2" charset="0"/>
+              </a:rPr>
+            </a:br>
+            <a:r>
+              <a:rPr lang="de-DE">
+                <a:latin typeface="Roboto" panose="02000000000000000000" pitchFamily="2" charset="0"/>
+                <a:ea typeface="Roboto" panose="02000000000000000000" pitchFamily="2" charset="0"/>
+              </a:rPr>
+              <a:t>asym. relationship</a:t>
+            </a:r>
+          </a:p>
+          <a:p>
+            <a:pPr marL="346075" indent="-346075">
+              <a:spcAft>
+                <a:spcPts val="3000"/>
+              </a:spcAft>
+              <a:buAutoNum type="arabicPeriod" startAt="6"/>
+              <a:tabLst>
+                <a:tab pos="261938" algn="l"/>
+              </a:tabLst>
+            </a:pPr>
+            <a:r>
+              <a:rPr lang="de-DE">
+                <a:latin typeface="Roboto" panose="02000000000000000000" pitchFamily="2" charset="0"/>
+                <a:ea typeface="Roboto" panose="02000000000000000000" pitchFamily="2" charset="0"/>
+              </a:rPr>
+              <a:t>Line style:</a:t>
+            </a:r>
+            <a:br>
+              <a:rPr lang="de-DE">
+                <a:latin typeface="Roboto" panose="02000000000000000000" pitchFamily="2" charset="0"/>
+                <a:ea typeface="Roboto" panose="02000000000000000000" pitchFamily="2" charset="0"/>
+              </a:rPr>
+            </a:br>
+            <a:r>
+              <a:rPr lang="de-DE">
+                <a:latin typeface="Roboto" panose="02000000000000000000" pitchFamily="2" charset="0"/>
+                <a:ea typeface="Roboto" panose="02000000000000000000" pitchFamily="2" charset="0"/>
+              </a:rPr>
+              <a:t>type of relationship</a:t>
+            </a:r>
+          </a:p>
+          <a:p>
+            <a:pPr marL="346075" indent="-346075">
+              <a:spcAft>
+                <a:spcPts val="3000"/>
+              </a:spcAft>
+              <a:buAutoNum type="arabicPeriod" startAt="6"/>
+              <a:tabLst>
+                <a:tab pos="261938" algn="l"/>
+              </a:tabLst>
+            </a:pPr>
+            <a:r>
+              <a:rPr lang="de-DE">
+                <a:latin typeface="Roboto" panose="02000000000000000000" pitchFamily="2" charset="0"/>
+                <a:ea typeface="Roboto" panose="02000000000000000000" pitchFamily="2" charset="0"/>
+              </a:rPr>
+              <a:t>Line weight:</a:t>
+            </a:r>
+            <a:br>
+              <a:rPr lang="de-DE">
+                <a:latin typeface="Roboto" panose="02000000000000000000" pitchFamily="2" charset="0"/>
+                <a:ea typeface="Roboto" panose="02000000000000000000" pitchFamily="2" charset="0"/>
+              </a:rPr>
+            </a:br>
+            <a:r>
+              <a:rPr lang="de-DE">
+                <a:latin typeface="Roboto" panose="02000000000000000000" pitchFamily="2" charset="0"/>
+                <a:ea typeface="Roboto" panose="02000000000000000000" pitchFamily="2" charset="0"/>
+              </a:rPr>
+              <a:t>strength of relationsh.</a:t>
+            </a:r>
+          </a:p>
+          <a:p>
+            <a:pPr marL="346075" indent="-346075">
+              <a:spcAft>
+                <a:spcPts val="3000"/>
+              </a:spcAft>
+              <a:buAutoNum type="arabicPeriod" startAt="6"/>
+              <a:tabLst>
+                <a:tab pos="261938" algn="l"/>
+              </a:tabLst>
+            </a:pPr>
+            <a:r>
+              <a:rPr lang="de-DE">
+                <a:latin typeface="Roboto" panose="02000000000000000000" pitchFamily="2" charset="0"/>
+                <a:ea typeface="Roboto" panose="02000000000000000000" pitchFamily="2" charset="0"/>
+              </a:rPr>
+              <a:t>Shapes with receptables:</a:t>
+            </a:r>
+            <a:br>
+              <a:rPr lang="de-DE">
+                <a:latin typeface="Roboto" panose="02000000000000000000" pitchFamily="2" charset="0"/>
+                <a:ea typeface="Roboto" panose="02000000000000000000" pitchFamily="2" charset="0"/>
+              </a:rPr>
+            </a:br>
+            <a:r>
+              <a:rPr lang="de-DE">
+                <a:latin typeface="Roboto" panose="02000000000000000000" pitchFamily="2" charset="0"/>
+                <a:ea typeface="Roboto" panose="02000000000000000000" pitchFamily="2" charset="0"/>
+              </a:rPr>
+              <a:t>fit between components</a:t>
+            </a:r>
+          </a:p>
+          <a:p>
+            <a:pPr marL="346075" indent="-346075">
+              <a:spcAft>
+                <a:spcPts val="3000"/>
+              </a:spcAft>
+              <a:buAutoNum type="arabicPeriod" startAt="6"/>
+              <a:tabLst>
+                <a:tab pos="261938" algn="l"/>
+              </a:tabLst>
+            </a:pPr>
+            <a:r>
+              <a:rPr lang="de-DE">
+                <a:latin typeface="Roboto" panose="02000000000000000000" pitchFamily="2" charset="0"/>
+                <a:ea typeface="Roboto" panose="02000000000000000000" pitchFamily="2" charset="0"/>
+              </a:rPr>
+              <a:t>Proximity groupings:</a:t>
+            </a:r>
+            <a:br>
+              <a:rPr lang="de-DE">
+                <a:latin typeface="Roboto" panose="02000000000000000000" pitchFamily="2" charset="0"/>
+                <a:ea typeface="Roboto" panose="02000000000000000000" pitchFamily="2" charset="0"/>
+              </a:rPr>
+            </a:br>
+            <a:r>
+              <a:rPr lang="de-DE">
+                <a:latin typeface="Roboto" panose="02000000000000000000" pitchFamily="2" charset="0"/>
+                <a:ea typeface="Roboto" panose="02000000000000000000" pitchFamily="2" charset="0"/>
+              </a:rPr>
+              <a:t>groups of components</a:t>
+            </a:r>
+          </a:p>
+        </p:txBody>
+      </p:sp>
+      <p:sp>
+        <p:nvSpPr>
+          <p:cNvPr id="35" name="Rectangle 34">
+            <a:extLst>
+              <a:ext uri="{FF2B5EF4-FFF2-40B4-BE49-F238E27FC236}">
+                <a16:creationId xmlns:a16="http://schemas.microsoft.com/office/drawing/2014/main" id="{CDDD6BE5-1F0F-4F40-B7E3-52A7C9D3DF57}"/>
+              </a:ext>
+            </a:extLst>
+          </p:cNvPr>
+          <p:cNvSpPr>
+            <a:spLocks noChangeAspect="1"/>
+          </p:cNvSpPr>
+          <p:nvPr/>
+        </p:nvSpPr>
+        <p:spPr>
+          <a:xfrm>
+            <a:off x="7289735" y="108098"/>
+            <a:ext cx="149470" cy="144000"/>
+          </a:xfrm>
+          <a:prstGeom prst="rect">
+            <a:avLst/>
+          </a:prstGeom>
+          <a:solidFill>
+            <a:schemeClr val="bg2">
+              <a:lumMod val="75000"/>
+            </a:schemeClr>
+          </a:solidFill>
+          <a:ln>
+            <a:noFill/>
+          </a:ln>
+        </p:spPr>
+        <p:style>
+          <a:lnRef idx="2">
+            <a:schemeClr val="accent1">
+              <a:shade val="50000"/>
+            </a:schemeClr>
+          </a:lnRef>
+          <a:fillRef idx="1">
+            <a:schemeClr val="accent1"/>
+          </a:fillRef>
+          <a:effectRef idx="0">
+            <a:schemeClr val="accent1"/>
+          </a:effectRef>
+          <a:fontRef idx="minor">
+            <a:schemeClr val="lt1"/>
+          </a:fontRef>
+        </p:style>
+        <p:txBody>
+          <a:bodyPr rot="0" spcFirstLastPara="0" vertOverflow="overflow" horzOverflow="overflow" vert="horz" wrap="square" lIns="91440" tIns="45720" rIns="91440" bIns="45720" numCol="1" spcCol="0" rtlCol="0" fromWordArt="0" anchor="ctr" anchorCtr="0" forceAA="0" compatLnSpc="1">
+            <a:prstTxWarp prst="textNoShape">
+              <a:avLst/>
+            </a:prstTxWarp>
+            <a:noAutofit/>
+          </a:bodyPr>
+          <a:lstStyle/>
+          <a:p>
+            <a:pPr algn="ctr"/>
+            <a:endParaRPr lang="de-DE">
+              <a:latin typeface="Roboto" panose="02000000000000000000" pitchFamily="2" charset="0"/>
+              <a:ea typeface="Roboto" panose="02000000000000000000" pitchFamily="2" charset="0"/>
+            </a:endParaRPr>
+          </a:p>
+        </p:txBody>
+      </p:sp>
+      <p:sp>
+        <p:nvSpPr>
+          <p:cNvPr id="36" name="Oval 35">
+            <a:extLst>
+              <a:ext uri="{FF2B5EF4-FFF2-40B4-BE49-F238E27FC236}">
+                <a16:creationId xmlns:a16="http://schemas.microsoft.com/office/drawing/2014/main" id="{5E579A86-34A2-3F4A-93F7-00DDA023AD4A}"/>
+              </a:ext>
+            </a:extLst>
+          </p:cNvPr>
+          <p:cNvSpPr>
+            <a:spLocks noChangeAspect="1"/>
+          </p:cNvSpPr>
+          <p:nvPr/>
+        </p:nvSpPr>
+        <p:spPr>
+          <a:xfrm>
+            <a:off x="7698233" y="108098"/>
+            <a:ext cx="161143" cy="144000"/>
+          </a:xfrm>
+          <a:prstGeom prst="ellipse">
+            <a:avLst/>
+          </a:prstGeom>
+          <a:solidFill>
+            <a:schemeClr val="bg2">
+              <a:lumMod val="75000"/>
+            </a:schemeClr>
+          </a:solidFill>
+          <a:ln>
+            <a:noFill/>
+          </a:ln>
+        </p:spPr>
+        <p:style>
+          <a:lnRef idx="2">
+            <a:schemeClr val="accent1">
+              <a:shade val="50000"/>
+            </a:schemeClr>
+          </a:lnRef>
+          <a:fillRef idx="1">
+            <a:schemeClr val="accent1"/>
+          </a:fillRef>
+          <a:effectRef idx="0">
+            <a:schemeClr val="accent1"/>
+          </a:effectRef>
+          <a:fontRef idx="minor">
+            <a:schemeClr val="lt1"/>
+          </a:fontRef>
+        </p:style>
+        <p:txBody>
+          <a:bodyPr rot="0" spcFirstLastPara="0" vertOverflow="overflow" horzOverflow="overflow" vert="horz" wrap="square" lIns="91440" tIns="45720" rIns="91440" bIns="45720" numCol="1" spcCol="0" rtlCol="0" fromWordArt="0" anchor="ctr" anchorCtr="0" forceAA="0" compatLnSpc="1">
+            <a:prstTxWarp prst="textNoShape">
+              <a:avLst/>
+            </a:prstTxWarp>
+            <a:noAutofit/>
+          </a:bodyPr>
+          <a:lstStyle/>
+          <a:p>
+            <a:pPr algn="ctr"/>
+            <a:endParaRPr lang="de-DE">
+              <a:latin typeface="Roboto" panose="02000000000000000000" pitchFamily="2" charset="0"/>
+              <a:ea typeface="Roboto" panose="02000000000000000000" pitchFamily="2" charset="0"/>
+            </a:endParaRPr>
+          </a:p>
+        </p:txBody>
+      </p:sp>
+      <p:cxnSp>
+        <p:nvCxnSpPr>
+          <p:cNvPr id="37" name="Straight Arrow Connector 36">
+            <a:extLst>
+              <a:ext uri="{FF2B5EF4-FFF2-40B4-BE49-F238E27FC236}">
+                <a16:creationId xmlns:a16="http://schemas.microsoft.com/office/drawing/2014/main" id="{1EE12551-580B-4144-BEE8-75603BA43FB5}"/>
+              </a:ext>
+            </a:extLst>
+          </p:cNvPr>
+          <p:cNvCxnSpPr>
+            <a:cxnSpLocks noChangeAspect="1"/>
+            <a:stCxn id="35" idx="3"/>
+            <a:endCxn id="36" idx="2"/>
+          </p:cNvCxnSpPr>
+          <p:nvPr/>
+        </p:nvCxnSpPr>
+        <p:spPr>
+          <a:xfrm>
+            <a:off x="7439205" y="180098"/>
+            <a:ext cx="259028" cy="0"/>
+          </a:xfrm>
+          <a:prstGeom prst="straightConnector1">
+            <a:avLst/>
+          </a:prstGeom>
+          <a:ln w="12700">
+            <a:solidFill>
+              <a:schemeClr val="tx1"/>
+            </a:solidFill>
+            <a:headEnd w="med" len="med"/>
+            <a:tailEnd type="arrow" w="sm" len="sm"/>
+          </a:ln>
+        </p:spPr>
+        <p:style>
+          <a:lnRef idx="1">
+            <a:schemeClr val="accent1"/>
+          </a:lnRef>
+          <a:fillRef idx="0">
+            <a:schemeClr val="accent1"/>
+          </a:fillRef>
+          <a:effectRef idx="0">
+            <a:schemeClr val="accent1"/>
+          </a:effectRef>
+          <a:fontRef idx="minor">
+            <a:schemeClr val="tx1"/>
+          </a:fontRef>
+        </p:style>
+      </p:cxnSp>
+      <p:sp>
+        <p:nvSpPr>
+          <p:cNvPr id="42" name="Rectangle 41">
+            <a:extLst>
+              <a:ext uri="{FF2B5EF4-FFF2-40B4-BE49-F238E27FC236}">
+                <a16:creationId xmlns:a16="http://schemas.microsoft.com/office/drawing/2014/main" id="{7FD08460-F0FE-3C40-AD4B-5BEDCAB0F012}"/>
+              </a:ext>
+            </a:extLst>
+          </p:cNvPr>
+          <p:cNvSpPr>
+            <a:spLocks noChangeAspect="1"/>
+          </p:cNvSpPr>
+          <p:nvPr/>
+        </p:nvSpPr>
+        <p:spPr>
+          <a:xfrm>
+            <a:off x="8095532" y="108098"/>
+            <a:ext cx="161143" cy="144000"/>
+          </a:xfrm>
+          <a:prstGeom prst="rect">
+            <a:avLst/>
+          </a:prstGeom>
+          <a:solidFill>
+            <a:schemeClr val="bg2">
+              <a:lumMod val="75000"/>
+            </a:schemeClr>
+          </a:solidFill>
+          <a:ln>
+            <a:noFill/>
+          </a:ln>
+        </p:spPr>
+        <p:style>
+          <a:lnRef idx="2">
+            <a:schemeClr val="accent1">
+              <a:shade val="50000"/>
+            </a:schemeClr>
+          </a:lnRef>
+          <a:fillRef idx="1">
+            <a:schemeClr val="accent1"/>
+          </a:fillRef>
+          <a:effectRef idx="0">
+            <a:schemeClr val="accent1"/>
+          </a:effectRef>
+          <a:fontRef idx="minor">
+            <a:schemeClr val="lt1"/>
+          </a:fontRef>
+        </p:style>
+        <p:txBody>
+          <a:bodyPr rot="0" spcFirstLastPara="0" vertOverflow="overflow" horzOverflow="overflow" vert="horz" wrap="square" lIns="91440" tIns="45720" rIns="91440" bIns="45720" numCol="1" spcCol="0" rtlCol="0" fromWordArt="0" anchor="ctr" anchorCtr="0" forceAA="0" compatLnSpc="1">
+            <a:prstTxWarp prst="textNoShape">
+              <a:avLst/>
+            </a:prstTxWarp>
+            <a:noAutofit/>
+          </a:bodyPr>
+          <a:lstStyle/>
+          <a:p>
+            <a:pPr algn="ctr"/>
+            <a:endParaRPr lang="de-DE">
+              <a:latin typeface="Roboto" panose="02000000000000000000" pitchFamily="2" charset="0"/>
+              <a:ea typeface="Roboto" panose="02000000000000000000" pitchFamily="2" charset="0"/>
+            </a:endParaRPr>
+          </a:p>
+        </p:txBody>
+      </p:sp>
+      <p:cxnSp>
+        <p:nvCxnSpPr>
+          <p:cNvPr id="46" name="Straight Arrow Connector 45">
+            <a:extLst>
+              <a:ext uri="{FF2B5EF4-FFF2-40B4-BE49-F238E27FC236}">
+                <a16:creationId xmlns:a16="http://schemas.microsoft.com/office/drawing/2014/main" id="{D9FD48E2-7E44-954B-8CBE-1EB5FC43B175}"/>
+              </a:ext>
+            </a:extLst>
+          </p:cNvPr>
+          <p:cNvCxnSpPr>
+            <a:cxnSpLocks noChangeAspect="1"/>
+          </p:cNvCxnSpPr>
+          <p:nvPr/>
+        </p:nvCxnSpPr>
+        <p:spPr>
+          <a:xfrm>
+            <a:off x="7857660" y="180098"/>
+            <a:ext cx="212041" cy="0"/>
+          </a:xfrm>
+          <a:prstGeom prst="straightConnector1">
+            <a:avLst/>
+          </a:prstGeom>
+          <a:ln w="12700">
+            <a:solidFill>
+              <a:schemeClr val="tx1"/>
+            </a:solidFill>
+            <a:headEnd type="arrow" w="sm" len="sm"/>
+            <a:tailEnd type="oval" w="sm" len="sm"/>
+          </a:ln>
+        </p:spPr>
+        <p:style>
+          <a:lnRef idx="1">
+            <a:schemeClr val="accent1"/>
+          </a:lnRef>
+          <a:fillRef idx="0">
+            <a:schemeClr val="accent1"/>
+          </a:fillRef>
+          <a:effectRef idx="0">
+            <a:schemeClr val="accent1"/>
+          </a:effectRef>
+          <a:fontRef idx="minor">
+            <a:schemeClr val="tx1"/>
+          </a:fontRef>
+        </p:style>
+      </p:cxnSp>
+      <p:sp>
+        <p:nvSpPr>
+          <p:cNvPr id="48" name="Rectangle 47">
+            <a:extLst>
+              <a:ext uri="{FF2B5EF4-FFF2-40B4-BE49-F238E27FC236}">
+                <a16:creationId xmlns:a16="http://schemas.microsoft.com/office/drawing/2014/main" id="{084BE415-B4EF-6445-930E-8F48B684E0C4}"/>
+              </a:ext>
+            </a:extLst>
+          </p:cNvPr>
+          <p:cNvSpPr>
+            <a:spLocks noChangeAspect="1"/>
+          </p:cNvSpPr>
+          <p:nvPr/>
+        </p:nvSpPr>
+        <p:spPr>
+          <a:xfrm>
+            <a:off x="7289735" y="387067"/>
+            <a:ext cx="149470" cy="144000"/>
+          </a:xfrm>
+          <a:prstGeom prst="rect">
+            <a:avLst/>
+          </a:prstGeom>
+          <a:solidFill>
+            <a:schemeClr val="bg2">
+              <a:lumMod val="75000"/>
+            </a:schemeClr>
+          </a:solidFill>
+          <a:ln>
+            <a:noFill/>
+          </a:ln>
+        </p:spPr>
+        <p:style>
+          <a:lnRef idx="2">
+            <a:schemeClr val="accent1">
+              <a:shade val="50000"/>
+            </a:schemeClr>
+          </a:lnRef>
+          <a:fillRef idx="1">
+            <a:schemeClr val="accent1"/>
+          </a:fillRef>
+          <a:effectRef idx="0">
+            <a:schemeClr val="accent1"/>
+          </a:effectRef>
+          <a:fontRef idx="minor">
+            <a:schemeClr val="lt1"/>
+          </a:fontRef>
+        </p:style>
+        <p:txBody>
+          <a:bodyPr rot="0" spcFirstLastPara="0" vertOverflow="overflow" horzOverflow="overflow" vert="horz" wrap="square" lIns="91440" tIns="45720" rIns="91440" bIns="45720" numCol="1" spcCol="0" rtlCol="0" fromWordArt="0" anchor="ctr" anchorCtr="0" forceAA="0" compatLnSpc="1">
+            <a:prstTxWarp prst="textNoShape">
+              <a:avLst/>
+            </a:prstTxWarp>
+            <a:noAutofit/>
+          </a:bodyPr>
+          <a:lstStyle/>
+          <a:p>
+            <a:pPr algn="ctr"/>
+            <a:endParaRPr lang="de-DE">
+              <a:latin typeface="Roboto" panose="02000000000000000000" pitchFamily="2" charset="0"/>
+              <a:ea typeface="Roboto" panose="02000000000000000000" pitchFamily="2" charset="0"/>
+            </a:endParaRPr>
+          </a:p>
+        </p:txBody>
+      </p:sp>
+      <p:sp>
+        <p:nvSpPr>
+          <p:cNvPr id="49" name="Oval 48">
+            <a:extLst>
+              <a:ext uri="{FF2B5EF4-FFF2-40B4-BE49-F238E27FC236}">
+                <a16:creationId xmlns:a16="http://schemas.microsoft.com/office/drawing/2014/main" id="{ECC3C45A-E7CB-3248-85E3-77611B25DAD6}"/>
+              </a:ext>
+            </a:extLst>
+          </p:cNvPr>
+          <p:cNvSpPr>
+            <a:spLocks noChangeAspect="1"/>
+          </p:cNvSpPr>
+          <p:nvPr/>
+        </p:nvSpPr>
+        <p:spPr>
+          <a:xfrm>
+            <a:off x="7698233" y="387067"/>
+            <a:ext cx="161143" cy="144000"/>
+          </a:xfrm>
+          <a:prstGeom prst="ellipse">
+            <a:avLst/>
+          </a:prstGeom>
+          <a:solidFill>
+            <a:schemeClr val="bg2">
+              <a:lumMod val="75000"/>
+            </a:schemeClr>
+          </a:solidFill>
+          <a:ln>
+            <a:noFill/>
+          </a:ln>
+        </p:spPr>
+        <p:style>
+          <a:lnRef idx="2">
+            <a:schemeClr val="accent1">
+              <a:shade val="50000"/>
+            </a:schemeClr>
+          </a:lnRef>
+          <a:fillRef idx="1">
+            <a:schemeClr val="accent1"/>
+          </a:fillRef>
+          <a:effectRef idx="0">
+            <a:schemeClr val="accent1"/>
+          </a:effectRef>
+          <a:fontRef idx="minor">
+            <a:schemeClr val="lt1"/>
+          </a:fontRef>
+        </p:style>
+        <p:txBody>
+          <a:bodyPr rot="0" spcFirstLastPara="0" vertOverflow="overflow" horzOverflow="overflow" vert="horz" wrap="square" lIns="91440" tIns="45720" rIns="91440" bIns="45720" numCol="1" spcCol="0" rtlCol="0" fromWordArt="0" anchor="ctr" anchorCtr="0" forceAA="0" compatLnSpc="1">
+            <a:prstTxWarp prst="textNoShape">
+              <a:avLst/>
+            </a:prstTxWarp>
+            <a:noAutofit/>
+          </a:bodyPr>
+          <a:lstStyle/>
+          <a:p>
+            <a:pPr algn="ctr"/>
+            <a:endParaRPr lang="de-DE">
+              <a:latin typeface="Roboto" panose="02000000000000000000" pitchFamily="2" charset="0"/>
+              <a:ea typeface="Roboto" panose="02000000000000000000" pitchFamily="2" charset="0"/>
+            </a:endParaRPr>
+          </a:p>
+        </p:txBody>
+      </p:sp>
+      <p:sp>
+        <p:nvSpPr>
+          <p:cNvPr id="51" name="Triangle 50">
+            <a:extLst>
+              <a:ext uri="{FF2B5EF4-FFF2-40B4-BE49-F238E27FC236}">
+                <a16:creationId xmlns:a16="http://schemas.microsoft.com/office/drawing/2014/main" id="{738CDE5D-D83B-E54E-900A-6C5AEF29DC20}"/>
+              </a:ext>
+            </a:extLst>
+          </p:cNvPr>
+          <p:cNvSpPr>
+            <a:spLocks/>
+          </p:cNvSpPr>
+          <p:nvPr/>
+        </p:nvSpPr>
+        <p:spPr>
+          <a:xfrm rot="5400000" flipH="1">
+            <a:off x="7548744" y="331267"/>
+            <a:ext cx="36000" cy="255600"/>
+          </a:xfrm>
+          <a:prstGeom prst="triangle">
+            <a:avLst/>
+          </a:prstGeom>
+          <a:solidFill>
+            <a:schemeClr val="tx1"/>
+          </a:solidFill>
+          <a:ln>
+            <a:noFill/>
+          </a:ln>
+        </p:spPr>
+        <p:style>
+          <a:lnRef idx="2">
+            <a:schemeClr val="accent1">
+              <a:shade val="50000"/>
+            </a:schemeClr>
+          </a:lnRef>
+          <a:fillRef idx="1">
+            <a:schemeClr val="accent1"/>
+          </a:fillRef>
+          <a:effectRef idx="0">
+            <a:schemeClr val="accent1"/>
+          </a:effectRef>
+          <a:fontRef idx="minor">
+            <a:schemeClr val="lt1"/>
+          </a:fontRef>
+        </p:style>
+        <p:txBody>
+          <a:bodyPr rot="0" spcFirstLastPara="0" vertOverflow="overflow" horzOverflow="overflow" vert="horz" wrap="square" lIns="91440" tIns="45720" rIns="91440" bIns="45720" numCol="1" spcCol="0" rtlCol="0" fromWordArt="0" anchor="ctr" anchorCtr="0" forceAA="0" compatLnSpc="1">
+            <a:prstTxWarp prst="textNoShape">
+              <a:avLst/>
+            </a:prstTxWarp>
+            <a:noAutofit/>
+          </a:bodyPr>
+          <a:lstStyle/>
+          <a:p>
+            <a:pPr algn="ctr"/>
+            <a:endParaRPr lang="de-DE">
+              <a:latin typeface="Roboto" panose="02000000000000000000" pitchFamily="2" charset="0"/>
+              <a:ea typeface="Roboto" panose="02000000000000000000" pitchFamily="2" charset="0"/>
+            </a:endParaRPr>
+          </a:p>
+        </p:txBody>
+      </p:sp>
+      <p:sp>
+        <p:nvSpPr>
+          <p:cNvPr id="53" name="Rectangle 52">
+            <a:extLst>
+              <a:ext uri="{FF2B5EF4-FFF2-40B4-BE49-F238E27FC236}">
+                <a16:creationId xmlns:a16="http://schemas.microsoft.com/office/drawing/2014/main" id="{1D7BDEB7-EB89-E143-95A3-0D280F284A8B}"/>
+              </a:ext>
+            </a:extLst>
+          </p:cNvPr>
+          <p:cNvSpPr>
+            <a:spLocks noChangeAspect="1"/>
+          </p:cNvSpPr>
+          <p:nvPr/>
+        </p:nvSpPr>
+        <p:spPr>
+          <a:xfrm>
+            <a:off x="8095532" y="387067"/>
+            <a:ext cx="149470" cy="144000"/>
+          </a:xfrm>
+          <a:prstGeom prst="rect">
+            <a:avLst/>
+          </a:prstGeom>
+          <a:solidFill>
+            <a:schemeClr val="bg2">
+              <a:lumMod val="75000"/>
+            </a:schemeClr>
+          </a:solidFill>
+          <a:ln>
+            <a:noFill/>
+          </a:ln>
+        </p:spPr>
+        <p:style>
+          <a:lnRef idx="2">
+            <a:schemeClr val="accent1">
+              <a:shade val="50000"/>
+            </a:schemeClr>
+          </a:lnRef>
+          <a:fillRef idx="1">
+            <a:schemeClr val="accent1"/>
+          </a:fillRef>
+          <a:effectRef idx="0">
+            <a:schemeClr val="accent1"/>
+          </a:effectRef>
+          <a:fontRef idx="minor">
+            <a:schemeClr val="lt1"/>
+          </a:fontRef>
+        </p:style>
+        <p:txBody>
+          <a:bodyPr rot="0" spcFirstLastPara="0" vertOverflow="overflow" horzOverflow="overflow" vert="horz" wrap="square" lIns="91440" tIns="45720" rIns="91440" bIns="45720" numCol="1" spcCol="0" rtlCol="0" fromWordArt="0" anchor="ctr" anchorCtr="0" forceAA="0" compatLnSpc="1">
+            <a:prstTxWarp prst="textNoShape">
+              <a:avLst/>
+            </a:prstTxWarp>
+            <a:noAutofit/>
+          </a:bodyPr>
+          <a:lstStyle/>
+          <a:p>
+            <a:pPr algn="ctr"/>
+            <a:endParaRPr lang="de-DE">
+              <a:latin typeface="Roboto" panose="02000000000000000000" pitchFamily="2" charset="0"/>
+              <a:ea typeface="Roboto" panose="02000000000000000000" pitchFamily="2" charset="0"/>
+            </a:endParaRPr>
+          </a:p>
+        </p:txBody>
+      </p:sp>
+      <p:sp>
+        <p:nvSpPr>
+          <p:cNvPr id="54" name="Triangle 53">
+            <a:extLst>
+              <a:ext uri="{FF2B5EF4-FFF2-40B4-BE49-F238E27FC236}">
+                <a16:creationId xmlns:a16="http://schemas.microsoft.com/office/drawing/2014/main" id="{F3837650-632B-4649-A8BA-3C65204B9031}"/>
+              </a:ext>
+            </a:extLst>
+          </p:cNvPr>
+          <p:cNvSpPr>
+            <a:spLocks/>
+          </p:cNvSpPr>
+          <p:nvPr/>
+        </p:nvSpPr>
+        <p:spPr>
+          <a:xfrm rot="16200000">
+            <a:off x="7967460" y="331267"/>
+            <a:ext cx="36000" cy="255600"/>
+          </a:xfrm>
+          <a:prstGeom prst="triangle">
+            <a:avLst/>
+          </a:prstGeom>
+          <a:solidFill>
+            <a:schemeClr val="tx1"/>
+          </a:solidFill>
+          <a:ln>
+            <a:noFill/>
+          </a:ln>
+        </p:spPr>
+        <p:style>
+          <a:lnRef idx="2">
+            <a:schemeClr val="accent1">
+              <a:shade val="50000"/>
+            </a:schemeClr>
+          </a:lnRef>
+          <a:fillRef idx="1">
+            <a:schemeClr val="accent1"/>
+          </a:fillRef>
+          <a:effectRef idx="0">
+            <a:schemeClr val="accent1"/>
+          </a:effectRef>
+          <a:fontRef idx="minor">
+            <a:schemeClr val="lt1"/>
+          </a:fontRef>
+        </p:style>
+        <p:txBody>
+          <a:bodyPr rot="0" spcFirstLastPara="0" vertOverflow="overflow" horzOverflow="overflow" vert="horz" wrap="square" lIns="91440" tIns="45720" rIns="91440" bIns="45720" numCol="1" spcCol="0" rtlCol="0" fromWordArt="0" anchor="ctr" anchorCtr="0" forceAA="0" compatLnSpc="1">
+            <a:prstTxWarp prst="textNoShape">
+              <a:avLst/>
+            </a:prstTxWarp>
+            <a:noAutofit/>
+          </a:bodyPr>
+          <a:lstStyle/>
+          <a:p>
+            <a:pPr algn="ctr"/>
+            <a:endParaRPr lang="de-DE">
+              <a:latin typeface="Roboto" panose="02000000000000000000" pitchFamily="2" charset="0"/>
+              <a:ea typeface="Roboto" panose="02000000000000000000" pitchFamily="2" charset="0"/>
+            </a:endParaRPr>
+          </a:p>
+        </p:txBody>
+      </p:sp>
+      <p:cxnSp>
+        <p:nvCxnSpPr>
+          <p:cNvPr id="58" name="Straight Arrow Connector 57">
+            <a:extLst>
+              <a:ext uri="{FF2B5EF4-FFF2-40B4-BE49-F238E27FC236}">
+                <a16:creationId xmlns:a16="http://schemas.microsoft.com/office/drawing/2014/main" id="{A740C097-E5E2-434F-A2AD-2FB7C9A4803B}"/>
+              </a:ext>
+            </a:extLst>
+          </p:cNvPr>
+          <p:cNvCxnSpPr>
+            <a:cxnSpLocks noChangeAspect="1"/>
+          </p:cNvCxnSpPr>
+          <p:nvPr/>
+        </p:nvCxnSpPr>
+        <p:spPr>
+          <a:xfrm>
+            <a:off x="7289735" y="1016083"/>
+            <a:ext cx="955267" cy="0"/>
+          </a:xfrm>
+          <a:prstGeom prst="straightConnector1">
+            <a:avLst/>
+          </a:prstGeom>
+          <a:ln w="38100">
+            <a:solidFill>
+              <a:schemeClr val="tx1"/>
+            </a:solidFill>
+            <a:headEnd w="med" len="med"/>
+            <a:tailEnd type="none" w="sm" len="sm"/>
+          </a:ln>
+        </p:spPr>
+        <p:style>
+          <a:lnRef idx="1">
+            <a:schemeClr val="accent1"/>
+          </a:lnRef>
+          <a:fillRef idx="0">
+            <a:schemeClr val="accent1"/>
+          </a:fillRef>
+          <a:effectRef idx="0">
+            <a:schemeClr val="accent1"/>
+          </a:effectRef>
+          <a:fontRef idx="minor">
+            <a:schemeClr val="tx1"/>
+          </a:fontRef>
+        </p:style>
+      </p:cxnSp>
+      <p:cxnSp>
+        <p:nvCxnSpPr>
+          <p:cNvPr id="59" name="Straight Arrow Connector 58">
+            <a:extLst>
+              <a:ext uri="{FF2B5EF4-FFF2-40B4-BE49-F238E27FC236}">
+                <a16:creationId xmlns:a16="http://schemas.microsoft.com/office/drawing/2014/main" id="{D6AC737F-1B36-7343-8E34-83401B8AD913}"/>
+              </a:ext>
+            </a:extLst>
+          </p:cNvPr>
+          <p:cNvCxnSpPr>
+            <a:cxnSpLocks noChangeAspect="1"/>
+          </p:cNvCxnSpPr>
+          <p:nvPr/>
+        </p:nvCxnSpPr>
+        <p:spPr>
+          <a:xfrm>
+            <a:off x="7289735" y="1118143"/>
+            <a:ext cx="955267" cy="0"/>
+          </a:xfrm>
+          <a:prstGeom prst="straightConnector1">
+            <a:avLst/>
+          </a:prstGeom>
+          <a:ln w="38100" cmpd="dbl">
+            <a:solidFill>
+              <a:schemeClr val="tx1"/>
+            </a:solidFill>
+            <a:headEnd w="med" len="med"/>
+            <a:tailEnd type="none" w="sm" len="sm"/>
+          </a:ln>
+        </p:spPr>
+        <p:style>
+          <a:lnRef idx="1">
+            <a:schemeClr val="accent1"/>
+          </a:lnRef>
+          <a:fillRef idx="0">
+            <a:schemeClr val="accent1"/>
+          </a:fillRef>
+          <a:effectRef idx="0">
+            <a:schemeClr val="accent1"/>
+          </a:effectRef>
+          <a:fontRef idx="minor">
+            <a:schemeClr val="tx1"/>
+          </a:fontRef>
+        </p:style>
+      </p:cxnSp>
+      <p:cxnSp>
+        <p:nvCxnSpPr>
+          <p:cNvPr id="60" name="Straight Arrow Connector 59">
+            <a:extLst>
+              <a:ext uri="{FF2B5EF4-FFF2-40B4-BE49-F238E27FC236}">
+                <a16:creationId xmlns:a16="http://schemas.microsoft.com/office/drawing/2014/main" id="{86E1B5CA-225E-1C4F-A6A1-8F9397BA088C}"/>
+              </a:ext>
+            </a:extLst>
+          </p:cNvPr>
+          <p:cNvCxnSpPr>
+            <a:cxnSpLocks noChangeAspect="1"/>
+          </p:cNvCxnSpPr>
+          <p:nvPr/>
+        </p:nvCxnSpPr>
+        <p:spPr>
+          <a:xfrm>
+            <a:off x="7289735" y="1220203"/>
+            <a:ext cx="955267" cy="0"/>
+          </a:xfrm>
+          <a:prstGeom prst="straightConnector1">
+            <a:avLst/>
+          </a:prstGeom>
+          <a:ln w="38100" cmpd="sng">
+            <a:solidFill>
+              <a:schemeClr val="tx1"/>
+            </a:solidFill>
+            <a:prstDash val="sysDash"/>
+            <a:headEnd w="med" len="med"/>
+            <a:tailEnd type="none" w="sm" len="sm"/>
+          </a:ln>
+        </p:spPr>
+        <p:style>
+          <a:lnRef idx="1">
+            <a:schemeClr val="accent1"/>
+          </a:lnRef>
+          <a:fillRef idx="0">
+            <a:schemeClr val="accent1"/>
+          </a:fillRef>
+          <a:effectRef idx="0">
+            <a:schemeClr val="accent1"/>
+          </a:effectRef>
+          <a:fontRef idx="minor">
+            <a:schemeClr val="tx1"/>
+          </a:fontRef>
+        </p:style>
+      </p:cxnSp>
+      <p:cxnSp>
+        <p:nvCxnSpPr>
+          <p:cNvPr id="61" name="Straight Arrow Connector 60">
+            <a:extLst>
+              <a:ext uri="{FF2B5EF4-FFF2-40B4-BE49-F238E27FC236}">
+                <a16:creationId xmlns:a16="http://schemas.microsoft.com/office/drawing/2014/main" id="{4B2E77C7-8B9A-664F-933C-9FB06C28F346}"/>
+              </a:ext>
+            </a:extLst>
+          </p:cNvPr>
+          <p:cNvCxnSpPr>
+            <a:cxnSpLocks noChangeAspect="1"/>
+          </p:cNvCxnSpPr>
+          <p:nvPr/>
+        </p:nvCxnSpPr>
+        <p:spPr>
+          <a:xfrm>
+            <a:off x="7289735" y="1333911"/>
+            <a:ext cx="955267" cy="0"/>
+          </a:xfrm>
+          <a:prstGeom prst="straightConnector1">
+            <a:avLst/>
+          </a:prstGeom>
+          <a:ln w="38100" cmpd="sng">
+            <a:solidFill>
+              <a:srgbClr val="FFC000"/>
+            </a:solidFill>
+            <a:prstDash val="solid"/>
+            <a:headEnd w="med" len="med"/>
+            <a:tailEnd type="none" w="sm" len="sm"/>
+          </a:ln>
+        </p:spPr>
+        <p:style>
+          <a:lnRef idx="1">
+            <a:schemeClr val="accent1"/>
+          </a:lnRef>
+          <a:fillRef idx="0">
+            <a:schemeClr val="accent1"/>
+          </a:fillRef>
+          <a:effectRef idx="0">
+            <a:schemeClr val="accent1"/>
+          </a:effectRef>
+          <a:fontRef idx="minor">
+            <a:schemeClr val="tx1"/>
+          </a:fontRef>
+        </p:style>
+      </p:cxnSp>
+      <p:pic>
+        <p:nvPicPr>
+          <p:cNvPr id="67" name="Picture 66">
+            <a:extLst>
+              <a:ext uri="{FF2B5EF4-FFF2-40B4-BE49-F238E27FC236}">
+                <a16:creationId xmlns:a16="http://schemas.microsoft.com/office/drawing/2014/main" id="{EA65BE78-5BFB-434E-B770-1872BF73181A}"/>
+              </a:ext>
+            </a:extLst>
+          </p:cNvPr>
+          <p:cNvPicPr>
+            <a:picLocks noChangeAspect="1"/>
+          </p:cNvPicPr>
+          <p:nvPr/>
+        </p:nvPicPr>
+        <p:blipFill>
+          <a:blip r:embed="rId2"/>
+          <a:stretch>
+            <a:fillRect/>
+          </a:stretch>
+        </p:blipFill>
+        <p:spPr>
+          <a:xfrm>
+            <a:off x="7289735" y="1424322"/>
+            <a:ext cx="955267" cy="52889"/>
+          </a:xfrm>
+          <a:prstGeom prst="rect">
+            <a:avLst/>
+          </a:prstGeom>
+        </p:spPr>
+      </p:pic>
+      <p:grpSp>
+        <p:nvGrpSpPr>
+          <p:cNvPr id="72" name="Group 71">
+            <a:extLst>
+              <a:ext uri="{FF2B5EF4-FFF2-40B4-BE49-F238E27FC236}">
+                <a16:creationId xmlns:a16="http://schemas.microsoft.com/office/drawing/2014/main" id="{6B61A2B2-81BE-A747-9753-CFE85EB5DFBB}"/>
+              </a:ext>
+            </a:extLst>
+          </p:cNvPr>
+          <p:cNvGrpSpPr/>
+          <p:nvPr/>
+        </p:nvGrpSpPr>
+        <p:grpSpPr>
+          <a:xfrm>
+            <a:off x="7289735" y="2041903"/>
+            <a:ext cx="955267" cy="227144"/>
+            <a:chOff x="7245491" y="1968751"/>
+            <a:chExt cx="955267" cy="227144"/>
+          </a:xfrm>
+        </p:grpSpPr>
+        <p:cxnSp>
+          <p:nvCxnSpPr>
+            <p:cNvPr id="69" name="Straight Arrow Connector 68">
+              <a:extLst>
+                <a:ext uri="{FF2B5EF4-FFF2-40B4-BE49-F238E27FC236}">
+                  <a16:creationId xmlns:a16="http://schemas.microsoft.com/office/drawing/2014/main" id="{F5FDFE15-E0F5-B94D-A268-919466028CC6}"/>
+                </a:ext>
+              </a:extLst>
+            </p:cNvPr>
+            <p:cNvCxnSpPr>
+              <a:cxnSpLocks noChangeAspect="1"/>
+            </p:cNvCxnSpPr>
+            <p:nvPr/>
+          </p:nvCxnSpPr>
+          <p:spPr>
+            <a:xfrm>
+              <a:off x="7245491" y="1968751"/>
+              <a:ext cx="955267" cy="0"/>
+            </a:xfrm>
+            <a:prstGeom prst="straightConnector1">
+              <a:avLst/>
+            </a:prstGeom>
+            <a:ln w="12700" cmpd="sng">
+              <a:solidFill>
+                <a:schemeClr val="tx1">
+                  <a:lumMod val="65000"/>
+                  <a:lumOff val="35000"/>
+                </a:schemeClr>
+              </a:solidFill>
+              <a:prstDash val="solid"/>
+              <a:headEnd w="med" len="med"/>
+              <a:tailEnd type="none" w="sm" len="sm"/>
+            </a:ln>
+          </p:spPr>
+          <p:style>
+            <a:lnRef idx="1">
+              <a:schemeClr val="accent1"/>
+            </a:lnRef>
+            <a:fillRef idx="0">
+              <a:schemeClr val="accent1"/>
+            </a:fillRef>
+            <a:effectRef idx="0">
+              <a:schemeClr val="accent1"/>
+            </a:effectRef>
+            <a:fontRef idx="minor">
+              <a:schemeClr val="tx1"/>
+            </a:fontRef>
+          </p:style>
+        </p:cxnSp>
+        <p:cxnSp>
+          <p:nvCxnSpPr>
+            <p:cNvPr id="70" name="Straight Arrow Connector 69">
+              <a:extLst>
+                <a:ext uri="{FF2B5EF4-FFF2-40B4-BE49-F238E27FC236}">
+                  <a16:creationId xmlns:a16="http://schemas.microsoft.com/office/drawing/2014/main" id="{7122E069-514D-BE45-ACC2-88F796CC0873}"/>
+                </a:ext>
+              </a:extLst>
+            </p:cNvPr>
+            <p:cNvCxnSpPr>
+              <a:cxnSpLocks noChangeAspect="1"/>
+            </p:cNvCxnSpPr>
+            <p:nvPr/>
+          </p:nvCxnSpPr>
+          <p:spPr>
+            <a:xfrm>
+              <a:off x="7245491" y="2073587"/>
+              <a:ext cx="955267" cy="0"/>
+            </a:xfrm>
+            <a:prstGeom prst="straightConnector1">
+              <a:avLst/>
+            </a:prstGeom>
+            <a:ln w="38100" cmpd="sng">
+              <a:solidFill>
+                <a:schemeClr val="tx1">
+                  <a:lumMod val="65000"/>
+                  <a:lumOff val="35000"/>
+                </a:schemeClr>
+              </a:solidFill>
+              <a:prstDash val="solid"/>
+              <a:headEnd w="med" len="med"/>
+              <a:tailEnd type="none" w="sm" len="sm"/>
+            </a:ln>
+          </p:spPr>
+          <p:style>
+            <a:lnRef idx="1">
+              <a:schemeClr val="accent1"/>
+            </a:lnRef>
+            <a:fillRef idx="0">
+              <a:schemeClr val="accent1"/>
+            </a:fillRef>
+            <a:effectRef idx="0">
+              <a:schemeClr val="accent1"/>
+            </a:effectRef>
+            <a:fontRef idx="minor">
+              <a:schemeClr val="tx1"/>
+            </a:fontRef>
+          </p:style>
+        </p:cxnSp>
+        <p:cxnSp>
+          <p:nvCxnSpPr>
+            <p:cNvPr id="71" name="Straight Arrow Connector 70">
+              <a:extLst>
+                <a:ext uri="{FF2B5EF4-FFF2-40B4-BE49-F238E27FC236}">
+                  <a16:creationId xmlns:a16="http://schemas.microsoft.com/office/drawing/2014/main" id="{35DE7717-8041-2140-ACD3-D2CC3CFE0D81}"/>
+                </a:ext>
+              </a:extLst>
+            </p:cNvPr>
+            <p:cNvCxnSpPr>
+              <a:cxnSpLocks noChangeAspect="1"/>
+            </p:cNvCxnSpPr>
+            <p:nvPr/>
+          </p:nvCxnSpPr>
+          <p:spPr>
+            <a:xfrm>
+              <a:off x="7245491" y="2195895"/>
+              <a:ext cx="955267" cy="0"/>
+            </a:xfrm>
+            <a:prstGeom prst="straightConnector1">
+              <a:avLst/>
+            </a:prstGeom>
+            <a:ln w="63500" cmpd="sng">
+              <a:solidFill>
+                <a:schemeClr val="tx1">
+                  <a:lumMod val="65000"/>
+                  <a:lumOff val="35000"/>
+                </a:schemeClr>
+              </a:solidFill>
+              <a:prstDash val="solid"/>
+              <a:headEnd w="med" len="med"/>
+              <a:tailEnd type="none" w="sm" len="sm"/>
+            </a:ln>
+          </p:spPr>
+          <p:style>
+            <a:lnRef idx="1">
+              <a:schemeClr val="accent1"/>
+            </a:lnRef>
+            <a:fillRef idx="0">
+              <a:schemeClr val="accent1"/>
+            </a:fillRef>
+            <a:effectRef idx="0">
+              <a:schemeClr val="accent1"/>
+            </a:effectRef>
+            <a:fontRef idx="minor">
+              <a:schemeClr val="tx1"/>
+            </a:fontRef>
+          </p:style>
+        </p:cxnSp>
+      </p:grpSp>
+      <p:grpSp>
+        <p:nvGrpSpPr>
+          <p:cNvPr id="79" name="Group 78">
+            <a:extLst>
+              <a:ext uri="{FF2B5EF4-FFF2-40B4-BE49-F238E27FC236}">
+                <a16:creationId xmlns:a16="http://schemas.microsoft.com/office/drawing/2014/main" id="{D58ED1B6-192B-5E48-A61C-9CAFF87356C6}"/>
+              </a:ext>
+            </a:extLst>
+          </p:cNvPr>
+          <p:cNvGrpSpPr/>
+          <p:nvPr/>
+        </p:nvGrpSpPr>
+        <p:grpSpPr>
+          <a:xfrm>
+            <a:off x="7895265" y="2961752"/>
+            <a:ext cx="349737" cy="294419"/>
+            <a:chOff x="7887742" y="2961752"/>
+            <a:chExt cx="349737" cy="294419"/>
+          </a:xfrm>
+        </p:grpSpPr>
+        <p:sp>
+          <p:nvSpPr>
+            <p:cNvPr id="74" name="Rectangle 73">
+              <a:extLst>
+                <a:ext uri="{FF2B5EF4-FFF2-40B4-BE49-F238E27FC236}">
+                  <a16:creationId xmlns:a16="http://schemas.microsoft.com/office/drawing/2014/main" id="{1CE41405-D210-5C45-AB41-924205AD5F47}"/>
+                </a:ext>
+              </a:extLst>
+            </p:cNvPr>
+            <p:cNvSpPr>
+              <a:spLocks noChangeAspect="1"/>
+            </p:cNvSpPr>
+            <p:nvPr/>
+          </p:nvSpPr>
+          <p:spPr>
+            <a:xfrm>
+              <a:off x="7931876" y="2961752"/>
+              <a:ext cx="305603" cy="294419"/>
+            </a:xfrm>
+            <a:prstGeom prst="rect">
+              <a:avLst/>
+            </a:prstGeom>
+            <a:solidFill>
+              <a:schemeClr val="bg2">
+                <a:lumMod val="75000"/>
+              </a:schemeClr>
+            </a:solidFill>
+            <a:ln>
+              <a:noFill/>
+            </a:ln>
+          </p:spPr>
+          <p:style>
+            <a:lnRef idx="2">
+              <a:schemeClr val="accent1">
+                <a:shade val="50000"/>
+              </a:schemeClr>
+            </a:lnRef>
+            <a:fillRef idx="1">
+              <a:schemeClr val="accent1"/>
+            </a:fillRef>
+            <a:effectRef idx="0">
+              <a:schemeClr val="accent1"/>
+            </a:effectRef>
+            <a:fontRef idx="minor">
+              <a:schemeClr val="lt1"/>
+            </a:fontRef>
+          </p:style>
+          <p:txBody>
+            <a:bodyPr rot="0" spcFirstLastPara="0" vertOverflow="overflow" horzOverflow="overflow" vert="horz" wrap="square" lIns="91440" tIns="45720" rIns="91440" bIns="45720" numCol="1" spcCol="0" rtlCol="0" fromWordArt="0" anchor="ctr" anchorCtr="0" forceAA="0" compatLnSpc="1">
+              <a:prstTxWarp prst="textNoShape">
+                <a:avLst/>
+              </a:prstTxWarp>
+              <a:noAutofit/>
+            </a:bodyPr>
+            <a:lstStyle/>
+            <a:p>
+              <a:pPr algn="ctr"/>
+              <a:endParaRPr lang="de-DE">
+                <a:latin typeface="Roboto" panose="02000000000000000000" pitchFamily="2" charset="0"/>
+                <a:ea typeface="Roboto" panose="02000000000000000000" pitchFamily="2" charset="0"/>
+              </a:endParaRPr>
+            </a:p>
+          </p:txBody>
+        </p:sp>
+        <p:sp>
+          <p:nvSpPr>
+            <p:cNvPr id="78" name="Freeform 77">
+              <a:extLst>
+                <a:ext uri="{FF2B5EF4-FFF2-40B4-BE49-F238E27FC236}">
+                  <a16:creationId xmlns:a16="http://schemas.microsoft.com/office/drawing/2014/main" id="{125B48E9-636F-4947-A88C-432095774150}"/>
+                </a:ext>
+              </a:extLst>
+            </p:cNvPr>
+            <p:cNvSpPr>
+              <a:spLocks noChangeAspect="1"/>
+            </p:cNvSpPr>
+            <p:nvPr/>
+          </p:nvSpPr>
+          <p:spPr>
+            <a:xfrm rot="5400000">
+              <a:off x="7839503" y="3086896"/>
+              <a:ext cx="140612" cy="44133"/>
+            </a:xfrm>
+            <a:custGeom>
+              <a:avLst/>
+              <a:gdLst>
+                <a:gd name="connsiteX0" fmla="*/ 0 w 140612"/>
+                <a:gd name="connsiteY0" fmla="*/ 44133 h 44133"/>
+                <a:gd name="connsiteX1" fmla="*/ 22905 w 140612"/>
+                <a:gd name="connsiteY1" fmla="*/ 0 h 44133"/>
+                <a:gd name="connsiteX2" fmla="*/ 117707 w 140612"/>
+                <a:gd name="connsiteY2" fmla="*/ 0 h 44133"/>
+                <a:gd name="connsiteX3" fmla="*/ 140612 w 140612"/>
+                <a:gd name="connsiteY3" fmla="*/ 44133 h 44133"/>
+                <a:gd name="connsiteX4" fmla="*/ 0 w 140612"/>
+                <a:gd name="connsiteY4" fmla="*/ 44133 h 44133"/>
+              </a:gdLst>
+              <a:ahLst/>
+              <a:cxnLst>
+                <a:cxn ang="0">
+                  <a:pos x="connsiteX0" y="connsiteY0"/>
+                </a:cxn>
+                <a:cxn ang="0">
+                  <a:pos x="connsiteX1" y="connsiteY1"/>
+                </a:cxn>
+                <a:cxn ang="0">
+                  <a:pos x="connsiteX2" y="connsiteY2"/>
+                </a:cxn>
+                <a:cxn ang="0">
+                  <a:pos x="connsiteX3" y="connsiteY3"/>
+                </a:cxn>
+                <a:cxn ang="0">
+                  <a:pos x="connsiteX4" y="connsiteY4"/>
+                </a:cxn>
+              </a:cxnLst>
+              <a:rect l="l" t="t" r="r" b="b"/>
+              <a:pathLst>
+                <a:path w="140612" h="44133">
+                  <a:moveTo>
+                    <a:pt x="0" y="44133"/>
+                  </a:moveTo>
+                  <a:lnTo>
+                    <a:pt x="22905" y="0"/>
+                  </a:lnTo>
+                  <a:lnTo>
+                    <a:pt x="117707" y="0"/>
+                  </a:lnTo>
+                  <a:lnTo>
+                    <a:pt x="140612" y="44133"/>
+                  </a:lnTo>
+                  <a:lnTo>
+                    <a:pt x="0" y="44133"/>
+                  </a:lnTo>
+                  <a:close/>
+                </a:path>
+              </a:pathLst>
+            </a:custGeom>
+            <a:solidFill>
+              <a:schemeClr val="bg2">
+                <a:lumMod val="75000"/>
+              </a:schemeClr>
+            </a:solidFill>
+            <a:ln>
+              <a:noFill/>
+            </a:ln>
+          </p:spPr>
+          <p:style>
+            <a:lnRef idx="2">
+              <a:schemeClr val="accent1">
+                <a:shade val="50000"/>
+              </a:schemeClr>
+            </a:lnRef>
+            <a:fillRef idx="1">
+              <a:schemeClr val="accent1"/>
+            </a:fillRef>
+            <a:effectRef idx="0">
+              <a:schemeClr val="accent1"/>
+            </a:effectRef>
+            <a:fontRef idx="minor">
+              <a:schemeClr val="lt1"/>
+            </a:fontRef>
+          </p:style>
+          <p:txBody>
+            <a:bodyPr rot="0" spcFirstLastPara="0" vertOverflow="overflow" horzOverflow="overflow" vert="horz" wrap="square" lIns="91440" tIns="45720" rIns="91440" bIns="45720" numCol="1" spcCol="0" rtlCol="0" fromWordArt="0" anchor="ctr" anchorCtr="0" forceAA="0" compatLnSpc="1">
+              <a:prstTxWarp prst="textNoShape">
+                <a:avLst/>
+              </a:prstTxWarp>
+              <a:noAutofit/>
+            </a:bodyPr>
+            <a:lstStyle/>
+            <a:p>
+              <a:pPr algn="ctr"/>
+              <a:endParaRPr lang="de-DE">
+                <a:latin typeface="Roboto" panose="02000000000000000000" pitchFamily="2" charset="0"/>
+                <a:ea typeface="Roboto" panose="02000000000000000000" pitchFamily="2" charset="0"/>
+              </a:endParaRPr>
+            </a:p>
+          </p:txBody>
+        </p:sp>
+      </p:grpSp>
+      <p:sp>
+        <p:nvSpPr>
+          <p:cNvPr id="77" name="Freeform 76">
+            <a:extLst>
+              <a:ext uri="{FF2B5EF4-FFF2-40B4-BE49-F238E27FC236}">
+                <a16:creationId xmlns:a16="http://schemas.microsoft.com/office/drawing/2014/main" id="{68A1D1FE-0498-E24C-AC08-6304E915159D}"/>
+              </a:ext>
+            </a:extLst>
+          </p:cNvPr>
+          <p:cNvSpPr>
+            <a:spLocks noChangeAspect="1"/>
+          </p:cNvSpPr>
+          <p:nvPr/>
+        </p:nvSpPr>
+        <p:spPr>
+          <a:xfrm rot="5400000">
+            <a:off x="7535467" y="2956160"/>
+            <a:ext cx="294419" cy="305603"/>
+          </a:xfrm>
+          <a:custGeom>
+            <a:avLst/>
+            <a:gdLst>
+              <a:gd name="connsiteX0" fmla="*/ 0 w 294419"/>
+              <a:gd name="connsiteY0" fmla="*/ 305603 h 305603"/>
+              <a:gd name="connsiteX1" fmla="*/ 0 w 294419"/>
+              <a:gd name="connsiteY1" fmla="*/ 0 h 305603"/>
+              <a:gd name="connsiteX2" fmla="*/ 99808 w 294419"/>
+              <a:gd name="connsiteY2" fmla="*/ 0 h 305603"/>
+              <a:gd name="connsiteX3" fmla="*/ 76903 w 294419"/>
+              <a:gd name="connsiteY3" fmla="*/ 44133 h 305603"/>
+              <a:gd name="connsiteX4" fmla="*/ 217515 w 294419"/>
+              <a:gd name="connsiteY4" fmla="*/ 44133 h 305603"/>
+              <a:gd name="connsiteX5" fmla="*/ 194610 w 294419"/>
+              <a:gd name="connsiteY5" fmla="*/ 0 h 305603"/>
+              <a:gd name="connsiteX6" fmla="*/ 294419 w 294419"/>
+              <a:gd name="connsiteY6" fmla="*/ 0 h 305603"/>
+              <a:gd name="connsiteX7" fmla="*/ 294419 w 294419"/>
+              <a:gd name="connsiteY7" fmla="*/ 305603 h 305603"/>
+              <a:gd name="connsiteX8" fmla="*/ 0 w 294419"/>
+              <a:gd name="connsiteY8" fmla="*/ 305603 h 305603"/>
+            </a:gdLst>
+            <a:ahLst/>
+            <a:cxnLst>
+              <a:cxn ang="0">
+                <a:pos x="connsiteX0" y="connsiteY0"/>
+              </a:cxn>
+              <a:cxn ang="0">
+                <a:pos x="connsiteX1" y="connsiteY1"/>
+              </a:cxn>
+              <a:cxn ang="0">
+                <a:pos x="connsiteX2" y="connsiteY2"/>
+              </a:cxn>
+              <a:cxn ang="0">
+                <a:pos x="connsiteX3" y="connsiteY3"/>
+              </a:cxn>
+              <a:cxn ang="0">
+                <a:pos x="connsiteX4" y="connsiteY4"/>
+              </a:cxn>
+              <a:cxn ang="0">
+                <a:pos x="connsiteX5" y="connsiteY5"/>
+              </a:cxn>
+              <a:cxn ang="0">
+                <a:pos x="connsiteX6" y="connsiteY6"/>
+              </a:cxn>
+              <a:cxn ang="0">
+                <a:pos x="connsiteX7" y="connsiteY7"/>
+              </a:cxn>
+              <a:cxn ang="0">
+                <a:pos x="connsiteX8" y="connsiteY8"/>
+              </a:cxn>
+            </a:cxnLst>
+            <a:rect l="l" t="t" r="r" b="b"/>
+            <a:pathLst>
+              <a:path w="294419" h="305603">
+                <a:moveTo>
+                  <a:pt x="0" y="305603"/>
+                </a:moveTo>
+                <a:lnTo>
+                  <a:pt x="0" y="0"/>
+                </a:lnTo>
+                <a:lnTo>
+                  <a:pt x="99808" y="0"/>
+                </a:lnTo>
+                <a:lnTo>
+                  <a:pt x="76903" y="44133"/>
+                </a:lnTo>
+                <a:lnTo>
+                  <a:pt x="217515" y="44133"/>
+                </a:lnTo>
+                <a:lnTo>
+                  <a:pt x="194610" y="0"/>
+                </a:lnTo>
+                <a:lnTo>
+                  <a:pt x="294419" y="0"/>
+                </a:lnTo>
+                <a:lnTo>
+                  <a:pt x="294419" y="305603"/>
+                </a:lnTo>
+                <a:lnTo>
+                  <a:pt x="0" y="305603"/>
+                </a:lnTo>
+                <a:close/>
+              </a:path>
+            </a:pathLst>
+          </a:custGeom>
+          <a:solidFill>
+            <a:schemeClr val="bg2">
+              <a:lumMod val="75000"/>
+            </a:schemeClr>
+          </a:solidFill>
+          <a:ln>
+            <a:noFill/>
+          </a:ln>
+        </p:spPr>
+        <p:style>
+          <a:lnRef idx="2">
+            <a:schemeClr val="accent1">
+              <a:shade val="50000"/>
+            </a:schemeClr>
+          </a:lnRef>
+          <a:fillRef idx="1">
+            <a:schemeClr val="accent1"/>
+          </a:fillRef>
+          <a:effectRef idx="0">
+            <a:schemeClr val="accent1"/>
+          </a:effectRef>
+          <a:fontRef idx="minor">
+            <a:schemeClr val="lt1"/>
+          </a:fontRef>
+        </p:style>
+        <p:txBody>
+          <a:bodyPr rot="0" spcFirstLastPara="0" vertOverflow="overflow" horzOverflow="overflow" vert="horz" wrap="square" lIns="91440" tIns="45720" rIns="91440" bIns="45720" numCol="1" spcCol="0" rtlCol="0" fromWordArt="0" anchor="ctr" anchorCtr="0" forceAA="0" compatLnSpc="1">
+            <a:prstTxWarp prst="textNoShape">
+              <a:avLst/>
+            </a:prstTxWarp>
+            <a:noAutofit/>
+          </a:bodyPr>
+          <a:lstStyle/>
+          <a:p>
+            <a:pPr algn="ctr"/>
+            <a:endParaRPr lang="de-DE">
+              <a:latin typeface="Roboto" panose="02000000000000000000" pitchFamily="2" charset="0"/>
+              <a:ea typeface="Roboto" panose="02000000000000000000" pitchFamily="2" charset="0"/>
+            </a:endParaRPr>
+          </a:p>
+        </p:txBody>
+      </p:sp>
+      <p:sp>
+        <p:nvSpPr>
+          <p:cNvPr id="80" name="Oval 79">
+            <a:extLst>
+              <a:ext uri="{FF2B5EF4-FFF2-40B4-BE49-F238E27FC236}">
+                <a16:creationId xmlns:a16="http://schemas.microsoft.com/office/drawing/2014/main" id="{537B8EB4-96ED-B844-9DE0-9A680085FE6E}"/>
+              </a:ext>
+            </a:extLst>
+          </p:cNvPr>
+          <p:cNvSpPr>
+            <a:spLocks noChangeAspect="1"/>
+          </p:cNvSpPr>
+          <p:nvPr/>
+        </p:nvSpPr>
+        <p:spPr>
+          <a:xfrm>
+            <a:off x="7403264" y="3808692"/>
+            <a:ext cx="161143" cy="144000"/>
+          </a:xfrm>
+          <a:prstGeom prst="ellipse">
+            <a:avLst/>
+          </a:prstGeom>
+          <a:solidFill>
+            <a:schemeClr val="bg2">
+              <a:lumMod val="75000"/>
+            </a:schemeClr>
+          </a:solidFill>
+          <a:ln>
+            <a:noFill/>
+          </a:ln>
+        </p:spPr>
+        <p:style>
+          <a:lnRef idx="2">
+            <a:schemeClr val="accent1">
+              <a:shade val="50000"/>
+            </a:schemeClr>
+          </a:lnRef>
+          <a:fillRef idx="1">
+            <a:schemeClr val="accent1"/>
+          </a:fillRef>
+          <a:effectRef idx="0">
+            <a:schemeClr val="accent1"/>
+          </a:effectRef>
+          <a:fontRef idx="minor">
+            <a:schemeClr val="lt1"/>
+          </a:fontRef>
+        </p:style>
+        <p:txBody>
+          <a:bodyPr rot="0" spcFirstLastPara="0" vertOverflow="overflow" horzOverflow="overflow" vert="horz" wrap="square" lIns="91440" tIns="45720" rIns="91440" bIns="45720" numCol="1" spcCol="0" rtlCol="0" fromWordArt="0" anchor="ctr" anchorCtr="0" forceAA="0" compatLnSpc="1">
+            <a:prstTxWarp prst="textNoShape">
+              <a:avLst/>
+            </a:prstTxWarp>
+            <a:noAutofit/>
+          </a:bodyPr>
+          <a:lstStyle/>
+          <a:p>
+            <a:pPr algn="ctr"/>
+            <a:endParaRPr lang="de-DE">
+              <a:latin typeface="Roboto" panose="02000000000000000000" pitchFamily="2" charset="0"/>
+              <a:ea typeface="Roboto" panose="02000000000000000000" pitchFamily="2" charset="0"/>
+            </a:endParaRPr>
+          </a:p>
+        </p:txBody>
+      </p:sp>
+      <p:sp>
+        <p:nvSpPr>
+          <p:cNvPr id="81" name="Oval 80">
+            <a:extLst>
+              <a:ext uri="{FF2B5EF4-FFF2-40B4-BE49-F238E27FC236}">
+                <a16:creationId xmlns:a16="http://schemas.microsoft.com/office/drawing/2014/main" id="{B1305C54-E539-0444-B75D-1025A23E16C3}"/>
+              </a:ext>
+            </a:extLst>
+          </p:cNvPr>
+          <p:cNvSpPr>
+            <a:spLocks noChangeAspect="1"/>
+          </p:cNvSpPr>
+          <p:nvPr/>
+        </p:nvSpPr>
+        <p:spPr>
+          <a:xfrm>
+            <a:off x="7499130" y="4022545"/>
+            <a:ext cx="161143" cy="144000"/>
+          </a:xfrm>
+          <a:prstGeom prst="ellipse">
+            <a:avLst/>
+          </a:prstGeom>
+          <a:solidFill>
+            <a:srgbClr val="FFC000"/>
+          </a:solidFill>
+          <a:ln>
+            <a:noFill/>
+          </a:ln>
+        </p:spPr>
+        <p:style>
+          <a:lnRef idx="2">
+            <a:schemeClr val="accent1">
+              <a:shade val="50000"/>
+            </a:schemeClr>
+          </a:lnRef>
+          <a:fillRef idx="1">
+            <a:schemeClr val="accent1"/>
+          </a:fillRef>
+          <a:effectRef idx="0">
+            <a:schemeClr val="accent1"/>
+          </a:effectRef>
+          <a:fontRef idx="minor">
+            <a:schemeClr val="lt1"/>
+          </a:fontRef>
+        </p:style>
+        <p:txBody>
+          <a:bodyPr rot="0" spcFirstLastPara="0" vertOverflow="overflow" horzOverflow="overflow" vert="horz" wrap="square" lIns="91440" tIns="45720" rIns="91440" bIns="45720" numCol="1" spcCol="0" rtlCol="0" fromWordArt="0" anchor="ctr" anchorCtr="0" forceAA="0" compatLnSpc="1">
+            <a:prstTxWarp prst="textNoShape">
+              <a:avLst/>
+            </a:prstTxWarp>
+            <a:noAutofit/>
+          </a:bodyPr>
+          <a:lstStyle/>
+          <a:p>
+            <a:pPr algn="ctr"/>
+            <a:endParaRPr lang="de-DE">
+              <a:latin typeface="Roboto" panose="02000000000000000000" pitchFamily="2" charset="0"/>
+              <a:ea typeface="Roboto" panose="02000000000000000000" pitchFamily="2" charset="0"/>
+            </a:endParaRPr>
+          </a:p>
+        </p:txBody>
+      </p:sp>
+      <p:sp>
+        <p:nvSpPr>
+          <p:cNvPr id="82" name="Oval 81">
+            <a:extLst>
+              <a:ext uri="{FF2B5EF4-FFF2-40B4-BE49-F238E27FC236}">
+                <a16:creationId xmlns:a16="http://schemas.microsoft.com/office/drawing/2014/main" id="{9165D3AF-A395-D54B-85BA-B3F274651E5C}"/>
+              </a:ext>
+            </a:extLst>
+          </p:cNvPr>
+          <p:cNvSpPr>
+            <a:spLocks noChangeAspect="1"/>
+          </p:cNvSpPr>
+          <p:nvPr/>
+        </p:nvSpPr>
+        <p:spPr>
+          <a:xfrm>
+            <a:off x="7300026" y="3970925"/>
+            <a:ext cx="161143" cy="144000"/>
+          </a:xfrm>
+          <a:prstGeom prst="ellipse">
+            <a:avLst/>
+          </a:prstGeom>
+          <a:solidFill>
+            <a:schemeClr val="accent6">
+              <a:lumMod val="50000"/>
+            </a:schemeClr>
+          </a:solidFill>
+          <a:ln>
+            <a:noFill/>
+          </a:ln>
+        </p:spPr>
+        <p:style>
+          <a:lnRef idx="2">
+            <a:schemeClr val="accent1">
+              <a:shade val="50000"/>
+            </a:schemeClr>
+          </a:lnRef>
+          <a:fillRef idx="1">
+            <a:schemeClr val="accent1"/>
+          </a:fillRef>
+          <a:effectRef idx="0">
+            <a:schemeClr val="accent1"/>
+          </a:effectRef>
+          <a:fontRef idx="minor">
+            <a:schemeClr val="lt1"/>
+          </a:fontRef>
+        </p:style>
+        <p:txBody>
+          <a:bodyPr rot="0" spcFirstLastPara="0" vertOverflow="overflow" horzOverflow="overflow" vert="horz" wrap="square" lIns="91440" tIns="45720" rIns="91440" bIns="45720" numCol="1" spcCol="0" rtlCol="0" fromWordArt="0" anchor="ctr" anchorCtr="0" forceAA="0" compatLnSpc="1">
+            <a:prstTxWarp prst="textNoShape">
+              <a:avLst/>
+            </a:prstTxWarp>
+            <a:noAutofit/>
+          </a:bodyPr>
+          <a:lstStyle/>
+          <a:p>
+            <a:pPr algn="ctr"/>
+            <a:endParaRPr lang="de-DE">
+              <a:latin typeface="Roboto" panose="02000000000000000000" pitchFamily="2" charset="0"/>
+              <a:ea typeface="Roboto" panose="02000000000000000000" pitchFamily="2" charset="0"/>
+            </a:endParaRPr>
+          </a:p>
+        </p:txBody>
+      </p:sp>
+      <p:sp>
+        <p:nvSpPr>
+          <p:cNvPr id="83" name="Oval 82">
+            <a:extLst>
+              <a:ext uri="{FF2B5EF4-FFF2-40B4-BE49-F238E27FC236}">
+                <a16:creationId xmlns:a16="http://schemas.microsoft.com/office/drawing/2014/main" id="{7A032335-563A-EA48-A3D1-638B34CCBBAB}"/>
+              </a:ext>
+            </a:extLst>
+          </p:cNvPr>
+          <p:cNvSpPr>
+            <a:spLocks noChangeAspect="1"/>
+          </p:cNvSpPr>
+          <p:nvPr/>
+        </p:nvSpPr>
+        <p:spPr>
+          <a:xfrm>
+            <a:off x="8030072" y="3852936"/>
+            <a:ext cx="161143" cy="144000"/>
+          </a:xfrm>
+          <a:prstGeom prst="ellipse">
+            <a:avLst/>
+          </a:prstGeom>
+          <a:solidFill>
+            <a:schemeClr val="accent1"/>
+          </a:solidFill>
+          <a:ln>
+            <a:noFill/>
+          </a:ln>
+        </p:spPr>
+        <p:style>
+          <a:lnRef idx="2">
+            <a:schemeClr val="accent1">
+              <a:shade val="50000"/>
+            </a:schemeClr>
+          </a:lnRef>
+          <a:fillRef idx="1">
+            <a:schemeClr val="accent1"/>
+          </a:fillRef>
+          <a:effectRef idx="0">
+            <a:schemeClr val="accent1"/>
+          </a:effectRef>
+          <a:fontRef idx="minor">
+            <a:schemeClr val="lt1"/>
+          </a:fontRef>
+        </p:style>
+        <p:txBody>
+          <a:bodyPr rot="0" spcFirstLastPara="0" vertOverflow="overflow" horzOverflow="overflow" vert="horz" wrap="square" lIns="91440" tIns="45720" rIns="91440" bIns="45720" numCol="1" spcCol="0" rtlCol="0" fromWordArt="0" anchor="ctr" anchorCtr="0" forceAA="0" compatLnSpc="1">
+            <a:prstTxWarp prst="textNoShape">
+              <a:avLst/>
+            </a:prstTxWarp>
+            <a:noAutofit/>
+          </a:bodyPr>
+          <a:lstStyle/>
+          <a:p>
+            <a:pPr algn="ctr"/>
+            <a:endParaRPr lang="de-DE">
+              <a:latin typeface="Roboto" panose="02000000000000000000" pitchFamily="2" charset="0"/>
+              <a:ea typeface="Roboto" panose="02000000000000000000" pitchFamily="2" charset="0"/>
+            </a:endParaRPr>
+          </a:p>
+        </p:txBody>
+      </p:sp>
+      <p:sp>
+        <p:nvSpPr>
+          <p:cNvPr id="84" name="Oval 83">
+            <a:extLst>
+              <a:ext uri="{FF2B5EF4-FFF2-40B4-BE49-F238E27FC236}">
+                <a16:creationId xmlns:a16="http://schemas.microsoft.com/office/drawing/2014/main" id="{BB361F3E-724A-1F4D-94B8-03B1C348D96D}"/>
+              </a:ext>
+            </a:extLst>
+          </p:cNvPr>
+          <p:cNvSpPr>
+            <a:spLocks noChangeAspect="1"/>
+          </p:cNvSpPr>
+          <p:nvPr/>
+        </p:nvSpPr>
+        <p:spPr>
+          <a:xfrm>
+            <a:off x="8000575" y="4052041"/>
+            <a:ext cx="161143" cy="144000"/>
+          </a:xfrm>
+          <a:prstGeom prst="ellipse">
+            <a:avLst/>
+          </a:prstGeom>
+          <a:solidFill>
+            <a:schemeClr val="accent3">
+              <a:lumMod val="60000"/>
+              <a:lumOff val="40000"/>
+            </a:schemeClr>
+          </a:solidFill>
+          <a:ln>
+            <a:noFill/>
+          </a:ln>
+        </p:spPr>
+        <p:style>
+          <a:lnRef idx="2">
+            <a:schemeClr val="accent1">
+              <a:shade val="50000"/>
+            </a:schemeClr>
+          </a:lnRef>
+          <a:fillRef idx="1">
+            <a:schemeClr val="accent1"/>
+          </a:fillRef>
+          <a:effectRef idx="0">
+            <a:schemeClr val="accent1"/>
+          </a:effectRef>
+          <a:fontRef idx="minor">
+            <a:schemeClr val="lt1"/>
+          </a:fontRef>
+        </p:style>
+        <p:txBody>
+          <a:bodyPr rot="0" spcFirstLastPara="0" vertOverflow="overflow" horzOverflow="overflow" vert="horz" wrap="square" lIns="91440" tIns="45720" rIns="91440" bIns="45720" numCol="1" spcCol="0" rtlCol="0" fromWordArt="0" anchor="ctr" anchorCtr="0" forceAA="0" compatLnSpc="1">
+            <a:prstTxWarp prst="textNoShape">
+              <a:avLst/>
+            </a:prstTxWarp>
+            <a:noAutofit/>
+          </a:bodyPr>
+          <a:lstStyle/>
+          <a:p>
+            <a:pPr algn="ctr"/>
+            <a:endParaRPr lang="de-DE">
+              <a:latin typeface="Roboto" panose="02000000000000000000" pitchFamily="2" charset="0"/>
+              <a:ea typeface="Roboto" panose="02000000000000000000" pitchFamily="2" charset="0"/>
+            </a:endParaRPr>
+          </a:p>
+        </p:txBody>
+      </p:sp>
+      <p:sp>
+        <p:nvSpPr>
+          <p:cNvPr id="85" name="Oval 84">
+            <a:extLst>
+              <a:ext uri="{FF2B5EF4-FFF2-40B4-BE49-F238E27FC236}">
+                <a16:creationId xmlns:a16="http://schemas.microsoft.com/office/drawing/2014/main" id="{D4E1AEC6-543F-134D-B2C8-30C13EB042CB}"/>
+              </a:ext>
+            </a:extLst>
+          </p:cNvPr>
+          <p:cNvSpPr>
+            <a:spLocks noChangeAspect="1"/>
+          </p:cNvSpPr>
+          <p:nvPr/>
+        </p:nvSpPr>
+        <p:spPr>
+          <a:xfrm>
+            <a:off x="7823061" y="3904125"/>
+            <a:ext cx="161143" cy="144000"/>
+          </a:xfrm>
+          <a:prstGeom prst="ellipse">
+            <a:avLst/>
+          </a:prstGeom>
+          <a:solidFill>
+            <a:srgbClr val="FF0000"/>
+          </a:solidFill>
+          <a:ln>
+            <a:noFill/>
+          </a:ln>
+        </p:spPr>
+        <p:style>
+          <a:lnRef idx="2">
+            <a:schemeClr val="accent1">
+              <a:shade val="50000"/>
+            </a:schemeClr>
+          </a:lnRef>
+          <a:fillRef idx="1">
+            <a:schemeClr val="accent1"/>
+          </a:fillRef>
+          <a:effectRef idx="0">
+            <a:schemeClr val="accent1"/>
+          </a:effectRef>
+          <a:fontRef idx="minor">
+            <a:schemeClr val="lt1"/>
+          </a:fontRef>
+        </p:style>
+        <p:txBody>
+          <a:bodyPr rot="0" spcFirstLastPara="0" vertOverflow="overflow" horzOverflow="overflow" vert="horz" wrap="square" lIns="91440" tIns="45720" rIns="91440" bIns="45720" numCol="1" spcCol="0" rtlCol="0" fromWordArt="0" anchor="ctr" anchorCtr="0" forceAA="0" compatLnSpc="1">
+            <a:prstTxWarp prst="textNoShape">
+              <a:avLst/>
+            </a:prstTxWarp>
+            <a:noAutofit/>
+          </a:bodyPr>
+          <a:lstStyle/>
+          <a:p>
+            <a:pPr algn="ctr"/>
+            <a:endParaRPr lang="de-DE">
+              <a:latin typeface="Roboto" panose="02000000000000000000" pitchFamily="2" charset="0"/>
+              <a:ea typeface="Roboto" panose="02000000000000000000" pitchFamily="2" charset="0"/>
+            </a:endParaRPr>
+          </a:p>
+        </p:txBody>
+      </p:sp>
+    </p:spTree>
+    <p:extLst>
+      <p:ext uri="{BB962C8B-B14F-4D97-AF65-F5344CB8AC3E}">
+        <p14:creationId xmlns:p14="http://schemas.microsoft.com/office/powerpoint/2010/main" val="2565065008"/>
+      </p:ext>
+    </p:extLst>
+  </p:cSld>
+  <p:clrMapOvr>
+    <a:masterClrMapping/>
+  </p:clrMapOvr>
+</p:sld>
+</file>
+
 <file path=ppt/theme/theme1.xml><?xml version="1.0" encoding="utf-8"?>
 <a:theme xmlns:a="http://schemas.openxmlformats.org/drawingml/2006/main" name="Office Theme">
   <a:themeElements>

</xml_diff>